<commit_message>
Finished first draft of defense slides.
</commit_message>
<xml_diff>
--- a/DefensePresentation.pptx
+++ b/DefensePresentation.pptx
@@ -62,6 +62,13 @@
     <p:sldId id="312" r:id="rId56"/>
     <p:sldId id="313" r:id="rId57"/>
     <p:sldId id="314" r:id="rId58"/>
+    <p:sldId id="315" r:id="rId59"/>
+    <p:sldId id="316" r:id="rId60"/>
+    <p:sldId id="318" r:id="rId61"/>
+    <p:sldId id="317" r:id="rId62"/>
+    <p:sldId id="319" r:id="rId63"/>
+    <p:sldId id="320" r:id="rId64"/>
+    <p:sldId id="321" r:id="rId65"/>
   </p:sldIdLst>
   <p:sldSz cx="12192000" cy="6858000"/>
   <p:notesSz cx="6858000" cy="9144000"/>
@@ -354,7 +361,7 @@
           <a:p>
             <a:fld id="{45D0C44D-65D9-46D4-BB5E-33D5C8D4C21A}" type="datetimeFigureOut">
               <a:rPr lang="en-US" smtClean="0"/>
-              <a:t>4/26/2015</a:t>
+              <a:t>4/27/2015</a:t>
             </a:fld>
             <a:endParaRPr lang="en-US"/>
           </a:p>
@@ -629,7 +636,7 @@
           <a:p>
             <a:fld id="{45D0C44D-65D9-46D4-BB5E-33D5C8D4C21A}" type="datetimeFigureOut">
               <a:rPr lang="en-US" smtClean="0"/>
-              <a:t>4/26/2015</a:t>
+              <a:t>4/27/2015</a:t>
             </a:fld>
             <a:endParaRPr lang="en-US"/>
           </a:p>
@@ -823,7 +830,7 @@
           <a:p>
             <a:fld id="{45D0C44D-65D9-46D4-BB5E-33D5C8D4C21A}" type="datetimeFigureOut">
               <a:rPr lang="en-US" smtClean="0"/>
-              <a:t>4/26/2015</a:t>
+              <a:t>4/27/2015</a:t>
             </a:fld>
             <a:endParaRPr lang="en-US"/>
           </a:p>
@@ -1096,7 +1103,7 @@
           <a:p>
             <a:fld id="{45D0C44D-65D9-46D4-BB5E-33D5C8D4C21A}" type="datetimeFigureOut">
               <a:rPr lang="en-US" smtClean="0"/>
-              <a:t>4/26/2015</a:t>
+              <a:t>4/27/2015</a:t>
             </a:fld>
             <a:endParaRPr lang="en-US"/>
           </a:p>
@@ -1437,7 +1444,7 @@
           <a:p>
             <a:fld id="{45D0C44D-65D9-46D4-BB5E-33D5C8D4C21A}" type="datetimeFigureOut">
               <a:rPr lang="en-US" smtClean="0"/>
-              <a:t>4/26/2015</a:t>
+              <a:t>4/27/2015</a:t>
             </a:fld>
             <a:endParaRPr lang="en-US"/>
           </a:p>
@@ -2060,7 +2067,7 @@
           <a:p>
             <a:fld id="{45D0C44D-65D9-46D4-BB5E-33D5C8D4C21A}" type="datetimeFigureOut">
               <a:rPr lang="en-US" smtClean="0"/>
-              <a:t>4/26/2015</a:t>
+              <a:t>4/27/2015</a:t>
             </a:fld>
             <a:endParaRPr lang="en-US"/>
           </a:p>
@@ -2920,7 +2927,7 @@
           <a:p>
             <a:fld id="{45D0C44D-65D9-46D4-BB5E-33D5C8D4C21A}" type="datetimeFigureOut">
               <a:rPr lang="en-US" smtClean="0"/>
-              <a:t>4/26/2015</a:t>
+              <a:t>4/27/2015</a:t>
             </a:fld>
             <a:endParaRPr lang="en-US"/>
           </a:p>
@@ -3090,7 +3097,7 @@
           <a:p>
             <a:fld id="{45D0C44D-65D9-46D4-BB5E-33D5C8D4C21A}" type="datetimeFigureOut">
               <a:rPr lang="en-US" smtClean="0"/>
-              <a:t>4/26/2015</a:t>
+              <a:t>4/27/2015</a:t>
             </a:fld>
             <a:endParaRPr lang="en-US"/>
           </a:p>
@@ -3270,7 +3277,7 @@
           <a:p>
             <a:fld id="{45D0C44D-65D9-46D4-BB5E-33D5C8D4C21A}" type="datetimeFigureOut">
               <a:rPr lang="en-US" smtClean="0"/>
-              <a:t>4/26/2015</a:t>
+              <a:t>4/27/2015</a:t>
             </a:fld>
             <a:endParaRPr lang="en-US"/>
           </a:p>
@@ -3440,7 +3447,7 @@
           <a:p>
             <a:fld id="{45D0C44D-65D9-46D4-BB5E-33D5C8D4C21A}" type="datetimeFigureOut">
               <a:rPr lang="en-US" smtClean="0"/>
-              <a:t>4/26/2015</a:t>
+              <a:t>4/27/2015</a:t>
             </a:fld>
             <a:endParaRPr lang="en-US"/>
           </a:p>
@@ -3687,7 +3694,7 @@
           <a:p>
             <a:fld id="{45D0C44D-65D9-46D4-BB5E-33D5C8D4C21A}" type="datetimeFigureOut">
               <a:rPr lang="en-US" smtClean="0"/>
-              <a:t>4/26/2015</a:t>
+              <a:t>4/27/2015</a:t>
             </a:fld>
             <a:endParaRPr lang="en-US"/>
           </a:p>
@@ -3979,7 +3986,7 @@
           <a:p>
             <a:fld id="{45D0C44D-65D9-46D4-BB5E-33D5C8D4C21A}" type="datetimeFigureOut">
               <a:rPr lang="en-US" smtClean="0"/>
-              <a:t>4/26/2015</a:t>
+              <a:t>4/27/2015</a:t>
             </a:fld>
             <a:endParaRPr lang="en-US"/>
           </a:p>
@@ -4423,7 +4430,7 @@
           <a:p>
             <a:fld id="{45D0C44D-65D9-46D4-BB5E-33D5C8D4C21A}" type="datetimeFigureOut">
               <a:rPr lang="en-US" smtClean="0"/>
-              <a:t>4/26/2015</a:t>
+              <a:t>4/27/2015</a:t>
             </a:fld>
             <a:endParaRPr lang="en-US"/>
           </a:p>
@@ -4541,7 +4548,7 @@
           <a:p>
             <a:fld id="{45D0C44D-65D9-46D4-BB5E-33D5C8D4C21A}" type="datetimeFigureOut">
               <a:rPr lang="en-US" smtClean="0"/>
-              <a:t>4/26/2015</a:t>
+              <a:t>4/27/2015</a:t>
             </a:fld>
             <a:endParaRPr lang="en-US"/>
           </a:p>
@@ -4636,7 +4643,7 @@
           <a:p>
             <a:fld id="{45D0C44D-65D9-46D4-BB5E-33D5C8D4C21A}" type="datetimeFigureOut">
               <a:rPr lang="en-US" smtClean="0"/>
-              <a:t>4/26/2015</a:t>
+              <a:t>4/27/2015</a:t>
             </a:fld>
             <a:endParaRPr lang="en-US"/>
           </a:p>
@@ -4915,7 +4922,7 @@
           <a:p>
             <a:fld id="{45D0C44D-65D9-46D4-BB5E-33D5C8D4C21A}" type="datetimeFigureOut">
               <a:rPr lang="en-US" smtClean="0"/>
-              <a:t>4/26/2015</a:t>
+              <a:t>4/27/2015</a:t>
             </a:fld>
             <a:endParaRPr lang="en-US"/>
           </a:p>
@@ -5190,7 +5197,7 @@
           <a:p>
             <a:fld id="{45D0C44D-65D9-46D4-BB5E-33D5C8D4C21A}" type="datetimeFigureOut">
               <a:rPr lang="en-US" smtClean="0"/>
-              <a:t>4/26/2015</a:t>
+              <a:t>4/27/2015</a:t>
             </a:fld>
             <a:endParaRPr lang="en-US"/>
           </a:p>
@@ -5619,7 +5626,7 @@
           <a:p>
             <a:fld id="{45D0C44D-65D9-46D4-BB5E-33D5C8D4C21A}" type="datetimeFigureOut">
               <a:rPr lang="en-US" smtClean="0"/>
-              <a:t>4/26/2015</a:t>
+              <a:t>4/27/2015</a:t>
             </a:fld>
             <a:endParaRPr lang="en-US"/>
           </a:p>
@@ -9279,7 +9286,15 @@
                   <a:srgbClr val="FFFF00"/>
                 </a:solidFill>
               </a:rPr>
-              <a:t> &gt;= </a:t>
+              <a:t> </a:t>
+            </a:r>
+            <a:r>
+              <a:rPr lang="en-US" dirty="0">
+                <a:solidFill>
+                  <a:srgbClr val="FFFF00"/>
+                </a:solidFill>
+              </a:rPr>
+              <a:t>≥ </a:t>
             </a:r>
             <a:r>
               <a:rPr lang="en-US" dirty="0" err="1" smtClean="0">
@@ -9683,15 +9698,7 @@
             </a:pPr>
             <a:r>
               <a:rPr lang="en-US" dirty="0" smtClean="0"/>
-              <a:t>Output to send through the output method, </a:t>
-            </a:r>
-            <a:r>
-              <a:rPr lang="en-US" dirty="0" smtClean="0"/>
-              <a:t>execute a </a:t>
-            </a:r>
-            <a:r>
-              <a:rPr lang="en-US" dirty="0" smtClean="0"/>
-              <a:t>code action, or nothing.</a:t>
+              <a:t>Output to send through the output method, execute a code action, or nothing.</a:t>
             </a:r>
           </a:p>
           <a:p>
@@ -9701,11 +9708,7 @@
             </a:pPr>
             <a:r>
               <a:rPr lang="en-US" dirty="0" smtClean="0"/>
-              <a:t>Output method to send output specified in the fifth step.  If an action or nothing was provided for the fifth step, this step is empty as well</a:t>
-            </a:r>
-            <a:r>
-              <a:rPr lang="en-US" dirty="0" smtClean="0"/>
-              <a:t>.</a:t>
+              <a:t>Output method to send output specified in the fifth step.  If an action or nothing was provided for the fifth step, this step is empty as well.</a:t>
             </a:r>
           </a:p>
           <a:p>
@@ -9713,7 +9716,6 @@
               <a:rPr lang="en-US" dirty="0" smtClean="0"/>
               <a:t>Actions are executed on transitions.</a:t>
             </a:r>
-            <a:endParaRPr lang="en-US" dirty="0" smtClean="0"/>
           </a:p>
           <a:p>
             <a:endParaRPr lang="en-US" dirty="0"/>
@@ -10896,11 +10898,7 @@
           <a:p>
             <a:r>
               <a:rPr lang="en-US" dirty="0" smtClean="0"/>
-              <a:t>Implementing </a:t>
-            </a:r>
-            <a:r>
-              <a:rPr lang="en-US" dirty="0" smtClean="0"/>
-              <a:t>Tools with TEBNF</a:t>
+              <a:t>Implementing Tools with TEBNF</a:t>
             </a:r>
             <a:endParaRPr lang="en-US" dirty="0"/>
           </a:p>
@@ -10923,15 +10921,7 @@
           <a:p>
             <a:r>
               <a:rPr lang="en-US" dirty="0" smtClean="0"/>
-              <a:t>A real-world example using a TEBNF grammar to parse National </a:t>
-            </a:r>
-            <a:r>
-              <a:rPr lang="en-US" dirty="0" smtClean="0"/>
-              <a:t>Imagery Transmission Format (NITF) 2.1 </a:t>
-            </a:r>
-            <a:r>
-              <a:rPr lang="en-US" dirty="0" smtClean="0"/>
-              <a:t>data</a:t>
+              <a:t>A real-world example using a TEBNF grammar to parse National Imagery Transmission Format (NITF) 2.1 data</a:t>
             </a:r>
           </a:p>
           <a:p>
@@ -11055,11 +11045,7 @@
             </a:r>
             <a:r>
               <a:rPr lang="en-US" dirty="0" smtClean="0"/>
-              <a:t>imagery</a:t>
-            </a:r>
-            <a:r>
-              <a:rPr lang="en-US" dirty="0" smtClean="0"/>
-              <a:t>.</a:t>
+              <a:t>imagery.</a:t>
             </a:r>
           </a:p>
           <a:p>
@@ -11067,7 +11053,6 @@
               <a:rPr lang="en-US" dirty="0" smtClean="0"/>
               <a:t>Used by members of the intelligence community (e.g. US Department of Defense) as an interoperable means of transmission or storage of imagery data.</a:t>
             </a:r>
-            <a:endParaRPr lang="en-US" dirty="0" smtClean="0"/>
           </a:p>
           <a:p>
             <a:r>
@@ -14112,11 +14097,7 @@
             </a:r>
             <a:r>
               <a:rPr lang="en-US" dirty="0"/>
-              <a:t>entire </a:t>
-            </a:r>
-            <a:r>
-              <a:rPr lang="en-US" dirty="0"/>
-              <a:t>file </a:t>
+              <a:t>entire file </a:t>
             </a:r>
             <a:r>
               <a:rPr lang="en-US" dirty="0" smtClean="0"/>
@@ -14138,11 +14119,7 @@
             </a:r>
             <a:r>
               <a:rPr lang="en-US" dirty="0"/>
-              <a:t>that </a:t>
-            </a:r>
-            <a:r>
-              <a:rPr lang="en-US" dirty="0"/>
-              <a:t>file </a:t>
+              <a:t>that file </a:t>
             </a:r>
             <a:r>
               <a:rPr lang="en-US" dirty="0" smtClean="0"/>
@@ -14182,7 +14159,6 @@
               <a:rPr lang="en-US" dirty="0"/>
               <a:t>.</a:t>
             </a:r>
-            <a:endParaRPr lang="en-US" dirty="0"/>
           </a:p>
         </p:txBody>
       </p:sp>
@@ -15218,7 +15194,6 @@
               <a:rPr lang="en-US" dirty="0"/>
               <a:t>.</a:t>
             </a:r>
-            <a:endParaRPr lang="en-US" dirty="0"/>
           </a:p>
         </p:txBody>
       </p:sp>
@@ -16291,7 +16266,7 @@
           <p:nvPr>
             <p:extLst>
               <p:ext uri="{D42A27DB-BD31-4B8C-83A1-F6EECF244321}">
-                <p14:modId xmlns:p14="http://schemas.microsoft.com/office/powerpoint/2010/main" val="1187456740"/>
+                <p14:modId xmlns:p14="http://schemas.microsoft.com/office/powerpoint/2010/main" val="776439672"/>
               </p:ext>
             </p:extLst>
           </p:nvPr>
@@ -16304,7 +16279,7 @@
           <a:graphicData uri="http://schemas.openxmlformats.org/drawingml/2006/table">
             <a:tbl>
               <a:tblPr firstRow="1" bandRow="1">
-                <a:tableStyleId>{5C22544A-7EE6-4342-B048-85BDC9FD1C3A}</a:tableStyleId>
+                <a:tableStyleId>{616DA210-FB5B-4158-B5E0-FEB733F419BA}</a:tableStyleId>
               </a:tblPr>
               <a:tblGrid>
                 <a:gridCol w="1984830"/>
@@ -16509,7 +16484,7 @@
           <p:nvPr>
             <p:extLst>
               <p:ext uri="{D42A27DB-BD31-4B8C-83A1-F6EECF244321}">
-                <p14:modId xmlns:p14="http://schemas.microsoft.com/office/powerpoint/2010/main" val="3174631975"/>
+                <p14:modId xmlns:p14="http://schemas.microsoft.com/office/powerpoint/2010/main" val="2032919494"/>
               </p:ext>
             </p:extLst>
           </p:nvPr>
@@ -16522,7 +16497,7 @@
           <a:graphicData uri="http://schemas.openxmlformats.org/drawingml/2006/table">
             <a:tbl>
               <a:tblPr firstRow="1" bandRow="1">
-                <a:tableStyleId>{5C22544A-7EE6-4342-B048-85BDC9FD1C3A}</a:tableStyleId>
+                <a:tableStyleId>{616DA210-FB5B-4158-B5E0-FEB733F419BA}</a:tableStyleId>
               </a:tblPr>
               <a:tblGrid>
                 <a:gridCol w="1812473"/>
@@ -16895,7 +16870,77 @@
           <a:bodyPr/>
           <a:lstStyle/>
           <a:p>
-            <a:endParaRPr lang="en-US"/>
+            <a:r>
+              <a:rPr lang="en-US" dirty="0" smtClean="0"/>
+              <a:t>Used Lizard tool to analyze code generated for each test case.</a:t>
+            </a:r>
+          </a:p>
+          <a:p>
+            <a:r>
+              <a:rPr lang="en-US" dirty="0" smtClean="0"/>
+              <a:t>Metrics acquired from Lizard for each test case:</a:t>
+            </a:r>
+          </a:p>
+          <a:p>
+            <a:pPr lvl="1"/>
+            <a:r>
+              <a:rPr lang="en-US" dirty="0" smtClean="0"/>
+              <a:t>Average </a:t>
+            </a:r>
+            <a:r>
+              <a:rPr lang="en-US" dirty="0" err="1" smtClean="0"/>
+              <a:t>Cyclomatic</a:t>
+            </a:r>
+            <a:r>
+              <a:rPr lang="en-US" dirty="0" smtClean="0"/>
+              <a:t> Complexity Number (CCN) per function.</a:t>
+            </a:r>
+          </a:p>
+          <a:p>
+            <a:pPr lvl="1"/>
+            <a:r>
+              <a:rPr lang="en-US" dirty="0" smtClean="0"/>
+              <a:t>Average token count </a:t>
+            </a:r>
+            <a:r>
+              <a:rPr lang="en-US" dirty="0"/>
+              <a:t>per </a:t>
+            </a:r>
+            <a:r>
+              <a:rPr lang="en-US" dirty="0" smtClean="0"/>
+              <a:t>function.</a:t>
+            </a:r>
+          </a:p>
+          <a:p>
+            <a:r>
+              <a:rPr lang="en-US" dirty="0" err="1" smtClean="0"/>
+              <a:t>Cyclomatic</a:t>
+            </a:r>
+            <a:r>
+              <a:rPr lang="en-US" dirty="0" smtClean="0"/>
+              <a:t> complexity has been employed to predict the presence of defects in code.</a:t>
+            </a:r>
+          </a:p>
+          <a:p>
+            <a:pPr lvl="1"/>
+            <a:r>
+              <a:rPr lang="en-US" dirty="0" smtClean="0"/>
+              <a:t>CCN </a:t>
+            </a:r>
+            <a:r>
+              <a:rPr lang="en-US" dirty="0"/>
+              <a:t>values ≤ </a:t>
+            </a:r>
+            <a:r>
+              <a:rPr lang="en-US" dirty="0" smtClean="0"/>
+              <a:t>10 fit into the low risk category.</a:t>
+            </a:r>
+          </a:p>
+          <a:p>
+            <a:endParaRPr lang="en-US" dirty="0" smtClean="0"/>
+          </a:p>
+          <a:p>
+            <a:endParaRPr lang="en-US" dirty="0"/>
           </a:p>
         </p:txBody>
       </p:sp>
@@ -16903,6 +16948,856 @@
     <p:extLst>
       <p:ext uri="{BB962C8B-B14F-4D97-AF65-F5344CB8AC3E}">
         <p14:creationId xmlns:p14="http://schemas.microsoft.com/office/powerpoint/2010/main" val="644461657"/>
+      </p:ext>
+    </p:extLst>
+  </p:cSld>
+  <p:clrMapOvr>
+    <a:masterClrMapping/>
+  </p:clrMapOvr>
+  <p:timing>
+    <p:tnLst>
+      <p:par>
+        <p:cTn id="1" dur="indefinite" restart="never" nodeType="tmRoot"/>
+      </p:par>
+    </p:tnLst>
+  </p:timing>
+</p:sld>
+</file>
+
+<file path=ppt/slides/slide58.xml><?xml version="1.0" encoding="utf-8"?>
+<p:sld xmlns:a="http://schemas.openxmlformats.org/drawingml/2006/main" xmlns:r="http://schemas.openxmlformats.org/officeDocument/2006/relationships" xmlns:p="http://schemas.openxmlformats.org/presentationml/2006/main">
+  <p:cSld>
+    <p:spTree>
+      <p:nvGrpSpPr>
+        <p:cNvPr id="1" name=""/>
+        <p:cNvGrpSpPr/>
+        <p:nvPr/>
+      </p:nvGrpSpPr>
+      <p:grpSpPr>
+        <a:xfrm>
+          <a:off x="0" y="0"/>
+          <a:ext cx="0" cy="0"/>
+          <a:chOff x="0" y="0"/>
+          <a:chExt cx="0" cy="0"/>
+        </a:xfrm>
+      </p:grpSpPr>
+      <p:sp>
+        <p:nvSpPr>
+          <p:cNvPr id="2" name="Title 1"/>
+          <p:cNvSpPr>
+            <a:spLocks noGrp="1"/>
+          </p:cNvSpPr>
+          <p:nvPr>
+            <p:ph type="title"/>
+          </p:nvPr>
+        </p:nvSpPr>
+        <p:spPr/>
+        <p:txBody>
+          <a:bodyPr/>
+          <a:lstStyle/>
+          <a:p>
+            <a:r>
+              <a:rPr lang="en-US" dirty="0" smtClean="0"/>
+              <a:t>Analysis Results</a:t>
+            </a:r>
+            <a:endParaRPr lang="en-US" dirty="0"/>
+          </a:p>
+        </p:txBody>
+      </p:sp>
+      <p:graphicFrame>
+        <p:nvGraphicFramePr>
+          <p:cNvPr id="4" name="Table 3"/>
+          <p:cNvGraphicFramePr>
+            <a:graphicFrameLocks noGrp="1"/>
+          </p:cNvGraphicFramePr>
+          <p:nvPr>
+            <p:extLst>
+              <p:ext uri="{D42A27DB-BD31-4B8C-83A1-F6EECF244321}">
+                <p14:modId xmlns:p14="http://schemas.microsoft.com/office/powerpoint/2010/main" val="1574126998"/>
+              </p:ext>
+            </p:extLst>
+          </p:nvPr>
+        </p:nvGraphicFramePr>
+        <p:xfrm>
+          <a:off x="1429880" y="1558570"/>
+          <a:ext cx="8935213" cy="1381760"/>
+        </p:xfrm>
+        <a:graphic>
+          <a:graphicData uri="http://schemas.openxmlformats.org/drawingml/2006/table">
+            <a:tbl>
+              <a:tblPr firstRow="1" bandRow="1">
+                <a:tableStyleId>{616DA210-FB5B-4158-B5E0-FEB733F419BA}</a:tableStyleId>
+              </a:tblPr>
+              <a:tblGrid>
+                <a:gridCol w="2013520"/>
+                <a:gridCol w="1560564"/>
+                <a:gridCol w="1787043"/>
+                <a:gridCol w="1787043"/>
+                <a:gridCol w="1787043"/>
+              </a:tblGrid>
+              <a:tr h="370840">
+                <a:tc>
+                  <a:txBody>
+                    <a:bodyPr/>
+                    <a:lstStyle/>
+                    <a:p>
+                      <a:r>
+                        <a:rPr lang="en-US" b="1" dirty="0" smtClean="0"/>
+                        <a:t>NITF</a:t>
+                      </a:r>
+                      <a:r>
+                        <a:rPr lang="en-US" b="1" baseline="0" dirty="0" smtClean="0"/>
+                        <a:t> File Client </a:t>
+                      </a:r>
+                      <a:r>
+                        <a:rPr lang="en-US" dirty="0" smtClean="0"/>
+                        <a:t>Test Case</a:t>
+                      </a:r>
+                      <a:endParaRPr lang="en-US" dirty="0"/>
+                    </a:p>
+                  </a:txBody>
+                  <a:tcPr/>
+                </a:tc>
+                <a:tc>
+                  <a:txBody>
+                    <a:bodyPr/>
+                    <a:lstStyle/>
+                    <a:p>
+                      <a:r>
+                        <a:rPr lang="en-US" dirty="0" smtClean="0"/>
+                        <a:t>Average </a:t>
+                      </a:r>
+                      <a:r>
+                        <a:rPr lang="en-US" baseline="0" dirty="0" smtClean="0"/>
+                        <a:t>CCN</a:t>
+                      </a:r>
+                      <a:endParaRPr lang="en-US" dirty="0"/>
+                    </a:p>
+                  </a:txBody>
+                  <a:tcPr/>
+                </a:tc>
+                <a:tc>
+                  <a:txBody>
+                    <a:bodyPr/>
+                    <a:lstStyle/>
+                    <a:p>
+                      <a:r>
+                        <a:rPr lang="en-US" dirty="0" smtClean="0"/>
+                        <a:t>Upper Limit of IQR (U</a:t>
+                      </a:r>
+                      <a:r>
+                        <a:rPr lang="en-US" baseline="-25000" dirty="0" smtClean="0"/>
+                        <a:t>CCN</a:t>
+                      </a:r>
+                      <a:r>
+                        <a:rPr lang="en-US" baseline="0" dirty="0" smtClean="0"/>
+                        <a:t>)</a:t>
+                      </a:r>
+                      <a:endParaRPr lang="en-US" baseline="0" dirty="0"/>
+                    </a:p>
+                  </a:txBody>
+                  <a:tcPr/>
+                </a:tc>
+                <a:tc>
+                  <a:txBody>
+                    <a:bodyPr/>
+                    <a:lstStyle/>
+                    <a:p>
+                      <a:r>
+                        <a:rPr lang="en-US" dirty="0" smtClean="0"/>
+                        <a:t>Average Token Count</a:t>
+                      </a:r>
+                      <a:endParaRPr lang="en-US" dirty="0"/>
+                    </a:p>
+                  </a:txBody>
+                  <a:tcPr/>
+                </a:tc>
+                <a:tc>
+                  <a:txBody>
+                    <a:bodyPr/>
+                    <a:lstStyle/>
+                    <a:p>
+                      <a:r>
+                        <a:rPr lang="en-US" dirty="0" smtClean="0"/>
+                        <a:t>Function </a:t>
+                      </a:r>
+                    </a:p>
+                    <a:p>
+                      <a:r>
+                        <a:rPr lang="en-US" dirty="0" smtClean="0"/>
+                        <a:t>Count</a:t>
+                      </a:r>
+                      <a:endParaRPr lang="en-US" dirty="0"/>
+                    </a:p>
+                  </a:txBody>
+                  <a:tcPr/>
+                </a:tc>
+              </a:tr>
+              <a:tr h="370840">
+                <a:tc>
+                  <a:txBody>
+                    <a:bodyPr/>
+                    <a:lstStyle/>
+                    <a:p>
+                      <a:r>
+                        <a:rPr lang="en-US" dirty="0" smtClean="0"/>
+                        <a:t>Generated</a:t>
+                      </a:r>
+                      <a:endParaRPr lang="en-US" dirty="0"/>
+                    </a:p>
+                  </a:txBody>
+                  <a:tcPr/>
+                </a:tc>
+                <a:tc>
+                  <a:txBody>
+                    <a:bodyPr/>
+                    <a:lstStyle/>
+                    <a:p>
+                      <a:r>
+                        <a:rPr lang="en-US" dirty="0" smtClean="0">
+                          <a:solidFill>
+                            <a:srgbClr val="FFFF00"/>
+                          </a:solidFill>
+                        </a:rPr>
+                        <a:t>2.00</a:t>
+                      </a:r>
+                      <a:endParaRPr lang="en-US" dirty="0">
+                        <a:solidFill>
+                          <a:srgbClr val="FFFF00"/>
+                        </a:solidFill>
+                      </a:endParaRPr>
+                    </a:p>
+                  </a:txBody>
+                  <a:tcPr/>
+                </a:tc>
+                <a:tc>
+                  <a:txBody>
+                    <a:bodyPr/>
+                    <a:lstStyle/>
+                    <a:p>
+                      <a:r>
+                        <a:rPr lang="en-US" dirty="0" smtClean="0"/>
+                        <a:t>3</a:t>
+                      </a:r>
+                      <a:endParaRPr lang="en-US" dirty="0"/>
+                    </a:p>
+                  </a:txBody>
+                  <a:tcPr/>
+                </a:tc>
+                <a:tc>
+                  <a:txBody>
+                    <a:bodyPr/>
+                    <a:lstStyle/>
+                    <a:p>
+                      <a:r>
+                        <a:rPr lang="en-US" dirty="0" smtClean="0"/>
+                        <a:t>54.49</a:t>
+                      </a:r>
+                      <a:endParaRPr lang="en-US" dirty="0"/>
+                    </a:p>
+                  </a:txBody>
+                  <a:tcPr/>
+                </a:tc>
+                <a:tc>
+                  <a:txBody>
+                    <a:bodyPr/>
+                    <a:lstStyle/>
+                    <a:p>
+                      <a:r>
+                        <a:rPr lang="en-US" dirty="0" smtClean="0"/>
+                        <a:t>136</a:t>
+                      </a:r>
+                      <a:endParaRPr lang="en-US" dirty="0"/>
+                    </a:p>
+                  </a:txBody>
+                  <a:tcPr/>
+                </a:tc>
+              </a:tr>
+              <a:tr h="370840">
+                <a:tc>
+                  <a:txBody>
+                    <a:bodyPr/>
+                    <a:lstStyle/>
+                    <a:p>
+                      <a:r>
+                        <a:rPr lang="en-US" dirty="0" smtClean="0"/>
+                        <a:t>Non-generated</a:t>
+                      </a:r>
+                      <a:endParaRPr lang="en-US" dirty="0"/>
+                    </a:p>
+                  </a:txBody>
+                  <a:tcPr/>
+                </a:tc>
+                <a:tc>
+                  <a:txBody>
+                    <a:bodyPr/>
+                    <a:lstStyle/>
+                    <a:p>
+                      <a:r>
+                        <a:rPr lang="en-US" dirty="0" smtClean="0"/>
+                        <a:t>3.38</a:t>
+                      </a:r>
+                      <a:endParaRPr lang="en-US" dirty="0"/>
+                    </a:p>
+                  </a:txBody>
+                  <a:tcPr/>
+                </a:tc>
+                <a:tc>
+                  <a:txBody>
+                    <a:bodyPr/>
+                    <a:lstStyle/>
+                    <a:p>
+                      <a:r>
+                        <a:rPr lang="en-US" dirty="0" smtClean="0"/>
+                        <a:t>6</a:t>
+                      </a:r>
+                      <a:endParaRPr lang="en-US" dirty="0"/>
+                    </a:p>
+                  </a:txBody>
+                  <a:tcPr/>
+                </a:tc>
+                <a:tc>
+                  <a:txBody>
+                    <a:bodyPr/>
+                    <a:lstStyle/>
+                    <a:p>
+                      <a:r>
+                        <a:rPr lang="en-US" dirty="0" smtClean="0"/>
+                        <a:t>101.81</a:t>
+                      </a:r>
+                      <a:endParaRPr lang="en-US" dirty="0"/>
+                    </a:p>
+                  </a:txBody>
+                  <a:tcPr/>
+                </a:tc>
+                <a:tc>
+                  <a:txBody>
+                    <a:bodyPr/>
+                    <a:lstStyle/>
+                    <a:p>
+                      <a:r>
+                        <a:rPr lang="en-US" dirty="0" smtClean="0"/>
+                        <a:t>16</a:t>
+                      </a:r>
+                      <a:endParaRPr lang="en-US" dirty="0"/>
+                    </a:p>
+                  </a:txBody>
+                  <a:tcPr/>
+                </a:tc>
+              </a:tr>
+            </a:tbl>
+          </a:graphicData>
+        </a:graphic>
+      </p:graphicFrame>
+      <p:graphicFrame>
+        <p:nvGraphicFramePr>
+          <p:cNvPr id="6" name="Table 5"/>
+          <p:cNvGraphicFramePr>
+            <a:graphicFrameLocks noGrp="1"/>
+          </p:cNvGraphicFramePr>
+          <p:nvPr>
+            <p:extLst>
+              <p:ext uri="{D42A27DB-BD31-4B8C-83A1-F6EECF244321}">
+                <p14:modId xmlns:p14="http://schemas.microsoft.com/office/powerpoint/2010/main" val="1668912648"/>
+              </p:ext>
+            </p:extLst>
+          </p:nvPr>
+        </p:nvGraphicFramePr>
+        <p:xfrm>
+          <a:off x="1429882" y="3717827"/>
+          <a:ext cx="8927259" cy="1381760"/>
+        </p:xfrm>
+        <a:graphic>
+          <a:graphicData uri="http://schemas.openxmlformats.org/drawingml/2006/table">
+            <a:tbl>
+              <a:tblPr firstRow="1" bandRow="1">
+                <a:tableStyleId>{616DA210-FB5B-4158-B5E0-FEB733F419BA}</a:tableStyleId>
+              </a:tblPr>
+              <a:tblGrid>
+                <a:gridCol w="2011728"/>
+                <a:gridCol w="1559175"/>
+                <a:gridCol w="1785452"/>
+                <a:gridCol w="1785452"/>
+                <a:gridCol w="1785452"/>
+              </a:tblGrid>
+              <a:tr h="370840">
+                <a:tc>
+                  <a:txBody>
+                    <a:bodyPr/>
+                    <a:lstStyle/>
+                    <a:p>
+                      <a:r>
+                        <a:rPr lang="en-US" b="1" dirty="0" smtClean="0"/>
+                        <a:t>Calculator </a:t>
+                      </a:r>
+                    </a:p>
+                    <a:p>
+                      <a:r>
+                        <a:rPr lang="en-US" dirty="0" smtClean="0"/>
+                        <a:t>Test Case</a:t>
+                      </a:r>
+                      <a:endParaRPr lang="en-US" dirty="0"/>
+                    </a:p>
+                  </a:txBody>
+                  <a:tcPr/>
+                </a:tc>
+                <a:tc>
+                  <a:txBody>
+                    <a:bodyPr/>
+                    <a:lstStyle/>
+                    <a:p>
+                      <a:r>
+                        <a:rPr lang="en-US" dirty="0" smtClean="0"/>
+                        <a:t>Average </a:t>
+                      </a:r>
+                      <a:r>
+                        <a:rPr lang="en-US" baseline="0" dirty="0" smtClean="0"/>
+                        <a:t>CCN</a:t>
+                      </a:r>
+                      <a:endParaRPr lang="en-US" dirty="0"/>
+                    </a:p>
+                  </a:txBody>
+                  <a:tcPr/>
+                </a:tc>
+                <a:tc>
+                  <a:txBody>
+                    <a:bodyPr/>
+                    <a:lstStyle/>
+                    <a:p>
+                      <a:pPr marL="0" marR="0" indent="0" algn="l" defTabSz="457200" rtl="0" eaLnBrk="1" fontAlgn="auto" latinLnBrk="0" hangingPunct="1">
+                        <a:lnSpc>
+                          <a:spcPct val="100000"/>
+                        </a:lnSpc>
+                        <a:spcBef>
+                          <a:spcPts val="0"/>
+                        </a:spcBef>
+                        <a:spcAft>
+                          <a:spcPts val="0"/>
+                        </a:spcAft>
+                        <a:buClrTx/>
+                        <a:buSzTx/>
+                        <a:buFontTx/>
+                        <a:buNone/>
+                        <a:tabLst/>
+                        <a:defRPr/>
+                      </a:pPr>
+                      <a:r>
+                        <a:rPr lang="en-US" dirty="0" smtClean="0"/>
+                        <a:t>Upper Limit of IQR (U</a:t>
+                      </a:r>
+                      <a:r>
+                        <a:rPr lang="en-US" baseline="-25000" dirty="0" smtClean="0"/>
+                        <a:t>CCN</a:t>
+                      </a:r>
+                      <a:r>
+                        <a:rPr lang="en-US" baseline="0" dirty="0" smtClean="0"/>
+                        <a:t>)</a:t>
+                      </a:r>
+                      <a:endParaRPr lang="en-US" baseline="-25000" dirty="0"/>
+                    </a:p>
+                  </a:txBody>
+                  <a:tcPr/>
+                </a:tc>
+                <a:tc>
+                  <a:txBody>
+                    <a:bodyPr/>
+                    <a:lstStyle/>
+                    <a:p>
+                      <a:r>
+                        <a:rPr lang="en-US" dirty="0" smtClean="0"/>
+                        <a:t>Average Token Count</a:t>
+                      </a:r>
+                      <a:endParaRPr lang="en-US" dirty="0"/>
+                    </a:p>
+                  </a:txBody>
+                  <a:tcPr/>
+                </a:tc>
+                <a:tc>
+                  <a:txBody>
+                    <a:bodyPr/>
+                    <a:lstStyle/>
+                    <a:p>
+                      <a:r>
+                        <a:rPr lang="en-US" dirty="0" smtClean="0"/>
+                        <a:t>Function </a:t>
+                      </a:r>
+                    </a:p>
+                    <a:p>
+                      <a:r>
+                        <a:rPr lang="en-US" dirty="0" smtClean="0"/>
+                        <a:t>Count</a:t>
+                      </a:r>
+                      <a:endParaRPr lang="en-US" dirty="0"/>
+                    </a:p>
+                  </a:txBody>
+                  <a:tcPr/>
+                </a:tc>
+              </a:tr>
+              <a:tr h="370840">
+                <a:tc>
+                  <a:txBody>
+                    <a:bodyPr/>
+                    <a:lstStyle/>
+                    <a:p>
+                      <a:r>
+                        <a:rPr lang="en-US" dirty="0" smtClean="0"/>
+                        <a:t>Generated</a:t>
+                      </a:r>
+                      <a:endParaRPr lang="en-US" dirty="0"/>
+                    </a:p>
+                  </a:txBody>
+                  <a:tcPr/>
+                </a:tc>
+                <a:tc>
+                  <a:txBody>
+                    <a:bodyPr/>
+                    <a:lstStyle/>
+                    <a:p>
+                      <a:r>
+                        <a:rPr lang="en-US" dirty="0" smtClean="0">
+                          <a:solidFill>
+                            <a:srgbClr val="FFFF00"/>
+                          </a:solidFill>
+                        </a:rPr>
+                        <a:t>1.89</a:t>
+                      </a:r>
+                      <a:endParaRPr lang="en-US" dirty="0">
+                        <a:solidFill>
+                          <a:srgbClr val="FFFF00"/>
+                        </a:solidFill>
+                      </a:endParaRPr>
+                    </a:p>
+                  </a:txBody>
+                  <a:tcPr/>
+                </a:tc>
+                <a:tc>
+                  <a:txBody>
+                    <a:bodyPr/>
+                    <a:lstStyle/>
+                    <a:p>
+                      <a:r>
+                        <a:rPr lang="en-US" dirty="0" smtClean="0"/>
+                        <a:t>3</a:t>
+                      </a:r>
+                      <a:endParaRPr lang="en-US" dirty="0"/>
+                    </a:p>
+                  </a:txBody>
+                  <a:tcPr/>
+                </a:tc>
+                <a:tc>
+                  <a:txBody>
+                    <a:bodyPr/>
+                    <a:lstStyle/>
+                    <a:p>
+                      <a:r>
+                        <a:rPr lang="en-US" dirty="0" smtClean="0"/>
+                        <a:t>49.50</a:t>
+                      </a:r>
+                      <a:endParaRPr lang="en-US" dirty="0"/>
+                    </a:p>
+                  </a:txBody>
+                  <a:tcPr/>
+                </a:tc>
+                <a:tc>
+                  <a:txBody>
+                    <a:bodyPr/>
+                    <a:lstStyle/>
+                    <a:p>
+                      <a:r>
+                        <a:rPr lang="en-US" dirty="0" smtClean="0"/>
+                        <a:t>135</a:t>
+                      </a:r>
+                      <a:endParaRPr lang="en-US" dirty="0"/>
+                    </a:p>
+                  </a:txBody>
+                  <a:tcPr/>
+                </a:tc>
+              </a:tr>
+              <a:tr h="370840">
+                <a:tc>
+                  <a:txBody>
+                    <a:bodyPr/>
+                    <a:lstStyle/>
+                    <a:p>
+                      <a:r>
+                        <a:rPr lang="en-US" dirty="0" smtClean="0"/>
+                        <a:t>Non-generated</a:t>
+                      </a:r>
+                      <a:endParaRPr lang="en-US" dirty="0"/>
+                    </a:p>
+                  </a:txBody>
+                  <a:tcPr/>
+                </a:tc>
+                <a:tc>
+                  <a:txBody>
+                    <a:bodyPr/>
+                    <a:lstStyle/>
+                    <a:p>
+                      <a:r>
+                        <a:rPr lang="en-US" dirty="0" smtClean="0"/>
+                        <a:t>3.42</a:t>
+                      </a:r>
+                      <a:endParaRPr lang="en-US" dirty="0"/>
+                    </a:p>
+                  </a:txBody>
+                  <a:tcPr/>
+                </a:tc>
+                <a:tc>
+                  <a:txBody>
+                    <a:bodyPr/>
+                    <a:lstStyle/>
+                    <a:p>
+                      <a:r>
+                        <a:rPr lang="en-US" dirty="0" smtClean="0"/>
+                        <a:t>7</a:t>
+                      </a:r>
+                      <a:endParaRPr lang="en-US" dirty="0"/>
+                    </a:p>
+                  </a:txBody>
+                  <a:tcPr/>
+                </a:tc>
+                <a:tc>
+                  <a:txBody>
+                    <a:bodyPr/>
+                    <a:lstStyle/>
+                    <a:p>
+                      <a:r>
+                        <a:rPr lang="en-US" dirty="0" smtClean="0"/>
+                        <a:t>81.42</a:t>
+                      </a:r>
+                      <a:endParaRPr lang="en-US" dirty="0"/>
+                    </a:p>
+                  </a:txBody>
+                  <a:tcPr/>
+                </a:tc>
+                <a:tc>
+                  <a:txBody>
+                    <a:bodyPr/>
+                    <a:lstStyle/>
+                    <a:p>
+                      <a:r>
+                        <a:rPr lang="en-US" dirty="0" smtClean="0"/>
+                        <a:t>12</a:t>
+                      </a:r>
+                      <a:endParaRPr lang="en-US" dirty="0"/>
+                    </a:p>
+                  </a:txBody>
+                  <a:tcPr/>
+                </a:tc>
+              </a:tr>
+            </a:tbl>
+          </a:graphicData>
+        </a:graphic>
+      </p:graphicFrame>
+    </p:spTree>
+    <p:extLst>
+      <p:ext uri="{BB962C8B-B14F-4D97-AF65-F5344CB8AC3E}">
+        <p14:creationId xmlns:p14="http://schemas.microsoft.com/office/powerpoint/2010/main" val="596572270"/>
+      </p:ext>
+    </p:extLst>
+  </p:cSld>
+  <p:clrMapOvr>
+    <a:masterClrMapping/>
+  </p:clrMapOvr>
+  <p:timing>
+    <p:tnLst>
+      <p:par>
+        <p:cTn id="1" dur="indefinite" restart="never" nodeType="tmRoot"/>
+      </p:par>
+    </p:tnLst>
+  </p:timing>
+</p:sld>
+</file>
+
+<file path=ppt/slides/slide59.xml><?xml version="1.0" encoding="utf-8"?>
+<p:sld xmlns:a="http://schemas.openxmlformats.org/drawingml/2006/main" xmlns:r="http://schemas.openxmlformats.org/officeDocument/2006/relationships" xmlns:p="http://schemas.openxmlformats.org/presentationml/2006/main">
+  <p:cSld>
+    <p:spTree>
+      <p:nvGrpSpPr>
+        <p:cNvPr id="1" name=""/>
+        <p:cNvGrpSpPr/>
+        <p:nvPr/>
+      </p:nvGrpSpPr>
+      <p:grpSpPr>
+        <a:xfrm>
+          <a:off x="0" y="0"/>
+          <a:ext cx="0" cy="0"/>
+          <a:chOff x="0" y="0"/>
+          <a:chExt cx="0" cy="0"/>
+        </a:xfrm>
+      </p:grpSpPr>
+      <p:sp>
+        <p:nvSpPr>
+          <p:cNvPr id="2" name="Title 1"/>
+          <p:cNvSpPr>
+            <a:spLocks noGrp="1"/>
+          </p:cNvSpPr>
+          <p:nvPr>
+            <p:ph type="title"/>
+          </p:nvPr>
+        </p:nvSpPr>
+        <p:spPr/>
+        <p:txBody>
+          <a:bodyPr/>
+          <a:lstStyle/>
+          <a:p>
+            <a:r>
+              <a:rPr lang="en-US" dirty="0" smtClean="0"/>
+              <a:t>Analysis </a:t>
+            </a:r>
+            <a:r>
+              <a:rPr lang="en-US" dirty="0" smtClean="0"/>
+              <a:t>Conclusions</a:t>
+            </a:r>
+            <a:endParaRPr lang="en-US" dirty="0"/>
+          </a:p>
+        </p:txBody>
+      </p:sp>
+      <p:sp>
+        <p:nvSpPr>
+          <p:cNvPr id="3" name="Content Placeholder 2"/>
+          <p:cNvSpPr>
+            <a:spLocks noGrp="1"/>
+          </p:cNvSpPr>
+          <p:nvPr>
+            <p:ph idx="1"/>
+          </p:nvPr>
+        </p:nvSpPr>
+        <p:spPr/>
+        <p:txBody>
+          <a:bodyPr>
+            <a:normAutofit/>
+          </a:bodyPr>
+          <a:lstStyle/>
+          <a:p>
+            <a:r>
+              <a:rPr lang="en-US" b="1" dirty="0" smtClean="0"/>
+              <a:t>Non-generated </a:t>
+            </a:r>
+            <a:r>
+              <a:rPr lang="en-US" b="1" dirty="0"/>
+              <a:t>test cases are comparable to their generated </a:t>
+            </a:r>
+            <a:r>
+              <a:rPr lang="en-US" b="1" dirty="0" smtClean="0"/>
+              <a:t>counterparts</a:t>
+            </a:r>
+            <a:r>
+              <a:rPr lang="en-US" dirty="0"/>
+              <a:t> </a:t>
+            </a:r>
+            <a:r>
+              <a:rPr lang="en-US" dirty="0" smtClean="0"/>
+              <a:t>because:</a:t>
+            </a:r>
+          </a:p>
+          <a:p>
+            <a:pPr lvl="1"/>
+            <a:r>
+              <a:rPr lang="en-US" dirty="0" smtClean="0"/>
+              <a:t>Non-generated </a:t>
+            </a:r>
+            <a:r>
+              <a:rPr lang="en-US" dirty="0"/>
+              <a:t>test cases were built </a:t>
+            </a:r>
+            <a:r>
+              <a:rPr lang="en-US" dirty="0" smtClean="0"/>
+              <a:t>specifically to mimic the </a:t>
+            </a:r>
+            <a:r>
+              <a:rPr lang="en-US" dirty="0"/>
+              <a:t>behavior of the generated test </a:t>
+            </a:r>
+            <a:r>
+              <a:rPr lang="en-US" dirty="0" smtClean="0"/>
+              <a:t>cases</a:t>
+            </a:r>
+          </a:p>
+          <a:p>
+            <a:pPr lvl="1"/>
+            <a:r>
+              <a:rPr lang="en-US" dirty="0" smtClean="0"/>
+              <a:t>The </a:t>
+            </a:r>
+            <a:r>
+              <a:rPr lang="en-US" dirty="0"/>
+              <a:t>average CCN values for all of the test </a:t>
+            </a:r>
+            <a:r>
+              <a:rPr lang="en-US" dirty="0" smtClean="0"/>
+              <a:t>cases fall </a:t>
+            </a:r>
+            <a:r>
+              <a:rPr lang="en-US" dirty="0"/>
+              <a:t>into the low risk category, </a:t>
+            </a:r>
+            <a:endParaRPr lang="en-US" dirty="0" smtClean="0"/>
+          </a:p>
+          <a:p>
+            <a:pPr lvl="1"/>
+            <a:r>
+              <a:rPr lang="en-US" dirty="0"/>
+              <a:t>The average CCN values for all of the test cases </a:t>
+            </a:r>
+            <a:r>
+              <a:rPr lang="en-US" dirty="0" smtClean="0"/>
+              <a:t>are close </a:t>
+            </a:r>
+            <a:r>
+              <a:rPr lang="en-US" dirty="0"/>
+              <a:t>to one another in </a:t>
+            </a:r>
+            <a:r>
+              <a:rPr lang="en-US" dirty="0" smtClean="0"/>
+              <a:t>value</a:t>
+            </a:r>
+          </a:p>
+          <a:p>
+            <a:pPr lvl="1"/>
+            <a:r>
+              <a:rPr lang="en-US" dirty="0" smtClean="0"/>
+              <a:t>Leads to likely conclusion that none of the test cases were purposely made worse than the others.</a:t>
+            </a:r>
+            <a:endParaRPr lang="en-US" dirty="0" smtClean="0"/>
+          </a:p>
+          <a:p>
+            <a:pPr marL="457200" indent="-457200">
+              <a:buFont typeface="+mj-lt"/>
+              <a:buAutoNum type="arabicPeriod"/>
+            </a:pPr>
+            <a:endParaRPr lang="en-US" b="1" dirty="0" smtClean="0"/>
+          </a:p>
+          <a:p>
+            <a:pPr marL="457200" indent="-457200">
+              <a:buFont typeface="+mj-lt"/>
+              <a:buAutoNum type="arabicPeriod"/>
+            </a:pPr>
+            <a:endParaRPr lang="en-US" b="1" dirty="0" smtClean="0"/>
+          </a:p>
+          <a:p>
+            <a:pPr marL="457200" indent="-457200">
+              <a:buFont typeface="+mj-lt"/>
+              <a:buAutoNum type="arabicPeriod"/>
+            </a:pPr>
+            <a:endParaRPr lang="en-US" b="1" dirty="0" smtClean="0"/>
+          </a:p>
+          <a:p>
+            <a:pPr marL="0" indent="0">
+              <a:buNone/>
+            </a:pPr>
+            <a:endParaRPr lang="en-US" b="1" dirty="0" smtClean="0"/>
+          </a:p>
+          <a:p>
+            <a:pPr marL="800100" lvl="1"/>
+            <a:endParaRPr lang="en-US" dirty="0" smtClean="0"/>
+          </a:p>
+        </p:txBody>
+      </p:sp>
+    </p:spTree>
+    <p:extLst>
+      <p:ext uri="{BB962C8B-B14F-4D97-AF65-F5344CB8AC3E}">
+        <p14:creationId xmlns:p14="http://schemas.microsoft.com/office/powerpoint/2010/main" val="1117820296"/>
       </p:ext>
     </p:extLst>
   </p:cSld>
@@ -17089,6 +17984,2010 @@
       </p:par>
     </p:tnLst>
   </p:timing>
+</p:sld>
+</file>
+
+<file path=ppt/slides/slide60.xml><?xml version="1.0" encoding="utf-8"?>
+<p:sld xmlns:a="http://schemas.openxmlformats.org/drawingml/2006/main" xmlns:r="http://schemas.openxmlformats.org/officeDocument/2006/relationships" xmlns:p="http://schemas.openxmlformats.org/presentationml/2006/main">
+  <p:cSld>
+    <p:spTree>
+      <p:nvGrpSpPr>
+        <p:cNvPr id="1" name=""/>
+        <p:cNvGrpSpPr/>
+        <p:nvPr/>
+      </p:nvGrpSpPr>
+      <p:grpSpPr>
+        <a:xfrm>
+          <a:off x="0" y="0"/>
+          <a:ext cx="0" cy="0"/>
+          <a:chOff x="0" y="0"/>
+          <a:chExt cx="0" cy="0"/>
+        </a:xfrm>
+      </p:grpSpPr>
+      <p:sp>
+        <p:nvSpPr>
+          <p:cNvPr id="2" name="Title 1"/>
+          <p:cNvSpPr>
+            <a:spLocks noGrp="1"/>
+          </p:cNvSpPr>
+          <p:nvPr>
+            <p:ph type="title"/>
+          </p:nvPr>
+        </p:nvSpPr>
+        <p:spPr/>
+        <p:txBody>
+          <a:bodyPr/>
+          <a:lstStyle/>
+          <a:p>
+            <a:r>
+              <a:rPr lang="en-US" dirty="0"/>
+              <a:t>Analysis </a:t>
+            </a:r>
+            <a:r>
+              <a:rPr lang="en-US" dirty="0" smtClean="0"/>
+              <a:t>Conclusions (continued)</a:t>
+            </a:r>
+            <a:endParaRPr lang="en-US" dirty="0"/>
+          </a:p>
+        </p:txBody>
+      </p:sp>
+      <p:pic>
+        <p:nvPicPr>
+          <p:cNvPr id="4" name="Content Placeholder 3"/>
+          <p:cNvPicPr>
+            <a:picLocks noGrp="1" noChangeAspect="1"/>
+          </p:cNvPicPr>
+          <p:nvPr>
+            <p:ph idx="1"/>
+          </p:nvPr>
+        </p:nvPicPr>
+        <p:blipFill>
+          <a:blip r:embed="rId2"/>
+          <a:stretch>
+            <a:fillRect/>
+          </a:stretch>
+        </p:blipFill>
+        <p:spPr>
+          <a:xfrm>
+            <a:off x="1103313" y="3550753"/>
+            <a:ext cx="8947150" cy="1508425"/>
+          </a:xfrm>
+          <a:prstGeom prst="rect">
+            <a:avLst/>
+          </a:prstGeom>
+        </p:spPr>
+      </p:pic>
+      <p:sp>
+        <p:nvSpPr>
+          <p:cNvPr id="5" name="Content Placeholder 2"/>
+          <p:cNvSpPr txBox="1">
+            <a:spLocks/>
+          </p:cNvSpPr>
+          <p:nvPr/>
+        </p:nvSpPr>
+        <p:spPr>
+          <a:xfrm>
+            <a:off x="1103313" y="2052917"/>
+            <a:ext cx="8530544" cy="3945827"/>
+          </a:xfrm>
+          <a:prstGeom prst="rect">
+            <a:avLst/>
+          </a:prstGeom>
+        </p:spPr>
+        <p:txBody>
+          <a:bodyPr vert="horz" lIns="91440" tIns="45720" rIns="91440" bIns="45720" rtlCol="0">
+            <a:normAutofit fontScale="92500" lnSpcReduction="20000"/>
+          </a:bodyPr>
+          <a:lstStyle>
+            <a:lvl1pPr marL="342900" indent="-342900" algn="l" defTabSz="457200" rtl="0" eaLnBrk="1" latinLnBrk="0" hangingPunct="1">
+              <a:spcBef>
+                <a:spcPts val="1000"/>
+              </a:spcBef>
+              <a:spcAft>
+                <a:spcPts val="0"/>
+              </a:spcAft>
+              <a:buClr>
+                <a:schemeClr val="bg2">
+                  <a:lumMod val="40000"/>
+                  <a:lumOff val="60000"/>
+                </a:schemeClr>
+              </a:buClr>
+              <a:buSzPct val="80000"/>
+              <a:buFont typeface="Wingdings 3" charset="2"/>
+              <a:buChar char=""/>
+              <a:defRPr sz="2000" b="0" i="0" kern="1200">
+                <a:solidFill>
+                  <a:schemeClr val="tx1"/>
+                </a:solidFill>
+                <a:latin typeface="+mj-lt"/>
+                <a:ea typeface="+mj-ea"/>
+                <a:cs typeface="+mj-cs"/>
+              </a:defRPr>
+            </a:lvl1pPr>
+            <a:lvl2pPr marL="742950" indent="-285750" algn="l" defTabSz="457200" rtl="0" eaLnBrk="1" latinLnBrk="0" hangingPunct="1">
+              <a:spcBef>
+                <a:spcPts val="1000"/>
+              </a:spcBef>
+              <a:spcAft>
+                <a:spcPts val="0"/>
+              </a:spcAft>
+              <a:buClr>
+                <a:schemeClr val="bg2">
+                  <a:lumMod val="40000"/>
+                  <a:lumOff val="60000"/>
+                </a:schemeClr>
+              </a:buClr>
+              <a:buSzPct val="80000"/>
+              <a:buFont typeface="Wingdings 3" charset="2"/>
+              <a:buChar char=""/>
+              <a:defRPr sz="1800" b="0" i="0" kern="1200">
+                <a:solidFill>
+                  <a:schemeClr val="tx1"/>
+                </a:solidFill>
+                <a:latin typeface="+mj-lt"/>
+                <a:ea typeface="+mj-ea"/>
+                <a:cs typeface="+mj-cs"/>
+              </a:defRPr>
+            </a:lvl2pPr>
+            <a:lvl3pPr marL="1143000" indent="-228600" algn="l" defTabSz="457200" rtl="0" eaLnBrk="1" latinLnBrk="0" hangingPunct="1">
+              <a:spcBef>
+                <a:spcPts val="1000"/>
+              </a:spcBef>
+              <a:spcAft>
+                <a:spcPts val="0"/>
+              </a:spcAft>
+              <a:buClr>
+                <a:schemeClr val="bg2">
+                  <a:lumMod val="40000"/>
+                  <a:lumOff val="60000"/>
+                </a:schemeClr>
+              </a:buClr>
+              <a:buSzPct val="80000"/>
+              <a:buFont typeface="Wingdings 3" charset="2"/>
+              <a:buChar char=""/>
+              <a:defRPr sz="1600" b="0" i="0" kern="1200">
+                <a:solidFill>
+                  <a:schemeClr val="tx1"/>
+                </a:solidFill>
+                <a:latin typeface="+mj-lt"/>
+                <a:ea typeface="+mj-ea"/>
+                <a:cs typeface="+mj-cs"/>
+              </a:defRPr>
+            </a:lvl3pPr>
+            <a:lvl4pPr marL="1600200" indent="-228600" algn="l" defTabSz="457200" rtl="0" eaLnBrk="1" latinLnBrk="0" hangingPunct="1">
+              <a:spcBef>
+                <a:spcPts val="1000"/>
+              </a:spcBef>
+              <a:spcAft>
+                <a:spcPts val="0"/>
+              </a:spcAft>
+              <a:buClr>
+                <a:schemeClr val="bg2">
+                  <a:lumMod val="40000"/>
+                  <a:lumOff val="60000"/>
+                </a:schemeClr>
+              </a:buClr>
+              <a:buSzPct val="80000"/>
+              <a:buFont typeface="Wingdings 3" charset="2"/>
+              <a:buChar char=""/>
+              <a:defRPr sz="1400" b="0" i="0" kern="1200">
+                <a:solidFill>
+                  <a:schemeClr val="tx1"/>
+                </a:solidFill>
+                <a:latin typeface="+mj-lt"/>
+                <a:ea typeface="+mj-ea"/>
+                <a:cs typeface="+mj-cs"/>
+              </a:defRPr>
+            </a:lvl4pPr>
+            <a:lvl5pPr marL="2057400" indent="-228600" algn="l" defTabSz="457200" rtl="0" eaLnBrk="1" latinLnBrk="0" hangingPunct="1">
+              <a:spcBef>
+                <a:spcPts val="1000"/>
+              </a:spcBef>
+              <a:spcAft>
+                <a:spcPts val="0"/>
+              </a:spcAft>
+              <a:buClr>
+                <a:schemeClr val="bg2">
+                  <a:lumMod val="40000"/>
+                  <a:lumOff val="60000"/>
+                </a:schemeClr>
+              </a:buClr>
+              <a:buSzPct val="80000"/>
+              <a:buFont typeface="Wingdings 3" charset="2"/>
+              <a:buChar char=""/>
+              <a:defRPr sz="1400" b="0" i="0" kern="1200">
+                <a:solidFill>
+                  <a:schemeClr val="tx1"/>
+                </a:solidFill>
+                <a:latin typeface="+mj-lt"/>
+                <a:ea typeface="+mj-ea"/>
+                <a:cs typeface="+mj-cs"/>
+              </a:defRPr>
+            </a:lvl5pPr>
+            <a:lvl6pPr marL="2506000" indent="-228600" algn="l" defTabSz="457200" rtl="0" eaLnBrk="1" latinLnBrk="0" hangingPunct="1">
+              <a:spcBef>
+                <a:spcPts val="1000"/>
+              </a:spcBef>
+              <a:spcAft>
+                <a:spcPts val="0"/>
+              </a:spcAft>
+              <a:buClr>
+                <a:schemeClr val="bg2">
+                  <a:lumMod val="40000"/>
+                  <a:lumOff val="60000"/>
+                </a:schemeClr>
+              </a:buClr>
+              <a:buSzPct val="80000"/>
+              <a:buFont typeface="Wingdings 3" charset="2"/>
+              <a:buChar char=""/>
+              <a:defRPr sz="1400" b="0" i="0" kern="1200">
+                <a:solidFill>
+                  <a:schemeClr val="tx1"/>
+                </a:solidFill>
+                <a:latin typeface="+mj-lt"/>
+                <a:ea typeface="+mj-ea"/>
+                <a:cs typeface="+mj-cs"/>
+              </a:defRPr>
+            </a:lvl6pPr>
+            <a:lvl7pPr marL="2971800" indent="-228600" algn="l" defTabSz="457200" rtl="0" eaLnBrk="1" latinLnBrk="0" hangingPunct="1">
+              <a:spcBef>
+                <a:spcPts val="1000"/>
+              </a:spcBef>
+              <a:spcAft>
+                <a:spcPts val="0"/>
+              </a:spcAft>
+              <a:buClr>
+                <a:schemeClr val="bg2">
+                  <a:lumMod val="40000"/>
+                  <a:lumOff val="60000"/>
+                </a:schemeClr>
+              </a:buClr>
+              <a:buSzPct val="80000"/>
+              <a:buFont typeface="Wingdings 3" charset="2"/>
+              <a:buChar char=""/>
+              <a:defRPr sz="1400" b="0" i="0" kern="1200">
+                <a:solidFill>
+                  <a:schemeClr val="tx1"/>
+                </a:solidFill>
+                <a:latin typeface="+mj-lt"/>
+                <a:ea typeface="+mj-ea"/>
+                <a:cs typeface="+mj-cs"/>
+              </a:defRPr>
+            </a:lvl7pPr>
+            <a:lvl8pPr marL="3429000" indent="-228600" algn="l" defTabSz="457200" rtl="0" eaLnBrk="1" latinLnBrk="0" hangingPunct="1">
+              <a:spcBef>
+                <a:spcPts val="1000"/>
+              </a:spcBef>
+              <a:spcAft>
+                <a:spcPts val="0"/>
+              </a:spcAft>
+              <a:buClr>
+                <a:schemeClr val="bg2">
+                  <a:lumMod val="40000"/>
+                  <a:lumOff val="60000"/>
+                </a:schemeClr>
+              </a:buClr>
+              <a:buSzPct val="80000"/>
+              <a:buFont typeface="Wingdings 3" charset="2"/>
+              <a:buChar char=""/>
+              <a:defRPr sz="1400" b="0" i="0" kern="1200">
+                <a:solidFill>
+                  <a:schemeClr val="tx1"/>
+                </a:solidFill>
+                <a:latin typeface="+mj-lt"/>
+                <a:ea typeface="+mj-ea"/>
+                <a:cs typeface="+mj-cs"/>
+              </a:defRPr>
+            </a:lvl8pPr>
+            <a:lvl9pPr marL="3886200" indent="-228600" algn="l" defTabSz="457200" rtl="0" eaLnBrk="1" latinLnBrk="0" hangingPunct="1">
+              <a:spcBef>
+                <a:spcPts val="1000"/>
+              </a:spcBef>
+              <a:spcAft>
+                <a:spcPts val="0"/>
+              </a:spcAft>
+              <a:buClr>
+                <a:schemeClr val="bg2">
+                  <a:lumMod val="40000"/>
+                  <a:lumOff val="60000"/>
+                </a:schemeClr>
+              </a:buClr>
+              <a:buSzPct val="80000"/>
+              <a:buFont typeface="Wingdings 3" charset="2"/>
+              <a:buChar char=""/>
+              <a:defRPr sz="1400" b="0" i="0" kern="1200">
+                <a:solidFill>
+                  <a:schemeClr val="tx1"/>
+                </a:solidFill>
+                <a:latin typeface="+mj-lt"/>
+                <a:ea typeface="+mj-ea"/>
+                <a:cs typeface="+mj-cs"/>
+              </a:defRPr>
+            </a:lvl9pPr>
+          </a:lstStyle>
+          <a:p>
+            <a:r>
+              <a:rPr lang="en-US" dirty="0" smtClean="0"/>
+              <a:t>Prove data sets are different by finding p-values given:</a:t>
+            </a:r>
+            <a:endParaRPr lang="en-US" b="1" dirty="0" smtClean="0"/>
+          </a:p>
+          <a:p>
+            <a:pPr lvl="1"/>
+            <a:r>
+              <a:rPr lang="en-US" dirty="0" smtClean="0"/>
+              <a:t>Two-tailed analysis.</a:t>
+            </a:r>
+          </a:p>
+          <a:p>
+            <a:pPr lvl="1"/>
+            <a:r>
+              <a:rPr lang="en-US" dirty="0" smtClean="0"/>
+              <a:t>Two independent means.</a:t>
+            </a:r>
+          </a:p>
+          <a:p>
+            <a:pPr lvl="1"/>
+            <a:r>
+              <a:rPr lang="en-US" dirty="0" smtClean="0"/>
+              <a:t>Null hypothesis is that both sets are the same.</a:t>
+            </a:r>
+          </a:p>
+          <a:p>
+            <a:endParaRPr lang="en-US" b="1" dirty="0" smtClean="0"/>
+          </a:p>
+          <a:p>
+            <a:endParaRPr lang="en-US" b="1" dirty="0"/>
+          </a:p>
+          <a:p>
+            <a:endParaRPr lang="en-US" b="1" dirty="0" smtClean="0"/>
+          </a:p>
+          <a:p>
+            <a:endParaRPr lang="en-US" b="1" dirty="0"/>
+          </a:p>
+          <a:p>
+            <a:endParaRPr lang="en-US" b="1" dirty="0" smtClean="0"/>
+          </a:p>
+          <a:p>
+            <a:r>
+              <a:rPr lang="en-US" b="1" dirty="0" smtClean="0"/>
+              <a:t>Since </a:t>
+            </a:r>
+            <a:r>
+              <a:rPr lang="en-US" b="1" dirty="0"/>
+              <a:t>p-values are significant at p &lt; </a:t>
+            </a:r>
+            <a:r>
+              <a:rPr lang="en-US" b="1" dirty="0" smtClean="0"/>
+              <a:t>0.05,  the test cases </a:t>
+            </a:r>
+            <a:r>
+              <a:rPr lang="en-US" b="1" dirty="0"/>
+              <a:t>are </a:t>
+            </a:r>
+            <a:r>
+              <a:rPr lang="en-US" b="1" dirty="0" smtClean="0"/>
+              <a:t>provably </a:t>
+            </a:r>
+            <a:r>
+              <a:rPr lang="en-US" b="1" dirty="0"/>
+              <a:t>different from each </a:t>
+            </a:r>
+            <a:r>
+              <a:rPr lang="en-US" b="1" dirty="0" smtClean="0"/>
+              <a:t>other.</a:t>
+            </a:r>
+            <a:endParaRPr lang="en-US" dirty="0" smtClean="0"/>
+          </a:p>
+          <a:p>
+            <a:pPr marL="457200" indent="-457200">
+              <a:buFont typeface="+mj-lt"/>
+              <a:buAutoNum type="arabicPeriod"/>
+            </a:pPr>
+            <a:endParaRPr lang="en-US" b="1" dirty="0" smtClean="0"/>
+          </a:p>
+          <a:p>
+            <a:pPr marL="457200" indent="-457200">
+              <a:buFont typeface="+mj-lt"/>
+              <a:buAutoNum type="arabicPeriod"/>
+            </a:pPr>
+            <a:endParaRPr lang="en-US" b="1" dirty="0" smtClean="0"/>
+          </a:p>
+          <a:p>
+            <a:pPr marL="0" indent="0">
+              <a:buFont typeface="Wingdings 3" charset="2"/>
+              <a:buNone/>
+            </a:pPr>
+            <a:endParaRPr lang="en-US" b="1" dirty="0" smtClean="0"/>
+          </a:p>
+          <a:p>
+            <a:pPr marL="800100" lvl="1"/>
+            <a:endParaRPr lang="en-US" dirty="0" smtClean="0"/>
+          </a:p>
+        </p:txBody>
+      </p:sp>
+    </p:spTree>
+    <p:extLst>
+      <p:ext uri="{BB962C8B-B14F-4D97-AF65-F5344CB8AC3E}">
+        <p14:creationId xmlns:p14="http://schemas.microsoft.com/office/powerpoint/2010/main" val="2457676671"/>
+      </p:ext>
+    </p:extLst>
+  </p:cSld>
+  <p:clrMapOvr>
+    <a:masterClrMapping/>
+  </p:clrMapOvr>
+</p:sld>
+</file>
+
+<file path=ppt/slides/slide61.xml><?xml version="1.0" encoding="utf-8"?>
+<p:sld xmlns:a="http://schemas.openxmlformats.org/drawingml/2006/main" xmlns:r="http://schemas.openxmlformats.org/officeDocument/2006/relationships" xmlns:p="http://schemas.openxmlformats.org/presentationml/2006/main">
+  <p:cSld>
+    <p:spTree>
+      <p:nvGrpSpPr>
+        <p:cNvPr id="1" name=""/>
+        <p:cNvGrpSpPr/>
+        <p:nvPr/>
+      </p:nvGrpSpPr>
+      <p:grpSpPr>
+        <a:xfrm>
+          <a:off x="0" y="0"/>
+          <a:ext cx="0" cy="0"/>
+          <a:chOff x="0" y="0"/>
+          <a:chExt cx="0" cy="0"/>
+        </a:xfrm>
+      </p:grpSpPr>
+      <p:sp>
+        <p:nvSpPr>
+          <p:cNvPr id="2" name="Title 1"/>
+          <p:cNvSpPr>
+            <a:spLocks noGrp="1"/>
+          </p:cNvSpPr>
+          <p:nvPr>
+            <p:ph type="title"/>
+          </p:nvPr>
+        </p:nvSpPr>
+        <p:spPr>
+          <a:xfrm>
+            <a:off x="646111" y="452718"/>
+            <a:ext cx="10359346" cy="603951"/>
+          </a:xfrm>
+        </p:spPr>
+        <p:txBody>
+          <a:bodyPr/>
+          <a:lstStyle/>
+          <a:p>
+            <a:r>
+              <a:rPr lang="en-US" dirty="0" smtClean="0"/>
+              <a:t>Token Count Analysis</a:t>
+            </a:r>
+            <a:endParaRPr lang="en-US" dirty="0"/>
+          </a:p>
+        </p:txBody>
+      </p:sp>
+      <p:sp>
+        <p:nvSpPr>
+          <p:cNvPr id="3" name="Content Placeholder 2"/>
+          <p:cNvSpPr>
+            <a:spLocks noGrp="1"/>
+          </p:cNvSpPr>
+          <p:nvPr>
+            <p:ph idx="1"/>
+          </p:nvPr>
+        </p:nvSpPr>
+        <p:spPr>
+          <a:xfrm>
+            <a:off x="456007" y="4356651"/>
+            <a:ext cx="4873377" cy="394963"/>
+          </a:xfrm>
+        </p:spPr>
+        <p:txBody>
+          <a:bodyPr>
+            <a:normAutofit lnSpcReduction="10000"/>
+          </a:bodyPr>
+          <a:lstStyle/>
+          <a:p>
+            <a:pPr marL="0" indent="0">
+              <a:buNone/>
+            </a:pPr>
+            <a:r>
+              <a:rPr lang="en-US" dirty="0" smtClean="0"/>
+              <a:t>File Client</a:t>
+            </a:r>
+            <a:endParaRPr lang="en-US" dirty="0"/>
+          </a:p>
+        </p:txBody>
+      </p:sp>
+      <p:sp>
+        <p:nvSpPr>
+          <p:cNvPr id="7" name="Content Placeholder 2"/>
+          <p:cNvSpPr txBox="1">
+            <a:spLocks/>
+          </p:cNvSpPr>
+          <p:nvPr/>
+        </p:nvSpPr>
+        <p:spPr>
+          <a:xfrm>
+            <a:off x="5747016" y="4356651"/>
+            <a:ext cx="4892464" cy="394963"/>
+          </a:xfrm>
+          <a:prstGeom prst="rect">
+            <a:avLst/>
+          </a:prstGeom>
+        </p:spPr>
+        <p:txBody>
+          <a:bodyPr vert="horz" lIns="91440" tIns="45720" rIns="91440" bIns="45720" rtlCol="0">
+            <a:normAutofit lnSpcReduction="10000"/>
+          </a:bodyPr>
+          <a:lstStyle>
+            <a:lvl1pPr marL="342900" indent="-342900" algn="l" defTabSz="457200" rtl="0" eaLnBrk="1" latinLnBrk="0" hangingPunct="1">
+              <a:spcBef>
+                <a:spcPts val="1000"/>
+              </a:spcBef>
+              <a:spcAft>
+                <a:spcPts val="0"/>
+              </a:spcAft>
+              <a:buClr>
+                <a:schemeClr val="bg2">
+                  <a:lumMod val="40000"/>
+                  <a:lumOff val="60000"/>
+                </a:schemeClr>
+              </a:buClr>
+              <a:buSzPct val="80000"/>
+              <a:buFont typeface="Wingdings 3" charset="2"/>
+              <a:buChar char=""/>
+              <a:defRPr sz="2000" b="0" i="0" kern="1200">
+                <a:solidFill>
+                  <a:schemeClr val="tx1"/>
+                </a:solidFill>
+                <a:latin typeface="+mj-lt"/>
+                <a:ea typeface="+mj-ea"/>
+                <a:cs typeface="+mj-cs"/>
+              </a:defRPr>
+            </a:lvl1pPr>
+            <a:lvl2pPr marL="742950" indent="-285750" algn="l" defTabSz="457200" rtl="0" eaLnBrk="1" latinLnBrk="0" hangingPunct="1">
+              <a:spcBef>
+                <a:spcPts val="1000"/>
+              </a:spcBef>
+              <a:spcAft>
+                <a:spcPts val="0"/>
+              </a:spcAft>
+              <a:buClr>
+                <a:schemeClr val="bg2">
+                  <a:lumMod val="40000"/>
+                  <a:lumOff val="60000"/>
+                </a:schemeClr>
+              </a:buClr>
+              <a:buSzPct val="80000"/>
+              <a:buFont typeface="Wingdings 3" charset="2"/>
+              <a:buChar char=""/>
+              <a:defRPr sz="1800" b="0" i="0" kern="1200">
+                <a:solidFill>
+                  <a:schemeClr val="tx1"/>
+                </a:solidFill>
+                <a:latin typeface="+mj-lt"/>
+                <a:ea typeface="+mj-ea"/>
+                <a:cs typeface="+mj-cs"/>
+              </a:defRPr>
+            </a:lvl2pPr>
+            <a:lvl3pPr marL="1143000" indent="-228600" algn="l" defTabSz="457200" rtl="0" eaLnBrk="1" latinLnBrk="0" hangingPunct="1">
+              <a:spcBef>
+                <a:spcPts val="1000"/>
+              </a:spcBef>
+              <a:spcAft>
+                <a:spcPts val="0"/>
+              </a:spcAft>
+              <a:buClr>
+                <a:schemeClr val="bg2">
+                  <a:lumMod val="40000"/>
+                  <a:lumOff val="60000"/>
+                </a:schemeClr>
+              </a:buClr>
+              <a:buSzPct val="80000"/>
+              <a:buFont typeface="Wingdings 3" charset="2"/>
+              <a:buChar char=""/>
+              <a:defRPr sz="1600" b="0" i="0" kern="1200">
+                <a:solidFill>
+                  <a:schemeClr val="tx1"/>
+                </a:solidFill>
+                <a:latin typeface="+mj-lt"/>
+                <a:ea typeface="+mj-ea"/>
+                <a:cs typeface="+mj-cs"/>
+              </a:defRPr>
+            </a:lvl3pPr>
+            <a:lvl4pPr marL="1600200" indent="-228600" algn="l" defTabSz="457200" rtl="0" eaLnBrk="1" latinLnBrk="0" hangingPunct="1">
+              <a:spcBef>
+                <a:spcPts val="1000"/>
+              </a:spcBef>
+              <a:spcAft>
+                <a:spcPts val="0"/>
+              </a:spcAft>
+              <a:buClr>
+                <a:schemeClr val="bg2">
+                  <a:lumMod val="40000"/>
+                  <a:lumOff val="60000"/>
+                </a:schemeClr>
+              </a:buClr>
+              <a:buSzPct val="80000"/>
+              <a:buFont typeface="Wingdings 3" charset="2"/>
+              <a:buChar char=""/>
+              <a:defRPr sz="1400" b="0" i="0" kern="1200">
+                <a:solidFill>
+                  <a:schemeClr val="tx1"/>
+                </a:solidFill>
+                <a:latin typeface="+mj-lt"/>
+                <a:ea typeface="+mj-ea"/>
+                <a:cs typeface="+mj-cs"/>
+              </a:defRPr>
+            </a:lvl4pPr>
+            <a:lvl5pPr marL="2057400" indent="-228600" algn="l" defTabSz="457200" rtl="0" eaLnBrk="1" latinLnBrk="0" hangingPunct="1">
+              <a:spcBef>
+                <a:spcPts val="1000"/>
+              </a:spcBef>
+              <a:spcAft>
+                <a:spcPts val="0"/>
+              </a:spcAft>
+              <a:buClr>
+                <a:schemeClr val="bg2">
+                  <a:lumMod val="40000"/>
+                  <a:lumOff val="60000"/>
+                </a:schemeClr>
+              </a:buClr>
+              <a:buSzPct val="80000"/>
+              <a:buFont typeface="Wingdings 3" charset="2"/>
+              <a:buChar char=""/>
+              <a:defRPr sz="1400" b="0" i="0" kern="1200">
+                <a:solidFill>
+                  <a:schemeClr val="tx1"/>
+                </a:solidFill>
+                <a:latin typeface="+mj-lt"/>
+                <a:ea typeface="+mj-ea"/>
+                <a:cs typeface="+mj-cs"/>
+              </a:defRPr>
+            </a:lvl5pPr>
+            <a:lvl6pPr marL="2506000" indent="-228600" algn="l" defTabSz="457200" rtl="0" eaLnBrk="1" latinLnBrk="0" hangingPunct="1">
+              <a:spcBef>
+                <a:spcPts val="1000"/>
+              </a:spcBef>
+              <a:spcAft>
+                <a:spcPts val="0"/>
+              </a:spcAft>
+              <a:buClr>
+                <a:schemeClr val="bg2">
+                  <a:lumMod val="40000"/>
+                  <a:lumOff val="60000"/>
+                </a:schemeClr>
+              </a:buClr>
+              <a:buSzPct val="80000"/>
+              <a:buFont typeface="Wingdings 3" charset="2"/>
+              <a:buChar char=""/>
+              <a:defRPr sz="1400" b="0" i="0" kern="1200">
+                <a:solidFill>
+                  <a:schemeClr val="tx1"/>
+                </a:solidFill>
+                <a:latin typeface="+mj-lt"/>
+                <a:ea typeface="+mj-ea"/>
+                <a:cs typeface="+mj-cs"/>
+              </a:defRPr>
+            </a:lvl6pPr>
+            <a:lvl7pPr marL="2971800" indent="-228600" algn="l" defTabSz="457200" rtl="0" eaLnBrk="1" latinLnBrk="0" hangingPunct="1">
+              <a:spcBef>
+                <a:spcPts val="1000"/>
+              </a:spcBef>
+              <a:spcAft>
+                <a:spcPts val="0"/>
+              </a:spcAft>
+              <a:buClr>
+                <a:schemeClr val="bg2">
+                  <a:lumMod val="40000"/>
+                  <a:lumOff val="60000"/>
+                </a:schemeClr>
+              </a:buClr>
+              <a:buSzPct val="80000"/>
+              <a:buFont typeface="Wingdings 3" charset="2"/>
+              <a:buChar char=""/>
+              <a:defRPr sz="1400" b="0" i="0" kern="1200">
+                <a:solidFill>
+                  <a:schemeClr val="tx1"/>
+                </a:solidFill>
+                <a:latin typeface="+mj-lt"/>
+                <a:ea typeface="+mj-ea"/>
+                <a:cs typeface="+mj-cs"/>
+              </a:defRPr>
+            </a:lvl7pPr>
+            <a:lvl8pPr marL="3429000" indent="-228600" algn="l" defTabSz="457200" rtl="0" eaLnBrk="1" latinLnBrk="0" hangingPunct="1">
+              <a:spcBef>
+                <a:spcPts val="1000"/>
+              </a:spcBef>
+              <a:spcAft>
+                <a:spcPts val="0"/>
+              </a:spcAft>
+              <a:buClr>
+                <a:schemeClr val="bg2">
+                  <a:lumMod val="40000"/>
+                  <a:lumOff val="60000"/>
+                </a:schemeClr>
+              </a:buClr>
+              <a:buSzPct val="80000"/>
+              <a:buFont typeface="Wingdings 3" charset="2"/>
+              <a:buChar char=""/>
+              <a:defRPr sz="1400" b="0" i="0" kern="1200">
+                <a:solidFill>
+                  <a:schemeClr val="tx1"/>
+                </a:solidFill>
+                <a:latin typeface="+mj-lt"/>
+                <a:ea typeface="+mj-ea"/>
+                <a:cs typeface="+mj-cs"/>
+              </a:defRPr>
+            </a:lvl8pPr>
+            <a:lvl9pPr marL="3886200" indent="-228600" algn="l" defTabSz="457200" rtl="0" eaLnBrk="1" latinLnBrk="0" hangingPunct="1">
+              <a:spcBef>
+                <a:spcPts val="1000"/>
+              </a:spcBef>
+              <a:spcAft>
+                <a:spcPts val="0"/>
+              </a:spcAft>
+              <a:buClr>
+                <a:schemeClr val="bg2">
+                  <a:lumMod val="40000"/>
+                  <a:lumOff val="60000"/>
+                </a:schemeClr>
+              </a:buClr>
+              <a:buSzPct val="80000"/>
+              <a:buFont typeface="Wingdings 3" charset="2"/>
+              <a:buChar char=""/>
+              <a:defRPr sz="1400" b="0" i="0" kern="1200">
+                <a:solidFill>
+                  <a:schemeClr val="tx1"/>
+                </a:solidFill>
+                <a:latin typeface="+mj-lt"/>
+                <a:ea typeface="+mj-ea"/>
+                <a:cs typeface="+mj-cs"/>
+              </a:defRPr>
+            </a:lvl9pPr>
+          </a:lstStyle>
+          <a:p>
+            <a:pPr marL="0" indent="0">
+              <a:buNone/>
+            </a:pPr>
+            <a:r>
+              <a:rPr lang="en-US" dirty="0" smtClean="0"/>
+              <a:t>Calculator</a:t>
+            </a:r>
+            <a:endParaRPr lang="en-US" dirty="0"/>
+          </a:p>
+        </p:txBody>
+      </p:sp>
+      <p:sp>
+        <p:nvSpPr>
+          <p:cNvPr id="8" name="Content Placeholder 2"/>
+          <p:cNvSpPr txBox="1">
+            <a:spLocks/>
+          </p:cNvSpPr>
+          <p:nvPr/>
+        </p:nvSpPr>
+        <p:spPr>
+          <a:xfrm>
+            <a:off x="436920" y="5102401"/>
+            <a:ext cx="10202560" cy="1233085"/>
+          </a:xfrm>
+          <a:prstGeom prst="rect">
+            <a:avLst/>
+          </a:prstGeom>
+        </p:spPr>
+        <p:txBody>
+          <a:bodyPr vert="horz" lIns="91440" tIns="45720" rIns="91440" bIns="45720" rtlCol="0">
+            <a:normAutofit fontScale="92500" lnSpcReduction="20000"/>
+          </a:bodyPr>
+          <a:lstStyle>
+            <a:lvl1pPr marL="342900" indent="-342900" algn="l" defTabSz="457200" rtl="0" eaLnBrk="1" latinLnBrk="0" hangingPunct="1">
+              <a:spcBef>
+                <a:spcPts val="1000"/>
+              </a:spcBef>
+              <a:spcAft>
+                <a:spcPts val="0"/>
+              </a:spcAft>
+              <a:buClr>
+                <a:schemeClr val="bg2">
+                  <a:lumMod val="40000"/>
+                  <a:lumOff val="60000"/>
+                </a:schemeClr>
+              </a:buClr>
+              <a:buSzPct val="80000"/>
+              <a:buFont typeface="Wingdings 3" charset="2"/>
+              <a:buChar char=""/>
+              <a:defRPr sz="2000" b="0" i="0" kern="1200">
+                <a:solidFill>
+                  <a:schemeClr val="tx1"/>
+                </a:solidFill>
+                <a:latin typeface="+mj-lt"/>
+                <a:ea typeface="+mj-ea"/>
+                <a:cs typeface="+mj-cs"/>
+              </a:defRPr>
+            </a:lvl1pPr>
+            <a:lvl2pPr marL="742950" indent="-285750" algn="l" defTabSz="457200" rtl="0" eaLnBrk="1" latinLnBrk="0" hangingPunct="1">
+              <a:spcBef>
+                <a:spcPts val="1000"/>
+              </a:spcBef>
+              <a:spcAft>
+                <a:spcPts val="0"/>
+              </a:spcAft>
+              <a:buClr>
+                <a:schemeClr val="bg2">
+                  <a:lumMod val="40000"/>
+                  <a:lumOff val="60000"/>
+                </a:schemeClr>
+              </a:buClr>
+              <a:buSzPct val="80000"/>
+              <a:buFont typeface="Wingdings 3" charset="2"/>
+              <a:buChar char=""/>
+              <a:defRPr sz="1800" b="0" i="0" kern="1200">
+                <a:solidFill>
+                  <a:schemeClr val="tx1"/>
+                </a:solidFill>
+                <a:latin typeface="+mj-lt"/>
+                <a:ea typeface="+mj-ea"/>
+                <a:cs typeface="+mj-cs"/>
+              </a:defRPr>
+            </a:lvl2pPr>
+            <a:lvl3pPr marL="1143000" indent="-228600" algn="l" defTabSz="457200" rtl="0" eaLnBrk="1" latinLnBrk="0" hangingPunct="1">
+              <a:spcBef>
+                <a:spcPts val="1000"/>
+              </a:spcBef>
+              <a:spcAft>
+                <a:spcPts val="0"/>
+              </a:spcAft>
+              <a:buClr>
+                <a:schemeClr val="bg2">
+                  <a:lumMod val="40000"/>
+                  <a:lumOff val="60000"/>
+                </a:schemeClr>
+              </a:buClr>
+              <a:buSzPct val="80000"/>
+              <a:buFont typeface="Wingdings 3" charset="2"/>
+              <a:buChar char=""/>
+              <a:defRPr sz="1600" b="0" i="0" kern="1200">
+                <a:solidFill>
+                  <a:schemeClr val="tx1"/>
+                </a:solidFill>
+                <a:latin typeface="+mj-lt"/>
+                <a:ea typeface="+mj-ea"/>
+                <a:cs typeface="+mj-cs"/>
+              </a:defRPr>
+            </a:lvl3pPr>
+            <a:lvl4pPr marL="1600200" indent="-228600" algn="l" defTabSz="457200" rtl="0" eaLnBrk="1" latinLnBrk="0" hangingPunct="1">
+              <a:spcBef>
+                <a:spcPts val="1000"/>
+              </a:spcBef>
+              <a:spcAft>
+                <a:spcPts val="0"/>
+              </a:spcAft>
+              <a:buClr>
+                <a:schemeClr val="bg2">
+                  <a:lumMod val="40000"/>
+                  <a:lumOff val="60000"/>
+                </a:schemeClr>
+              </a:buClr>
+              <a:buSzPct val="80000"/>
+              <a:buFont typeface="Wingdings 3" charset="2"/>
+              <a:buChar char=""/>
+              <a:defRPr sz="1400" b="0" i="0" kern="1200">
+                <a:solidFill>
+                  <a:schemeClr val="tx1"/>
+                </a:solidFill>
+                <a:latin typeface="+mj-lt"/>
+                <a:ea typeface="+mj-ea"/>
+                <a:cs typeface="+mj-cs"/>
+              </a:defRPr>
+            </a:lvl4pPr>
+            <a:lvl5pPr marL="2057400" indent="-228600" algn="l" defTabSz="457200" rtl="0" eaLnBrk="1" latinLnBrk="0" hangingPunct="1">
+              <a:spcBef>
+                <a:spcPts val="1000"/>
+              </a:spcBef>
+              <a:spcAft>
+                <a:spcPts val="0"/>
+              </a:spcAft>
+              <a:buClr>
+                <a:schemeClr val="bg2">
+                  <a:lumMod val="40000"/>
+                  <a:lumOff val="60000"/>
+                </a:schemeClr>
+              </a:buClr>
+              <a:buSzPct val="80000"/>
+              <a:buFont typeface="Wingdings 3" charset="2"/>
+              <a:buChar char=""/>
+              <a:defRPr sz="1400" b="0" i="0" kern="1200">
+                <a:solidFill>
+                  <a:schemeClr val="tx1"/>
+                </a:solidFill>
+                <a:latin typeface="+mj-lt"/>
+                <a:ea typeface="+mj-ea"/>
+                <a:cs typeface="+mj-cs"/>
+              </a:defRPr>
+            </a:lvl5pPr>
+            <a:lvl6pPr marL="2506000" indent="-228600" algn="l" defTabSz="457200" rtl="0" eaLnBrk="1" latinLnBrk="0" hangingPunct="1">
+              <a:spcBef>
+                <a:spcPts val="1000"/>
+              </a:spcBef>
+              <a:spcAft>
+                <a:spcPts val="0"/>
+              </a:spcAft>
+              <a:buClr>
+                <a:schemeClr val="bg2">
+                  <a:lumMod val="40000"/>
+                  <a:lumOff val="60000"/>
+                </a:schemeClr>
+              </a:buClr>
+              <a:buSzPct val="80000"/>
+              <a:buFont typeface="Wingdings 3" charset="2"/>
+              <a:buChar char=""/>
+              <a:defRPr sz="1400" b="0" i="0" kern="1200">
+                <a:solidFill>
+                  <a:schemeClr val="tx1"/>
+                </a:solidFill>
+                <a:latin typeface="+mj-lt"/>
+                <a:ea typeface="+mj-ea"/>
+                <a:cs typeface="+mj-cs"/>
+              </a:defRPr>
+            </a:lvl6pPr>
+            <a:lvl7pPr marL="2971800" indent="-228600" algn="l" defTabSz="457200" rtl="0" eaLnBrk="1" latinLnBrk="0" hangingPunct="1">
+              <a:spcBef>
+                <a:spcPts val="1000"/>
+              </a:spcBef>
+              <a:spcAft>
+                <a:spcPts val="0"/>
+              </a:spcAft>
+              <a:buClr>
+                <a:schemeClr val="bg2">
+                  <a:lumMod val="40000"/>
+                  <a:lumOff val="60000"/>
+                </a:schemeClr>
+              </a:buClr>
+              <a:buSzPct val="80000"/>
+              <a:buFont typeface="Wingdings 3" charset="2"/>
+              <a:buChar char=""/>
+              <a:defRPr sz="1400" b="0" i="0" kern="1200">
+                <a:solidFill>
+                  <a:schemeClr val="tx1"/>
+                </a:solidFill>
+                <a:latin typeface="+mj-lt"/>
+                <a:ea typeface="+mj-ea"/>
+                <a:cs typeface="+mj-cs"/>
+              </a:defRPr>
+            </a:lvl7pPr>
+            <a:lvl8pPr marL="3429000" indent="-228600" algn="l" defTabSz="457200" rtl="0" eaLnBrk="1" latinLnBrk="0" hangingPunct="1">
+              <a:spcBef>
+                <a:spcPts val="1000"/>
+              </a:spcBef>
+              <a:spcAft>
+                <a:spcPts val="0"/>
+              </a:spcAft>
+              <a:buClr>
+                <a:schemeClr val="bg2">
+                  <a:lumMod val="40000"/>
+                  <a:lumOff val="60000"/>
+                </a:schemeClr>
+              </a:buClr>
+              <a:buSzPct val="80000"/>
+              <a:buFont typeface="Wingdings 3" charset="2"/>
+              <a:buChar char=""/>
+              <a:defRPr sz="1400" b="0" i="0" kern="1200">
+                <a:solidFill>
+                  <a:schemeClr val="tx1"/>
+                </a:solidFill>
+                <a:latin typeface="+mj-lt"/>
+                <a:ea typeface="+mj-ea"/>
+                <a:cs typeface="+mj-cs"/>
+              </a:defRPr>
+            </a:lvl8pPr>
+            <a:lvl9pPr marL="3886200" indent="-228600" algn="l" defTabSz="457200" rtl="0" eaLnBrk="1" latinLnBrk="0" hangingPunct="1">
+              <a:spcBef>
+                <a:spcPts val="1000"/>
+              </a:spcBef>
+              <a:spcAft>
+                <a:spcPts val="0"/>
+              </a:spcAft>
+              <a:buClr>
+                <a:schemeClr val="bg2">
+                  <a:lumMod val="40000"/>
+                  <a:lumOff val="60000"/>
+                </a:schemeClr>
+              </a:buClr>
+              <a:buSzPct val="80000"/>
+              <a:buFont typeface="Wingdings 3" charset="2"/>
+              <a:buChar char=""/>
+              <a:defRPr sz="1400" b="0" i="0" kern="1200">
+                <a:solidFill>
+                  <a:schemeClr val="tx1"/>
+                </a:solidFill>
+                <a:latin typeface="+mj-lt"/>
+                <a:ea typeface="+mj-ea"/>
+                <a:cs typeface="+mj-cs"/>
+              </a:defRPr>
+            </a:lvl9pPr>
+          </a:lstStyle>
+          <a:p>
+            <a:r>
+              <a:rPr lang="en-US" dirty="0" smtClean="0"/>
+              <a:t>Lower median values within smaller data spreads point to greater number of functions with lower token counts.</a:t>
+            </a:r>
+          </a:p>
+          <a:p>
+            <a:r>
+              <a:rPr lang="en-US" dirty="0" smtClean="0"/>
+              <a:t>Conclusion: generated </a:t>
+            </a:r>
+            <a:r>
+              <a:rPr lang="en-US" dirty="0"/>
+              <a:t>code is splitting larger computational problems into smaller </a:t>
+            </a:r>
+            <a:r>
+              <a:rPr lang="en-US" dirty="0" smtClean="0"/>
+              <a:t>tasks than the non-generated code.</a:t>
+            </a:r>
+            <a:endParaRPr lang="en-US" dirty="0"/>
+          </a:p>
+          <a:p>
+            <a:endParaRPr lang="en-US" dirty="0"/>
+          </a:p>
+        </p:txBody>
+      </p:sp>
+      <p:pic>
+        <p:nvPicPr>
+          <p:cNvPr id="9" name="Picture 8"/>
+          <p:cNvPicPr>
+            <a:picLocks noChangeAspect="1"/>
+          </p:cNvPicPr>
+          <p:nvPr/>
+        </p:nvPicPr>
+        <p:blipFill>
+          <a:blip r:embed="rId2"/>
+          <a:stretch>
+            <a:fillRect/>
+          </a:stretch>
+        </p:blipFill>
+        <p:spPr>
+          <a:xfrm>
+            <a:off x="456007" y="1232062"/>
+            <a:ext cx="4892464" cy="2949196"/>
+          </a:xfrm>
+          <a:prstGeom prst="rect">
+            <a:avLst/>
+          </a:prstGeom>
+        </p:spPr>
+      </p:pic>
+      <p:pic>
+        <p:nvPicPr>
+          <p:cNvPr id="10" name="Picture 9"/>
+          <p:cNvPicPr>
+            <a:picLocks noChangeAspect="1"/>
+          </p:cNvPicPr>
+          <p:nvPr/>
+        </p:nvPicPr>
+        <p:blipFill>
+          <a:blip r:embed="rId3"/>
+          <a:stretch>
+            <a:fillRect/>
+          </a:stretch>
+        </p:blipFill>
+        <p:spPr>
+          <a:xfrm>
+            <a:off x="5825784" y="1232062"/>
+            <a:ext cx="4892464" cy="2949196"/>
+          </a:xfrm>
+          <a:prstGeom prst="rect">
+            <a:avLst/>
+          </a:prstGeom>
+        </p:spPr>
+      </p:pic>
+    </p:spTree>
+    <p:extLst>
+      <p:ext uri="{BB962C8B-B14F-4D97-AF65-F5344CB8AC3E}">
+        <p14:creationId xmlns:p14="http://schemas.microsoft.com/office/powerpoint/2010/main" val="777673050"/>
+      </p:ext>
+    </p:extLst>
+  </p:cSld>
+  <p:clrMapOvr>
+    <a:masterClrMapping/>
+  </p:clrMapOvr>
+  <p:timing>
+    <p:tnLst>
+      <p:par>
+        <p:cTn id="1" dur="indefinite" restart="never" nodeType="tmRoot"/>
+      </p:par>
+    </p:tnLst>
+  </p:timing>
+</p:sld>
+</file>
+
+<file path=ppt/slides/slide62.xml><?xml version="1.0" encoding="utf-8"?>
+<p:sld xmlns:a="http://schemas.openxmlformats.org/drawingml/2006/main" xmlns:r="http://schemas.openxmlformats.org/officeDocument/2006/relationships" xmlns:p="http://schemas.openxmlformats.org/presentationml/2006/main">
+  <p:cSld>
+    <p:spTree>
+      <p:nvGrpSpPr>
+        <p:cNvPr id="1" name=""/>
+        <p:cNvGrpSpPr/>
+        <p:nvPr/>
+      </p:nvGrpSpPr>
+      <p:grpSpPr>
+        <a:xfrm>
+          <a:off x="0" y="0"/>
+          <a:ext cx="0" cy="0"/>
+          <a:chOff x="0" y="0"/>
+          <a:chExt cx="0" cy="0"/>
+        </a:xfrm>
+      </p:grpSpPr>
+      <p:sp>
+        <p:nvSpPr>
+          <p:cNvPr id="2" name="Title 1"/>
+          <p:cNvSpPr>
+            <a:spLocks noGrp="1"/>
+          </p:cNvSpPr>
+          <p:nvPr>
+            <p:ph type="title"/>
+          </p:nvPr>
+        </p:nvSpPr>
+        <p:spPr>
+          <a:xfrm>
+            <a:off x="646111" y="452718"/>
+            <a:ext cx="10359346" cy="603951"/>
+          </a:xfrm>
+        </p:spPr>
+        <p:txBody>
+          <a:bodyPr/>
+          <a:lstStyle/>
+          <a:p>
+            <a:r>
+              <a:rPr lang="en-US" dirty="0" err="1" smtClean="0"/>
+              <a:t>Cyclomatic</a:t>
+            </a:r>
+            <a:r>
+              <a:rPr lang="en-US" dirty="0" smtClean="0"/>
+              <a:t> Complexity Analysis</a:t>
+            </a:r>
+            <a:endParaRPr lang="en-US" dirty="0"/>
+          </a:p>
+        </p:txBody>
+      </p:sp>
+      <p:sp>
+        <p:nvSpPr>
+          <p:cNvPr id="3" name="Content Placeholder 2"/>
+          <p:cNvSpPr>
+            <a:spLocks noGrp="1"/>
+          </p:cNvSpPr>
+          <p:nvPr>
+            <p:ph idx="1"/>
+          </p:nvPr>
+        </p:nvSpPr>
+        <p:spPr>
+          <a:xfrm>
+            <a:off x="456007" y="4356651"/>
+            <a:ext cx="4873377" cy="394963"/>
+          </a:xfrm>
+        </p:spPr>
+        <p:txBody>
+          <a:bodyPr>
+            <a:normAutofit lnSpcReduction="10000"/>
+          </a:bodyPr>
+          <a:lstStyle/>
+          <a:p>
+            <a:pPr marL="0" indent="0">
+              <a:buNone/>
+            </a:pPr>
+            <a:r>
+              <a:rPr lang="en-US" dirty="0" smtClean="0"/>
+              <a:t>File Client</a:t>
+            </a:r>
+            <a:endParaRPr lang="en-US" dirty="0"/>
+          </a:p>
+        </p:txBody>
+      </p:sp>
+      <p:sp>
+        <p:nvSpPr>
+          <p:cNvPr id="7" name="Content Placeholder 2"/>
+          <p:cNvSpPr txBox="1">
+            <a:spLocks/>
+          </p:cNvSpPr>
+          <p:nvPr/>
+        </p:nvSpPr>
+        <p:spPr>
+          <a:xfrm>
+            <a:off x="5747016" y="4356651"/>
+            <a:ext cx="4892464" cy="394963"/>
+          </a:xfrm>
+          <a:prstGeom prst="rect">
+            <a:avLst/>
+          </a:prstGeom>
+        </p:spPr>
+        <p:txBody>
+          <a:bodyPr vert="horz" lIns="91440" tIns="45720" rIns="91440" bIns="45720" rtlCol="0">
+            <a:normAutofit lnSpcReduction="10000"/>
+          </a:bodyPr>
+          <a:lstStyle>
+            <a:lvl1pPr marL="342900" indent="-342900" algn="l" defTabSz="457200" rtl="0" eaLnBrk="1" latinLnBrk="0" hangingPunct="1">
+              <a:spcBef>
+                <a:spcPts val="1000"/>
+              </a:spcBef>
+              <a:spcAft>
+                <a:spcPts val="0"/>
+              </a:spcAft>
+              <a:buClr>
+                <a:schemeClr val="bg2">
+                  <a:lumMod val="40000"/>
+                  <a:lumOff val="60000"/>
+                </a:schemeClr>
+              </a:buClr>
+              <a:buSzPct val="80000"/>
+              <a:buFont typeface="Wingdings 3" charset="2"/>
+              <a:buChar char=""/>
+              <a:defRPr sz="2000" b="0" i="0" kern="1200">
+                <a:solidFill>
+                  <a:schemeClr val="tx1"/>
+                </a:solidFill>
+                <a:latin typeface="+mj-lt"/>
+                <a:ea typeface="+mj-ea"/>
+                <a:cs typeface="+mj-cs"/>
+              </a:defRPr>
+            </a:lvl1pPr>
+            <a:lvl2pPr marL="742950" indent="-285750" algn="l" defTabSz="457200" rtl="0" eaLnBrk="1" latinLnBrk="0" hangingPunct="1">
+              <a:spcBef>
+                <a:spcPts val="1000"/>
+              </a:spcBef>
+              <a:spcAft>
+                <a:spcPts val="0"/>
+              </a:spcAft>
+              <a:buClr>
+                <a:schemeClr val="bg2">
+                  <a:lumMod val="40000"/>
+                  <a:lumOff val="60000"/>
+                </a:schemeClr>
+              </a:buClr>
+              <a:buSzPct val="80000"/>
+              <a:buFont typeface="Wingdings 3" charset="2"/>
+              <a:buChar char=""/>
+              <a:defRPr sz="1800" b="0" i="0" kern="1200">
+                <a:solidFill>
+                  <a:schemeClr val="tx1"/>
+                </a:solidFill>
+                <a:latin typeface="+mj-lt"/>
+                <a:ea typeface="+mj-ea"/>
+                <a:cs typeface="+mj-cs"/>
+              </a:defRPr>
+            </a:lvl2pPr>
+            <a:lvl3pPr marL="1143000" indent="-228600" algn="l" defTabSz="457200" rtl="0" eaLnBrk="1" latinLnBrk="0" hangingPunct="1">
+              <a:spcBef>
+                <a:spcPts val="1000"/>
+              </a:spcBef>
+              <a:spcAft>
+                <a:spcPts val="0"/>
+              </a:spcAft>
+              <a:buClr>
+                <a:schemeClr val="bg2">
+                  <a:lumMod val="40000"/>
+                  <a:lumOff val="60000"/>
+                </a:schemeClr>
+              </a:buClr>
+              <a:buSzPct val="80000"/>
+              <a:buFont typeface="Wingdings 3" charset="2"/>
+              <a:buChar char=""/>
+              <a:defRPr sz="1600" b="0" i="0" kern="1200">
+                <a:solidFill>
+                  <a:schemeClr val="tx1"/>
+                </a:solidFill>
+                <a:latin typeface="+mj-lt"/>
+                <a:ea typeface="+mj-ea"/>
+                <a:cs typeface="+mj-cs"/>
+              </a:defRPr>
+            </a:lvl3pPr>
+            <a:lvl4pPr marL="1600200" indent="-228600" algn="l" defTabSz="457200" rtl="0" eaLnBrk="1" latinLnBrk="0" hangingPunct="1">
+              <a:spcBef>
+                <a:spcPts val="1000"/>
+              </a:spcBef>
+              <a:spcAft>
+                <a:spcPts val="0"/>
+              </a:spcAft>
+              <a:buClr>
+                <a:schemeClr val="bg2">
+                  <a:lumMod val="40000"/>
+                  <a:lumOff val="60000"/>
+                </a:schemeClr>
+              </a:buClr>
+              <a:buSzPct val="80000"/>
+              <a:buFont typeface="Wingdings 3" charset="2"/>
+              <a:buChar char=""/>
+              <a:defRPr sz="1400" b="0" i="0" kern="1200">
+                <a:solidFill>
+                  <a:schemeClr val="tx1"/>
+                </a:solidFill>
+                <a:latin typeface="+mj-lt"/>
+                <a:ea typeface="+mj-ea"/>
+                <a:cs typeface="+mj-cs"/>
+              </a:defRPr>
+            </a:lvl4pPr>
+            <a:lvl5pPr marL="2057400" indent="-228600" algn="l" defTabSz="457200" rtl="0" eaLnBrk="1" latinLnBrk="0" hangingPunct="1">
+              <a:spcBef>
+                <a:spcPts val="1000"/>
+              </a:spcBef>
+              <a:spcAft>
+                <a:spcPts val="0"/>
+              </a:spcAft>
+              <a:buClr>
+                <a:schemeClr val="bg2">
+                  <a:lumMod val="40000"/>
+                  <a:lumOff val="60000"/>
+                </a:schemeClr>
+              </a:buClr>
+              <a:buSzPct val="80000"/>
+              <a:buFont typeface="Wingdings 3" charset="2"/>
+              <a:buChar char=""/>
+              <a:defRPr sz="1400" b="0" i="0" kern="1200">
+                <a:solidFill>
+                  <a:schemeClr val="tx1"/>
+                </a:solidFill>
+                <a:latin typeface="+mj-lt"/>
+                <a:ea typeface="+mj-ea"/>
+                <a:cs typeface="+mj-cs"/>
+              </a:defRPr>
+            </a:lvl5pPr>
+            <a:lvl6pPr marL="2506000" indent="-228600" algn="l" defTabSz="457200" rtl="0" eaLnBrk="1" latinLnBrk="0" hangingPunct="1">
+              <a:spcBef>
+                <a:spcPts val="1000"/>
+              </a:spcBef>
+              <a:spcAft>
+                <a:spcPts val="0"/>
+              </a:spcAft>
+              <a:buClr>
+                <a:schemeClr val="bg2">
+                  <a:lumMod val="40000"/>
+                  <a:lumOff val="60000"/>
+                </a:schemeClr>
+              </a:buClr>
+              <a:buSzPct val="80000"/>
+              <a:buFont typeface="Wingdings 3" charset="2"/>
+              <a:buChar char=""/>
+              <a:defRPr sz="1400" b="0" i="0" kern="1200">
+                <a:solidFill>
+                  <a:schemeClr val="tx1"/>
+                </a:solidFill>
+                <a:latin typeface="+mj-lt"/>
+                <a:ea typeface="+mj-ea"/>
+                <a:cs typeface="+mj-cs"/>
+              </a:defRPr>
+            </a:lvl6pPr>
+            <a:lvl7pPr marL="2971800" indent="-228600" algn="l" defTabSz="457200" rtl="0" eaLnBrk="1" latinLnBrk="0" hangingPunct="1">
+              <a:spcBef>
+                <a:spcPts val="1000"/>
+              </a:spcBef>
+              <a:spcAft>
+                <a:spcPts val="0"/>
+              </a:spcAft>
+              <a:buClr>
+                <a:schemeClr val="bg2">
+                  <a:lumMod val="40000"/>
+                  <a:lumOff val="60000"/>
+                </a:schemeClr>
+              </a:buClr>
+              <a:buSzPct val="80000"/>
+              <a:buFont typeface="Wingdings 3" charset="2"/>
+              <a:buChar char=""/>
+              <a:defRPr sz="1400" b="0" i="0" kern="1200">
+                <a:solidFill>
+                  <a:schemeClr val="tx1"/>
+                </a:solidFill>
+                <a:latin typeface="+mj-lt"/>
+                <a:ea typeface="+mj-ea"/>
+                <a:cs typeface="+mj-cs"/>
+              </a:defRPr>
+            </a:lvl7pPr>
+            <a:lvl8pPr marL="3429000" indent="-228600" algn="l" defTabSz="457200" rtl="0" eaLnBrk="1" latinLnBrk="0" hangingPunct="1">
+              <a:spcBef>
+                <a:spcPts val="1000"/>
+              </a:spcBef>
+              <a:spcAft>
+                <a:spcPts val="0"/>
+              </a:spcAft>
+              <a:buClr>
+                <a:schemeClr val="bg2">
+                  <a:lumMod val="40000"/>
+                  <a:lumOff val="60000"/>
+                </a:schemeClr>
+              </a:buClr>
+              <a:buSzPct val="80000"/>
+              <a:buFont typeface="Wingdings 3" charset="2"/>
+              <a:buChar char=""/>
+              <a:defRPr sz="1400" b="0" i="0" kern="1200">
+                <a:solidFill>
+                  <a:schemeClr val="tx1"/>
+                </a:solidFill>
+                <a:latin typeface="+mj-lt"/>
+                <a:ea typeface="+mj-ea"/>
+                <a:cs typeface="+mj-cs"/>
+              </a:defRPr>
+            </a:lvl8pPr>
+            <a:lvl9pPr marL="3886200" indent="-228600" algn="l" defTabSz="457200" rtl="0" eaLnBrk="1" latinLnBrk="0" hangingPunct="1">
+              <a:spcBef>
+                <a:spcPts val="1000"/>
+              </a:spcBef>
+              <a:spcAft>
+                <a:spcPts val="0"/>
+              </a:spcAft>
+              <a:buClr>
+                <a:schemeClr val="bg2">
+                  <a:lumMod val="40000"/>
+                  <a:lumOff val="60000"/>
+                </a:schemeClr>
+              </a:buClr>
+              <a:buSzPct val="80000"/>
+              <a:buFont typeface="Wingdings 3" charset="2"/>
+              <a:buChar char=""/>
+              <a:defRPr sz="1400" b="0" i="0" kern="1200">
+                <a:solidFill>
+                  <a:schemeClr val="tx1"/>
+                </a:solidFill>
+                <a:latin typeface="+mj-lt"/>
+                <a:ea typeface="+mj-ea"/>
+                <a:cs typeface="+mj-cs"/>
+              </a:defRPr>
+            </a:lvl9pPr>
+          </a:lstStyle>
+          <a:p>
+            <a:pPr marL="0" indent="0">
+              <a:buNone/>
+            </a:pPr>
+            <a:r>
+              <a:rPr lang="en-US" dirty="0" smtClean="0"/>
+              <a:t>Calculator</a:t>
+            </a:r>
+            <a:endParaRPr lang="en-US" dirty="0"/>
+          </a:p>
+        </p:txBody>
+      </p:sp>
+      <p:sp>
+        <p:nvSpPr>
+          <p:cNvPr id="8" name="Content Placeholder 2"/>
+          <p:cNvSpPr txBox="1">
+            <a:spLocks/>
+          </p:cNvSpPr>
+          <p:nvPr/>
+        </p:nvSpPr>
+        <p:spPr>
+          <a:xfrm>
+            <a:off x="436920" y="5102401"/>
+            <a:ext cx="10202560" cy="1233085"/>
+          </a:xfrm>
+          <a:prstGeom prst="rect">
+            <a:avLst/>
+          </a:prstGeom>
+        </p:spPr>
+        <p:txBody>
+          <a:bodyPr vert="horz" lIns="91440" tIns="45720" rIns="91440" bIns="45720" rtlCol="0">
+            <a:normAutofit fontScale="92500" lnSpcReduction="20000"/>
+          </a:bodyPr>
+          <a:lstStyle>
+            <a:lvl1pPr marL="342900" indent="-342900" algn="l" defTabSz="457200" rtl="0" eaLnBrk="1" latinLnBrk="0" hangingPunct="1">
+              <a:spcBef>
+                <a:spcPts val="1000"/>
+              </a:spcBef>
+              <a:spcAft>
+                <a:spcPts val="0"/>
+              </a:spcAft>
+              <a:buClr>
+                <a:schemeClr val="bg2">
+                  <a:lumMod val="40000"/>
+                  <a:lumOff val="60000"/>
+                </a:schemeClr>
+              </a:buClr>
+              <a:buSzPct val="80000"/>
+              <a:buFont typeface="Wingdings 3" charset="2"/>
+              <a:buChar char=""/>
+              <a:defRPr sz="2000" b="0" i="0" kern="1200">
+                <a:solidFill>
+                  <a:schemeClr val="tx1"/>
+                </a:solidFill>
+                <a:latin typeface="+mj-lt"/>
+                <a:ea typeface="+mj-ea"/>
+                <a:cs typeface="+mj-cs"/>
+              </a:defRPr>
+            </a:lvl1pPr>
+            <a:lvl2pPr marL="742950" indent="-285750" algn="l" defTabSz="457200" rtl="0" eaLnBrk="1" latinLnBrk="0" hangingPunct="1">
+              <a:spcBef>
+                <a:spcPts val="1000"/>
+              </a:spcBef>
+              <a:spcAft>
+                <a:spcPts val="0"/>
+              </a:spcAft>
+              <a:buClr>
+                <a:schemeClr val="bg2">
+                  <a:lumMod val="40000"/>
+                  <a:lumOff val="60000"/>
+                </a:schemeClr>
+              </a:buClr>
+              <a:buSzPct val="80000"/>
+              <a:buFont typeface="Wingdings 3" charset="2"/>
+              <a:buChar char=""/>
+              <a:defRPr sz="1800" b="0" i="0" kern="1200">
+                <a:solidFill>
+                  <a:schemeClr val="tx1"/>
+                </a:solidFill>
+                <a:latin typeface="+mj-lt"/>
+                <a:ea typeface="+mj-ea"/>
+                <a:cs typeface="+mj-cs"/>
+              </a:defRPr>
+            </a:lvl2pPr>
+            <a:lvl3pPr marL="1143000" indent="-228600" algn="l" defTabSz="457200" rtl="0" eaLnBrk="1" latinLnBrk="0" hangingPunct="1">
+              <a:spcBef>
+                <a:spcPts val="1000"/>
+              </a:spcBef>
+              <a:spcAft>
+                <a:spcPts val="0"/>
+              </a:spcAft>
+              <a:buClr>
+                <a:schemeClr val="bg2">
+                  <a:lumMod val="40000"/>
+                  <a:lumOff val="60000"/>
+                </a:schemeClr>
+              </a:buClr>
+              <a:buSzPct val="80000"/>
+              <a:buFont typeface="Wingdings 3" charset="2"/>
+              <a:buChar char=""/>
+              <a:defRPr sz="1600" b="0" i="0" kern="1200">
+                <a:solidFill>
+                  <a:schemeClr val="tx1"/>
+                </a:solidFill>
+                <a:latin typeface="+mj-lt"/>
+                <a:ea typeface="+mj-ea"/>
+                <a:cs typeface="+mj-cs"/>
+              </a:defRPr>
+            </a:lvl3pPr>
+            <a:lvl4pPr marL="1600200" indent="-228600" algn="l" defTabSz="457200" rtl="0" eaLnBrk="1" latinLnBrk="0" hangingPunct="1">
+              <a:spcBef>
+                <a:spcPts val="1000"/>
+              </a:spcBef>
+              <a:spcAft>
+                <a:spcPts val="0"/>
+              </a:spcAft>
+              <a:buClr>
+                <a:schemeClr val="bg2">
+                  <a:lumMod val="40000"/>
+                  <a:lumOff val="60000"/>
+                </a:schemeClr>
+              </a:buClr>
+              <a:buSzPct val="80000"/>
+              <a:buFont typeface="Wingdings 3" charset="2"/>
+              <a:buChar char=""/>
+              <a:defRPr sz="1400" b="0" i="0" kern="1200">
+                <a:solidFill>
+                  <a:schemeClr val="tx1"/>
+                </a:solidFill>
+                <a:latin typeface="+mj-lt"/>
+                <a:ea typeface="+mj-ea"/>
+                <a:cs typeface="+mj-cs"/>
+              </a:defRPr>
+            </a:lvl4pPr>
+            <a:lvl5pPr marL="2057400" indent="-228600" algn="l" defTabSz="457200" rtl="0" eaLnBrk="1" latinLnBrk="0" hangingPunct="1">
+              <a:spcBef>
+                <a:spcPts val="1000"/>
+              </a:spcBef>
+              <a:spcAft>
+                <a:spcPts val="0"/>
+              </a:spcAft>
+              <a:buClr>
+                <a:schemeClr val="bg2">
+                  <a:lumMod val="40000"/>
+                  <a:lumOff val="60000"/>
+                </a:schemeClr>
+              </a:buClr>
+              <a:buSzPct val="80000"/>
+              <a:buFont typeface="Wingdings 3" charset="2"/>
+              <a:buChar char=""/>
+              <a:defRPr sz="1400" b="0" i="0" kern="1200">
+                <a:solidFill>
+                  <a:schemeClr val="tx1"/>
+                </a:solidFill>
+                <a:latin typeface="+mj-lt"/>
+                <a:ea typeface="+mj-ea"/>
+                <a:cs typeface="+mj-cs"/>
+              </a:defRPr>
+            </a:lvl5pPr>
+            <a:lvl6pPr marL="2506000" indent="-228600" algn="l" defTabSz="457200" rtl="0" eaLnBrk="1" latinLnBrk="0" hangingPunct="1">
+              <a:spcBef>
+                <a:spcPts val="1000"/>
+              </a:spcBef>
+              <a:spcAft>
+                <a:spcPts val="0"/>
+              </a:spcAft>
+              <a:buClr>
+                <a:schemeClr val="bg2">
+                  <a:lumMod val="40000"/>
+                  <a:lumOff val="60000"/>
+                </a:schemeClr>
+              </a:buClr>
+              <a:buSzPct val="80000"/>
+              <a:buFont typeface="Wingdings 3" charset="2"/>
+              <a:buChar char=""/>
+              <a:defRPr sz="1400" b="0" i="0" kern="1200">
+                <a:solidFill>
+                  <a:schemeClr val="tx1"/>
+                </a:solidFill>
+                <a:latin typeface="+mj-lt"/>
+                <a:ea typeface="+mj-ea"/>
+                <a:cs typeface="+mj-cs"/>
+              </a:defRPr>
+            </a:lvl6pPr>
+            <a:lvl7pPr marL="2971800" indent="-228600" algn="l" defTabSz="457200" rtl="0" eaLnBrk="1" latinLnBrk="0" hangingPunct="1">
+              <a:spcBef>
+                <a:spcPts val="1000"/>
+              </a:spcBef>
+              <a:spcAft>
+                <a:spcPts val="0"/>
+              </a:spcAft>
+              <a:buClr>
+                <a:schemeClr val="bg2">
+                  <a:lumMod val="40000"/>
+                  <a:lumOff val="60000"/>
+                </a:schemeClr>
+              </a:buClr>
+              <a:buSzPct val="80000"/>
+              <a:buFont typeface="Wingdings 3" charset="2"/>
+              <a:buChar char=""/>
+              <a:defRPr sz="1400" b="0" i="0" kern="1200">
+                <a:solidFill>
+                  <a:schemeClr val="tx1"/>
+                </a:solidFill>
+                <a:latin typeface="+mj-lt"/>
+                <a:ea typeface="+mj-ea"/>
+                <a:cs typeface="+mj-cs"/>
+              </a:defRPr>
+            </a:lvl7pPr>
+            <a:lvl8pPr marL="3429000" indent="-228600" algn="l" defTabSz="457200" rtl="0" eaLnBrk="1" latinLnBrk="0" hangingPunct="1">
+              <a:spcBef>
+                <a:spcPts val="1000"/>
+              </a:spcBef>
+              <a:spcAft>
+                <a:spcPts val="0"/>
+              </a:spcAft>
+              <a:buClr>
+                <a:schemeClr val="bg2">
+                  <a:lumMod val="40000"/>
+                  <a:lumOff val="60000"/>
+                </a:schemeClr>
+              </a:buClr>
+              <a:buSzPct val="80000"/>
+              <a:buFont typeface="Wingdings 3" charset="2"/>
+              <a:buChar char=""/>
+              <a:defRPr sz="1400" b="0" i="0" kern="1200">
+                <a:solidFill>
+                  <a:schemeClr val="tx1"/>
+                </a:solidFill>
+                <a:latin typeface="+mj-lt"/>
+                <a:ea typeface="+mj-ea"/>
+                <a:cs typeface="+mj-cs"/>
+              </a:defRPr>
+            </a:lvl8pPr>
+            <a:lvl9pPr marL="3886200" indent="-228600" algn="l" defTabSz="457200" rtl="0" eaLnBrk="1" latinLnBrk="0" hangingPunct="1">
+              <a:spcBef>
+                <a:spcPts val="1000"/>
+              </a:spcBef>
+              <a:spcAft>
+                <a:spcPts val="0"/>
+              </a:spcAft>
+              <a:buClr>
+                <a:schemeClr val="bg2">
+                  <a:lumMod val="40000"/>
+                  <a:lumOff val="60000"/>
+                </a:schemeClr>
+              </a:buClr>
+              <a:buSzPct val="80000"/>
+              <a:buFont typeface="Wingdings 3" charset="2"/>
+              <a:buChar char=""/>
+              <a:defRPr sz="1400" b="0" i="0" kern="1200">
+                <a:solidFill>
+                  <a:schemeClr val="tx1"/>
+                </a:solidFill>
+                <a:latin typeface="+mj-lt"/>
+                <a:ea typeface="+mj-ea"/>
+                <a:cs typeface="+mj-cs"/>
+              </a:defRPr>
+            </a:lvl9pPr>
+          </a:lstStyle>
+          <a:p>
+            <a:r>
+              <a:rPr lang="en-US" dirty="0" smtClean="0"/>
+              <a:t>Lower average CCN for generated code is strongest indicator that larger computational problems are being broken down into smaller ones.</a:t>
+            </a:r>
+          </a:p>
+          <a:p>
+            <a:r>
+              <a:rPr lang="en-US" dirty="0" smtClean="0"/>
+              <a:t>Median CCN for generated test cases are &lt;= lowest values of the non-generated test cases.</a:t>
+            </a:r>
+          </a:p>
+        </p:txBody>
+      </p:sp>
+      <p:pic>
+        <p:nvPicPr>
+          <p:cNvPr id="4" name="Picture 3"/>
+          <p:cNvPicPr>
+            <a:picLocks noChangeAspect="1"/>
+          </p:cNvPicPr>
+          <p:nvPr/>
+        </p:nvPicPr>
+        <p:blipFill>
+          <a:blip r:embed="rId2"/>
+          <a:stretch>
+            <a:fillRect/>
+          </a:stretch>
+        </p:blipFill>
+        <p:spPr>
+          <a:xfrm>
+            <a:off x="456007" y="1232062"/>
+            <a:ext cx="4892464" cy="2949196"/>
+          </a:xfrm>
+          <a:prstGeom prst="rect">
+            <a:avLst/>
+          </a:prstGeom>
+        </p:spPr>
+      </p:pic>
+      <p:pic>
+        <p:nvPicPr>
+          <p:cNvPr id="5" name="Picture 4"/>
+          <p:cNvPicPr>
+            <a:picLocks noChangeAspect="1"/>
+          </p:cNvPicPr>
+          <p:nvPr/>
+        </p:nvPicPr>
+        <p:blipFill>
+          <a:blip r:embed="rId3"/>
+          <a:stretch>
+            <a:fillRect/>
+          </a:stretch>
+        </p:blipFill>
+        <p:spPr>
+          <a:xfrm>
+            <a:off x="5825784" y="1232062"/>
+            <a:ext cx="4892464" cy="2949196"/>
+          </a:xfrm>
+          <a:prstGeom prst="rect">
+            <a:avLst/>
+          </a:prstGeom>
+        </p:spPr>
+      </p:pic>
+    </p:spTree>
+    <p:extLst>
+      <p:ext uri="{BB962C8B-B14F-4D97-AF65-F5344CB8AC3E}">
+        <p14:creationId xmlns:p14="http://schemas.microsoft.com/office/powerpoint/2010/main" val="621302278"/>
+      </p:ext>
+    </p:extLst>
+  </p:cSld>
+  <p:clrMapOvr>
+    <a:masterClrMapping/>
+  </p:clrMapOvr>
+  <p:timing>
+    <p:tnLst>
+      <p:par>
+        <p:cTn id="1" dur="indefinite" restart="never" nodeType="tmRoot"/>
+      </p:par>
+    </p:tnLst>
+  </p:timing>
+</p:sld>
+</file>
+
+<file path=ppt/slides/slide63.xml><?xml version="1.0" encoding="utf-8"?>
+<p:sld xmlns:a="http://schemas.openxmlformats.org/drawingml/2006/main" xmlns:r="http://schemas.openxmlformats.org/officeDocument/2006/relationships" xmlns:p="http://schemas.openxmlformats.org/presentationml/2006/main">
+  <p:cSld>
+    <p:spTree>
+      <p:nvGrpSpPr>
+        <p:cNvPr id="1" name=""/>
+        <p:cNvGrpSpPr/>
+        <p:nvPr/>
+      </p:nvGrpSpPr>
+      <p:grpSpPr>
+        <a:xfrm>
+          <a:off x="0" y="0"/>
+          <a:ext cx="0" cy="0"/>
+          <a:chOff x="0" y="0"/>
+          <a:chExt cx="0" cy="0"/>
+        </a:xfrm>
+      </p:grpSpPr>
+      <p:sp>
+        <p:nvSpPr>
+          <p:cNvPr id="2" name="Title 1"/>
+          <p:cNvSpPr>
+            <a:spLocks noGrp="1"/>
+          </p:cNvSpPr>
+          <p:nvPr>
+            <p:ph type="title"/>
+          </p:nvPr>
+        </p:nvSpPr>
+        <p:spPr/>
+        <p:txBody>
+          <a:bodyPr/>
+          <a:lstStyle/>
+          <a:p>
+            <a:r>
+              <a:rPr lang="en-US" dirty="0" err="1" smtClean="0"/>
+              <a:t>Cyclomatic</a:t>
+            </a:r>
+            <a:r>
+              <a:rPr lang="en-US" dirty="0" smtClean="0"/>
+              <a:t> Complexity as an</a:t>
+            </a:r>
+            <a:br>
+              <a:rPr lang="en-US" dirty="0" smtClean="0"/>
+            </a:br>
+            <a:r>
+              <a:rPr lang="en-US" dirty="0" smtClean="0"/>
+              <a:t>indicator of defects</a:t>
+            </a:r>
+            <a:endParaRPr lang="en-US" dirty="0"/>
+          </a:p>
+        </p:txBody>
+      </p:sp>
+      <p:sp>
+        <p:nvSpPr>
+          <p:cNvPr id="3" name="Content Placeholder 2"/>
+          <p:cNvSpPr>
+            <a:spLocks noGrp="1"/>
+          </p:cNvSpPr>
+          <p:nvPr>
+            <p:ph idx="1"/>
+          </p:nvPr>
+        </p:nvSpPr>
+        <p:spPr/>
+        <p:txBody>
+          <a:bodyPr/>
+          <a:lstStyle/>
+          <a:p>
+            <a:r>
+              <a:rPr lang="en-US" dirty="0" smtClean="0"/>
+              <a:t>Zhang and Zhang were able to effectively predict defects in code based on higher the </a:t>
+            </a:r>
+            <a:r>
+              <a:rPr lang="en-US" dirty="0" err="1" smtClean="0"/>
+              <a:t>cyclomatic</a:t>
+            </a:r>
+            <a:r>
+              <a:rPr lang="en-US" dirty="0" smtClean="0"/>
+              <a:t> complexity values.</a:t>
+            </a:r>
+          </a:p>
+          <a:p>
+            <a:r>
+              <a:rPr lang="en-US" dirty="0" smtClean="0"/>
+              <a:t>Generated code has </a:t>
+            </a:r>
+          </a:p>
+          <a:p>
+            <a:pPr lvl="1"/>
+            <a:r>
+              <a:rPr lang="en-US" dirty="0" smtClean="0"/>
+              <a:t>shorter interquartile ranges</a:t>
+            </a:r>
+          </a:p>
+          <a:p>
+            <a:pPr lvl="1"/>
+            <a:r>
+              <a:rPr lang="en-US" dirty="0" smtClean="0"/>
+              <a:t>Medians &lt;= lowest quartiles of the non-generated code</a:t>
+            </a:r>
+          </a:p>
+          <a:p>
+            <a:r>
+              <a:rPr lang="en-US" dirty="0" smtClean="0"/>
+              <a:t>Conclusion: a greater number of functions in the code generated from TEBNF have fewer defects than non-generated code.</a:t>
+            </a:r>
+          </a:p>
+          <a:p>
+            <a:r>
+              <a:rPr lang="en-US" dirty="0" smtClean="0"/>
+              <a:t>This correlation means it is likely that as applications increase in size and scope, number of defects will remain lower in code generated from TEBNF.</a:t>
+            </a:r>
+          </a:p>
+          <a:p>
+            <a:pPr marL="0" indent="0">
+              <a:buNone/>
+            </a:pPr>
+            <a:endParaRPr lang="en-US" dirty="0"/>
+          </a:p>
+        </p:txBody>
+      </p:sp>
+    </p:spTree>
+    <p:extLst>
+      <p:ext uri="{BB962C8B-B14F-4D97-AF65-F5344CB8AC3E}">
+        <p14:creationId xmlns:p14="http://schemas.microsoft.com/office/powerpoint/2010/main" val="3909135695"/>
+      </p:ext>
+    </p:extLst>
+  </p:cSld>
+  <p:clrMapOvr>
+    <a:masterClrMapping/>
+  </p:clrMapOvr>
+</p:sld>
+</file>
+
+<file path=ppt/slides/slide64.xml><?xml version="1.0" encoding="utf-8"?>
+<p:sld xmlns:a="http://schemas.openxmlformats.org/drawingml/2006/main" xmlns:r="http://schemas.openxmlformats.org/officeDocument/2006/relationships" xmlns:p="http://schemas.openxmlformats.org/presentationml/2006/main">
+  <p:cSld>
+    <p:spTree>
+      <p:nvGrpSpPr>
+        <p:cNvPr id="1" name=""/>
+        <p:cNvGrpSpPr/>
+        <p:nvPr/>
+      </p:nvGrpSpPr>
+      <p:grpSpPr>
+        <a:xfrm>
+          <a:off x="0" y="0"/>
+          <a:ext cx="0" cy="0"/>
+          <a:chOff x="0" y="0"/>
+          <a:chExt cx="0" cy="0"/>
+        </a:xfrm>
+      </p:grpSpPr>
+      <p:sp>
+        <p:nvSpPr>
+          <p:cNvPr id="2" name="Title 1"/>
+          <p:cNvSpPr>
+            <a:spLocks noGrp="1"/>
+          </p:cNvSpPr>
+          <p:nvPr>
+            <p:ph type="title"/>
+          </p:nvPr>
+        </p:nvSpPr>
+        <p:spPr/>
+        <p:txBody>
+          <a:bodyPr/>
+          <a:lstStyle/>
+          <a:p>
+            <a:r>
+              <a:rPr lang="en-US" dirty="0" smtClean="0"/>
+              <a:t>Future Work</a:t>
+            </a:r>
+            <a:endParaRPr lang="en-US" dirty="0"/>
+          </a:p>
+        </p:txBody>
+      </p:sp>
+      <p:sp>
+        <p:nvSpPr>
+          <p:cNvPr id="3" name="Content Placeholder 2"/>
+          <p:cNvSpPr>
+            <a:spLocks noGrp="1"/>
+          </p:cNvSpPr>
+          <p:nvPr>
+            <p:ph idx="1"/>
+          </p:nvPr>
+        </p:nvSpPr>
+        <p:spPr/>
+        <p:txBody>
+          <a:bodyPr/>
+          <a:lstStyle/>
+          <a:p>
+            <a:r>
+              <a:rPr lang="en-US" dirty="0" smtClean="0"/>
+              <a:t>The TEBNF code generation tool can likely be optimized to produce better code.</a:t>
+            </a:r>
+          </a:p>
+          <a:p>
+            <a:r>
+              <a:rPr lang="en-US" dirty="0" smtClean="0"/>
+              <a:t>Add more I/O methods to TEBNF and the tool.</a:t>
+            </a:r>
+          </a:p>
+          <a:p>
+            <a:r>
+              <a:rPr lang="en-US" dirty="0" smtClean="0"/>
+              <a:t>Automatically generate graphical user interfaces.</a:t>
+            </a:r>
+            <a:endParaRPr lang="en-US" dirty="0"/>
+          </a:p>
+        </p:txBody>
+      </p:sp>
+    </p:spTree>
+    <p:extLst>
+      <p:ext uri="{BB962C8B-B14F-4D97-AF65-F5344CB8AC3E}">
+        <p14:creationId xmlns:p14="http://schemas.microsoft.com/office/powerpoint/2010/main" val="1023650706"/>
+      </p:ext>
+    </p:extLst>
+  </p:cSld>
+  <p:clrMapOvr>
+    <a:masterClrMapping/>
+  </p:clrMapOvr>
 </p:sld>
 </file>
 

</xml_diff>

<commit_message>
Updating the defense presentation slides
</commit_message>
<xml_diff>
--- a/DefensePresentation.pptx
+++ b/DefensePresentation.pptx
@@ -30,11 +30,11 @@
     <p:sldId id="278" r:id="rId24"/>
     <p:sldId id="279" r:id="rId25"/>
     <p:sldId id="281" r:id="rId26"/>
-    <p:sldId id="280" r:id="rId27"/>
-    <p:sldId id="282" r:id="rId28"/>
-    <p:sldId id="283" r:id="rId29"/>
-    <p:sldId id="285" r:id="rId30"/>
-    <p:sldId id="284" r:id="rId31"/>
+    <p:sldId id="282" r:id="rId27"/>
+    <p:sldId id="283" r:id="rId28"/>
+    <p:sldId id="285" r:id="rId29"/>
+    <p:sldId id="284" r:id="rId30"/>
+    <p:sldId id="322" r:id="rId31"/>
     <p:sldId id="286" r:id="rId32"/>
     <p:sldId id="287" r:id="rId33"/>
     <p:sldId id="289" r:id="rId34"/>
@@ -56,19 +56,19 @@
     <p:sldId id="306" r:id="rId50"/>
     <p:sldId id="307" r:id="rId51"/>
     <p:sldId id="308" r:id="rId52"/>
-    <p:sldId id="309" r:id="rId53"/>
-    <p:sldId id="310" r:id="rId54"/>
-    <p:sldId id="311" r:id="rId55"/>
-    <p:sldId id="312" r:id="rId56"/>
-    <p:sldId id="313" r:id="rId57"/>
-    <p:sldId id="314" r:id="rId58"/>
-    <p:sldId id="315" r:id="rId59"/>
-    <p:sldId id="316" r:id="rId60"/>
-    <p:sldId id="318" r:id="rId61"/>
-    <p:sldId id="317" r:id="rId62"/>
-    <p:sldId id="319" r:id="rId63"/>
-    <p:sldId id="320" r:id="rId64"/>
-    <p:sldId id="321" r:id="rId65"/>
+    <p:sldId id="323" r:id="rId53"/>
+    <p:sldId id="309" r:id="rId54"/>
+    <p:sldId id="310" r:id="rId55"/>
+    <p:sldId id="311" r:id="rId56"/>
+    <p:sldId id="312" r:id="rId57"/>
+    <p:sldId id="313" r:id="rId58"/>
+    <p:sldId id="314" r:id="rId59"/>
+    <p:sldId id="315" r:id="rId60"/>
+    <p:sldId id="316" r:id="rId61"/>
+    <p:sldId id="318" r:id="rId62"/>
+    <p:sldId id="317" r:id="rId63"/>
+    <p:sldId id="319" r:id="rId64"/>
+    <p:sldId id="320" r:id="rId65"/>
   </p:sldIdLst>
   <p:sldSz cx="12192000" cy="6858000"/>
   <p:notesSz cx="6858000" cy="9144000"/>
@@ -6843,7 +6843,15 @@
             <a:pPr lvl="1"/>
             <a:r>
               <a:rPr lang="en-US" dirty="0"/>
-              <a:t>Accept input data through console, le, or UDP/IP.</a:t>
+              <a:t>Accept input data through console, </a:t>
+            </a:r>
+            <a:r>
+              <a:rPr lang="en-US" dirty="0" smtClean="0"/>
+              <a:t>file</a:t>
+            </a:r>
+            <a:r>
+              <a:rPr lang="en-US" dirty="0"/>
+              <a:t>, or UDP/IP.</a:t>
             </a:r>
           </a:p>
           <a:p>
@@ -7011,13 +7019,19 @@
             <p:ph type="title"/>
           </p:nvPr>
         </p:nvSpPr>
-        <p:spPr/>
+        <p:spPr>
+          <a:xfrm>
+            <a:off x="1177053" y="3225415"/>
+            <a:ext cx="9404723" cy="1400530"/>
+          </a:xfrm>
+        </p:spPr>
         <p:txBody>
           <a:bodyPr/>
           <a:lstStyle/>
           <a:p>
-            <a:r>
-              <a:rPr lang="en-US" dirty="0"/>
+            <a:pPr algn="ctr"/>
+            <a:r>
+              <a:rPr lang="en-US" sz="6000" dirty="0"/>
               <a:t>Architecture of the Tool</a:t>
             </a:r>
           </a:p>
@@ -8068,7 +8082,7 @@
           <a:p>
             <a:r>
               <a:rPr lang="en-US" dirty="0" smtClean="0"/>
-              <a:t>Code Generation</a:t>
+              <a:t>Why Code Generation?</a:t>
             </a:r>
             <a:endParaRPr lang="en-US" dirty="0"/>
           </a:p>
@@ -9761,6 +9775,52 @@
       </p:grpSpPr>
       <p:sp>
         <p:nvSpPr>
+          <p:cNvPr id="8" name="Right Arrow 7"/>
+          <p:cNvSpPr/>
+          <p:nvPr/>
+        </p:nvSpPr>
+        <p:spPr>
+          <a:xfrm>
+            <a:off x="176169" y="2289764"/>
+            <a:ext cx="2839767" cy="1325460"/>
+          </a:xfrm>
+          <a:prstGeom prst="rightArrow">
+            <a:avLst>
+              <a:gd name="adj1" fmla="val 50000"/>
+              <a:gd name="adj2" fmla="val 40972"/>
+            </a:avLst>
+          </a:prstGeom>
+          <a:solidFill>
+            <a:srgbClr val="FFFF00"/>
+          </a:solidFill>
+        </p:spPr>
+        <p:style>
+          <a:lnRef idx="2">
+            <a:schemeClr val="accent1">
+              <a:shade val="50000"/>
+            </a:schemeClr>
+          </a:lnRef>
+          <a:fillRef idx="1">
+            <a:schemeClr val="accent1"/>
+          </a:fillRef>
+          <a:effectRef idx="0">
+            <a:schemeClr val="accent1"/>
+          </a:effectRef>
+          <a:fontRef idx="minor">
+            <a:schemeClr val="lt1"/>
+          </a:fontRef>
+        </p:style>
+        <p:txBody>
+          <a:bodyPr rtlCol="0" anchor="ctr"/>
+          <a:lstStyle/>
+          <a:p>
+            <a:pPr algn="ctr"/>
+            <a:endParaRPr lang="en-US"/>
+          </a:p>
+        </p:txBody>
+      </p:sp>
+      <p:sp>
+        <p:nvSpPr>
           <p:cNvPr id="2" name="Title 1"/>
           <p:cNvSpPr>
             <a:spLocks noGrp="1"/>
@@ -9837,8 +9897,28 @@
               <a:buAutoNum type="arabicPeriod"/>
             </a:pPr>
             <a:r>
-              <a:rPr lang="en-US" dirty="0" smtClean="0"/>
-              <a:t>What input methods data is received on.</a:t>
+              <a:rPr lang="en-US" b="1" dirty="0" smtClean="0">
+                <a:solidFill>
+                  <a:srgbClr val="FFFF00"/>
+                </a:solidFill>
+              </a:rPr>
+              <a:t>What input </a:t>
+            </a:r>
+            <a:r>
+              <a:rPr lang="en-US" b="1" dirty="0" smtClean="0">
+                <a:solidFill>
+                  <a:srgbClr val="FFFF00"/>
+                </a:solidFill>
+              </a:rPr>
+              <a:t>method </a:t>
+            </a:r>
+            <a:r>
+              <a:rPr lang="en-US" b="1" dirty="0" smtClean="0">
+                <a:solidFill>
+                  <a:srgbClr val="FFFF00"/>
+                </a:solidFill>
+              </a:rPr>
+              <a:t>data is received on.</a:t>
             </a:r>
           </a:p>
           <a:p>
@@ -9883,7 +9963,7 @@
     </p:spTree>
     <p:extLst>
       <p:ext uri="{BB962C8B-B14F-4D97-AF65-F5344CB8AC3E}">
-        <p14:creationId xmlns:p14="http://schemas.microsoft.com/office/powerpoint/2010/main" val="1633408750"/>
+        <p14:creationId xmlns:p14="http://schemas.microsoft.com/office/powerpoint/2010/main" val="952413909"/>
       </p:ext>
     </p:extLst>
   </p:cSld>
@@ -9919,214 +9999,6 @@
       </p:grpSpPr>
       <p:sp>
         <p:nvSpPr>
-          <p:cNvPr id="8" name="Right Arrow 7"/>
-          <p:cNvSpPr/>
-          <p:nvPr/>
-        </p:nvSpPr>
-        <p:spPr>
-          <a:xfrm>
-            <a:off x="176169" y="2289764"/>
-            <a:ext cx="2839767" cy="1325460"/>
-          </a:xfrm>
-          <a:prstGeom prst="rightArrow">
-            <a:avLst>
-              <a:gd name="adj1" fmla="val 50000"/>
-              <a:gd name="adj2" fmla="val 40972"/>
-            </a:avLst>
-          </a:prstGeom>
-          <a:solidFill>
-            <a:srgbClr val="FFFF00"/>
-          </a:solidFill>
-        </p:spPr>
-        <p:style>
-          <a:lnRef idx="2">
-            <a:schemeClr val="accent1">
-              <a:shade val="50000"/>
-            </a:schemeClr>
-          </a:lnRef>
-          <a:fillRef idx="1">
-            <a:schemeClr val="accent1"/>
-          </a:fillRef>
-          <a:effectRef idx="0">
-            <a:schemeClr val="accent1"/>
-          </a:effectRef>
-          <a:fontRef idx="minor">
-            <a:schemeClr val="lt1"/>
-          </a:fontRef>
-        </p:style>
-        <p:txBody>
-          <a:bodyPr rtlCol="0" anchor="ctr"/>
-          <a:lstStyle/>
-          <a:p>
-            <a:pPr algn="ctr"/>
-            <a:endParaRPr lang="en-US"/>
-          </a:p>
-        </p:txBody>
-      </p:sp>
-      <p:sp>
-        <p:nvSpPr>
-          <p:cNvPr id="2" name="Title 1"/>
-          <p:cNvSpPr>
-            <a:spLocks noGrp="1"/>
-          </p:cNvSpPr>
-          <p:nvPr>
-            <p:ph type="title"/>
-          </p:nvPr>
-        </p:nvSpPr>
-        <p:spPr/>
-        <p:txBody>
-          <a:bodyPr/>
-          <a:lstStyle/>
-          <a:p>
-            <a:r>
-              <a:rPr lang="en-US" sz="3600" dirty="0" smtClean="0"/>
-              <a:t>Order of Execution for Code Generated by TEBNF Code Generation Tool</a:t>
-            </a:r>
-            <a:endParaRPr lang="en-US" sz="3600" dirty="0"/>
-          </a:p>
-        </p:txBody>
-      </p:sp>
-      <p:pic>
-        <p:nvPicPr>
-          <p:cNvPr id="6" name="Picture 5"/>
-          <p:cNvPicPr>
-            <a:picLocks noChangeAspect="1"/>
-          </p:cNvPicPr>
-          <p:nvPr/>
-        </p:nvPicPr>
-        <p:blipFill>
-          <a:blip r:embed="rId2"/>
-          <a:stretch>
-            <a:fillRect/>
-          </a:stretch>
-        </p:blipFill>
-        <p:spPr>
-          <a:xfrm>
-            <a:off x="108659" y="1641019"/>
-            <a:ext cx="5638557" cy="5135336"/>
-          </a:xfrm>
-          <a:prstGeom prst="rect">
-            <a:avLst/>
-          </a:prstGeom>
-        </p:spPr>
-      </p:pic>
-      <p:sp>
-        <p:nvSpPr>
-          <p:cNvPr id="7" name="Content Placeholder 2"/>
-          <p:cNvSpPr>
-            <a:spLocks noGrp="1"/>
-          </p:cNvSpPr>
-          <p:nvPr>
-            <p:ph idx="1"/>
-          </p:nvPr>
-        </p:nvSpPr>
-        <p:spPr>
-          <a:xfrm>
-            <a:off x="5976253" y="2024744"/>
-            <a:ext cx="5927272" cy="4223656"/>
-          </a:xfrm>
-        </p:spPr>
-        <p:txBody>
-          <a:bodyPr/>
-          <a:lstStyle/>
-          <a:p>
-            <a:r>
-              <a:rPr lang="en-US" dirty="0" smtClean="0"/>
-              <a:t>State steps shape the way TEBNF elements interact with each other and input data by determining:</a:t>
-            </a:r>
-          </a:p>
-          <a:p>
-            <a:pPr marL="857250" lvl="1" indent="-457200">
-              <a:buFont typeface="+mj-lt"/>
-              <a:buAutoNum type="arabicPeriod"/>
-            </a:pPr>
-            <a:r>
-              <a:rPr lang="en-US" b="1" dirty="0" smtClean="0">
-                <a:solidFill>
-                  <a:srgbClr val="FFFF00"/>
-                </a:solidFill>
-              </a:rPr>
-              <a:t>What input methods data is received on.</a:t>
-            </a:r>
-          </a:p>
-          <a:p>
-            <a:pPr marL="857250" lvl="1" indent="-457200">
-              <a:buFont typeface="+mj-lt"/>
-              <a:buAutoNum type="arabicPeriod"/>
-            </a:pPr>
-            <a:r>
-              <a:rPr lang="en-US" dirty="0" smtClean="0"/>
-              <a:t>What parts of the received data match defined grammar patterns.</a:t>
-            </a:r>
-          </a:p>
-          <a:p>
-            <a:pPr marL="857250" lvl="1" indent="-457200">
-              <a:buFont typeface="+mj-lt"/>
-              <a:buAutoNum type="arabicPeriod"/>
-            </a:pPr>
-            <a:r>
-              <a:rPr lang="en-US" dirty="0" smtClean="0"/>
-              <a:t>What code actions are executed.</a:t>
-            </a:r>
-          </a:p>
-          <a:p>
-            <a:pPr marL="857250" lvl="1" indent="-457200">
-              <a:buFont typeface="+mj-lt"/>
-              <a:buAutoNum type="arabicPeriod"/>
-            </a:pPr>
-            <a:r>
-              <a:rPr lang="en-US" dirty="0"/>
-              <a:t>What method is used to output data.</a:t>
-            </a:r>
-          </a:p>
-          <a:p>
-            <a:pPr marL="857250" lvl="1" indent="-457200">
-              <a:buFont typeface="+mj-lt"/>
-              <a:buAutoNum type="arabicPeriod"/>
-            </a:pPr>
-            <a:endParaRPr lang="en-US" dirty="0"/>
-          </a:p>
-        </p:txBody>
-      </p:sp>
-    </p:spTree>
-    <p:extLst>
-      <p:ext uri="{BB962C8B-B14F-4D97-AF65-F5344CB8AC3E}">
-        <p14:creationId xmlns:p14="http://schemas.microsoft.com/office/powerpoint/2010/main" val="952413909"/>
-      </p:ext>
-    </p:extLst>
-  </p:cSld>
-  <p:clrMapOvr>
-    <a:masterClrMapping/>
-  </p:clrMapOvr>
-  <p:timing>
-    <p:tnLst>
-      <p:par>
-        <p:cTn id="1" dur="indefinite" restart="never" nodeType="tmRoot"/>
-      </p:par>
-    </p:tnLst>
-  </p:timing>
-</p:sld>
-</file>
-
-<file path=ppt/slides/slide28.xml><?xml version="1.0" encoding="utf-8"?>
-<p:sld xmlns:a="http://schemas.openxmlformats.org/drawingml/2006/main" xmlns:r="http://schemas.openxmlformats.org/officeDocument/2006/relationships" xmlns:p="http://schemas.openxmlformats.org/presentationml/2006/main">
-  <p:cSld>
-    <p:spTree>
-      <p:nvGrpSpPr>
-        <p:cNvPr id="1" name=""/>
-        <p:cNvGrpSpPr/>
-        <p:nvPr/>
-      </p:nvGrpSpPr>
-      <p:grpSpPr>
-        <a:xfrm>
-          <a:off x="0" y="0"/>
-          <a:ext cx="0" cy="0"/>
-          <a:chOff x="0" y="0"/>
-          <a:chExt cx="0" cy="0"/>
-        </a:xfrm>
-      </p:grpSpPr>
-      <p:sp>
-        <p:nvSpPr>
           <p:cNvPr id="5" name="Rectangle 4"/>
           <p:cNvSpPr/>
           <p:nvPr/>
@@ -10306,7 +10178,7 @@
 </p:sld>
 </file>
 
-<file path=ppt/slides/slide29.xml><?xml version="1.0" encoding="utf-8"?>
+<file path=ppt/slides/slide28.xml><?xml version="1.0" encoding="utf-8"?>
 <p:sld xmlns:a="http://schemas.openxmlformats.org/drawingml/2006/main" xmlns:r="http://schemas.openxmlformats.org/officeDocument/2006/relationships" xmlns:p="http://schemas.openxmlformats.org/presentationml/2006/main">
   <p:cSld>
     <p:spTree>
@@ -10523,6 +10395,230 @@
 </p:sld>
 </file>
 
+<file path=ppt/slides/slide29.xml><?xml version="1.0" encoding="utf-8"?>
+<p:sld xmlns:a="http://schemas.openxmlformats.org/drawingml/2006/main" xmlns:r="http://schemas.openxmlformats.org/officeDocument/2006/relationships" xmlns:p="http://schemas.openxmlformats.org/presentationml/2006/main">
+  <p:cSld>
+    <p:spTree>
+      <p:nvGrpSpPr>
+        <p:cNvPr id="1" name=""/>
+        <p:cNvGrpSpPr/>
+        <p:nvPr/>
+      </p:nvGrpSpPr>
+      <p:grpSpPr>
+        <a:xfrm>
+          <a:off x="0" y="0"/>
+          <a:ext cx="0" cy="0"/>
+          <a:chOff x="0" y="0"/>
+          <a:chExt cx="0" cy="0"/>
+        </a:xfrm>
+      </p:grpSpPr>
+      <p:sp>
+        <p:nvSpPr>
+          <p:cNvPr id="5" name="Right Arrow 4"/>
+          <p:cNvSpPr/>
+          <p:nvPr/>
+        </p:nvSpPr>
+        <p:spPr>
+          <a:xfrm>
+            <a:off x="2223084" y="5552114"/>
+            <a:ext cx="3393440" cy="1325460"/>
+          </a:xfrm>
+          <a:prstGeom prst="rightArrow">
+            <a:avLst>
+              <a:gd name="adj1" fmla="val 50000"/>
+              <a:gd name="adj2" fmla="val 40972"/>
+            </a:avLst>
+          </a:prstGeom>
+          <a:solidFill>
+            <a:srgbClr val="FFFF00"/>
+          </a:solidFill>
+        </p:spPr>
+        <p:style>
+          <a:lnRef idx="2">
+            <a:schemeClr val="accent1">
+              <a:shade val="50000"/>
+            </a:schemeClr>
+          </a:lnRef>
+          <a:fillRef idx="1">
+            <a:schemeClr val="accent1"/>
+          </a:fillRef>
+          <a:effectRef idx="0">
+            <a:schemeClr val="accent1"/>
+          </a:effectRef>
+          <a:fontRef idx="minor">
+            <a:schemeClr val="lt1"/>
+          </a:fontRef>
+        </p:style>
+        <p:txBody>
+          <a:bodyPr rtlCol="0" anchor="ctr"/>
+          <a:lstStyle/>
+          <a:p>
+            <a:pPr algn="ctr"/>
+            <a:endParaRPr lang="en-US"/>
+          </a:p>
+        </p:txBody>
+      </p:sp>
+      <p:sp>
+        <p:nvSpPr>
+          <p:cNvPr id="2" name="Title 1"/>
+          <p:cNvSpPr>
+            <a:spLocks noGrp="1"/>
+          </p:cNvSpPr>
+          <p:nvPr>
+            <p:ph type="title"/>
+          </p:nvPr>
+        </p:nvSpPr>
+        <p:spPr/>
+        <p:txBody>
+          <a:bodyPr/>
+          <a:lstStyle/>
+          <a:p>
+            <a:r>
+              <a:rPr lang="en-US" sz="3600" dirty="0" smtClean="0"/>
+              <a:t>Order of Execution for Code Generated by TEBNF Code Generation Tool</a:t>
+            </a:r>
+            <a:endParaRPr lang="en-US" sz="3600" dirty="0"/>
+          </a:p>
+        </p:txBody>
+      </p:sp>
+      <p:pic>
+        <p:nvPicPr>
+          <p:cNvPr id="6" name="Picture 5"/>
+          <p:cNvPicPr>
+            <a:picLocks noChangeAspect="1"/>
+          </p:cNvPicPr>
+          <p:nvPr/>
+        </p:nvPicPr>
+        <p:blipFill>
+          <a:blip r:embed="rId2"/>
+          <a:stretch>
+            <a:fillRect/>
+          </a:stretch>
+        </p:blipFill>
+        <p:spPr>
+          <a:xfrm>
+            <a:off x="108659" y="1641019"/>
+            <a:ext cx="5638557" cy="5135336"/>
+          </a:xfrm>
+          <a:prstGeom prst="rect">
+            <a:avLst/>
+          </a:prstGeom>
+        </p:spPr>
+      </p:pic>
+      <p:sp>
+        <p:nvSpPr>
+          <p:cNvPr id="7" name="Content Placeholder 2"/>
+          <p:cNvSpPr>
+            <a:spLocks noGrp="1"/>
+          </p:cNvSpPr>
+          <p:nvPr>
+            <p:ph idx="1"/>
+          </p:nvPr>
+        </p:nvSpPr>
+        <p:spPr>
+          <a:xfrm>
+            <a:off x="5976253" y="2024744"/>
+            <a:ext cx="5927272" cy="4223656"/>
+          </a:xfrm>
+        </p:spPr>
+        <p:txBody>
+          <a:bodyPr/>
+          <a:lstStyle/>
+          <a:p>
+            <a:r>
+              <a:rPr lang="en-US" dirty="0" smtClean="0"/>
+              <a:t>State steps shape the way TEBNF elements interact with each other and input data by determining:</a:t>
+            </a:r>
+          </a:p>
+          <a:p>
+            <a:pPr marL="857250" lvl="1" indent="-457200">
+              <a:buFont typeface="+mj-lt"/>
+              <a:buAutoNum type="arabicPeriod"/>
+            </a:pPr>
+            <a:r>
+              <a:rPr lang="en-US" dirty="0" smtClean="0"/>
+              <a:t>What input methods data is received on.</a:t>
+            </a:r>
+          </a:p>
+          <a:p>
+            <a:pPr marL="857250" lvl="1" indent="-457200">
+              <a:buFont typeface="+mj-lt"/>
+              <a:buAutoNum type="arabicPeriod"/>
+            </a:pPr>
+            <a:r>
+              <a:rPr lang="en-US" dirty="0" smtClean="0"/>
+              <a:t>What parts of the received data match defined grammar patterns.</a:t>
+            </a:r>
+          </a:p>
+          <a:p>
+            <a:pPr marL="857250" lvl="1" indent="-457200">
+              <a:buFont typeface="+mj-lt"/>
+              <a:buAutoNum type="arabicPeriod"/>
+            </a:pPr>
+            <a:r>
+              <a:rPr lang="en-US" dirty="0" smtClean="0"/>
+              <a:t>What code actions are executed.</a:t>
+            </a:r>
+          </a:p>
+          <a:p>
+            <a:pPr marL="857250" lvl="1" indent="-457200">
+              <a:buFont typeface="+mj-lt"/>
+              <a:buAutoNum type="arabicPeriod"/>
+            </a:pPr>
+            <a:r>
+              <a:rPr lang="en-US" b="1" dirty="0">
+                <a:solidFill>
+                  <a:srgbClr val="FFFF00"/>
+                </a:solidFill>
+              </a:rPr>
+              <a:t>What method is used to output </a:t>
+            </a:r>
+            <a:r>
+              <a:rPr lang="en-US" b="1" dirty="0" smtClean="0">
+                <a:solidFill>
+                  <a:srgbClr val="FFFF00"/>
+                </a:solidFill>
+              </a:rPr>
+              <a:t>data</a:t>
+            </a:r>
+            <a:r>
+              <a:rPr lang="en-US" b="1" dirty="0">
+                <a:solidFill>
+                  <a:srgbClr val="FFFF00"/>
+                </a:solidFill>
+              </a:rPr>
+              <a:t>.</a:t>
+            </a:r>
+          </a:p>
+          <a:p>
+            <a:pPr marL="857250" lvl="1" indent="-457200">
+              <a:buFont typeface="+mj-lt"/>
+              <a:buAutoNum type="arabicPeriod"/>
+            </a:pPr>
+            <a:endParaRPr lang="en-US" dirty="0"/>
+          </a:p>
+        </p:txBody>
+      </p:sp>
+    </p:spTree>
+    <p:extLst>
+      <p:ext uri="{BB962C8B-B14F-4D97-AF65-F5344CB8AC3E}">
+        <p14:creationId xmlns:p14="http://schemas.microsoft.com/office/powerpoint/2010/main" val="3556118709"/>
+      </p:ext>
+    </p:extLst>
+  </p:cSld>
+  <p:clrMapOvr>
+    <a:masterClrMapping/>
+  </p:clrMapOvr>
+  <p:timing>
+    <p:tnLst>
+      <p:par>
+        <p:cTn id="1" dur="indefinite" restart="never" nodeType="tmRoot"/>
+      </p:par>
+    </p:tnLst>
+  </p:timing>
+</p:sld>
+</file>
+
 <file path=ppt/slides/slide3.xml><?xml version="1.0" encoding="utf-8"?>
 <p:sld xmlns:a="http://schemas.openxmlformats.org/drawingml/2006/main" xmlns:r="http://schemas.openxmlformats.org/officeDocument/2006/relationships" xmlns:p="http://schemas.openxmlformats.org/presentationml/2006/main">
   <p:cSld>
@@ -10613,9 +10709,10 @@
             <a:endParaRPr lang="en-US" dirty="0" smtClean="0"/>
           </a:p>
           <a:p>
-            <a:pPr marL="457200" lvl="1" indent="0">
-              <a:buNone/>
-            </a:pPr>
+            <a:r>
+              <a:rPr lang="en-US" dirty="0" smtClean="0"/>
+              <a:t>Tools accept grammars as input.</a:t>
+            </a:r>
             <a:endParaRPr lang="en-US" dirty="0"/>
           </a:p>
         </p:txBody>
@@ -10659,195 +10756,44 @@
       </p:grpSpPr>
       <p:sp>
         <p:nvSpPr>
-          <p:cNvPr id="5" name="Right Arrow 4"/>
-          <p:cNvSpPr/>
-          <p:nvPr/>
+          <p:cNvPr id="2" name="Title 1"/>
+          <p:cNvSpPr>
+            <a:spLocks noGrp="1"/>
+          </p:cNvSpPr>
+          <p:nvPr>
+            <p:ph type="title"/>
+          </p:nvPr>
         </p:nvSpPr>
         <p:spPr>
           <a:xfrm>
-            <a:off x="2223084" y="5552114"/>
-            <a:ext cx="3393440" cy="1325460"/>
+            <a:off x="1196718" y="2429001"/>
+            <a:ext cx="9404723" cy="1887360"/>
           </a:xfrm>
-          <a:prstGeom prst="rightArrow">
-            <a:avLst>
-              <a:gd name="adj1" fmla="val 50000"/>
-              <a:gd name="adj2" fmla="val 40972"/>
-            </a:avLst>
-          </a:prstGeom>
-          <a:solidFill>
-            <a:srgbClr val="FFFF00"/>
-          </a:solidFill>
         </p:spPr>
-        <p:style>
-          <a:lnRef idx="2">
-            <a:schemeClr val="accent1">
-              <a:shade val="50000"/>
-            </a:schemeClr>
-          </a:lnRef>
-          <a:fillRef idx="1">
-            <a:schemeClr val="accent1"/>
-          </a:fillRef>
-          <a:effectRef idx="0">
-            <a:schemeClr val="accent1"/>
-          </a:effectRef>
-          <a:fontRef idx="minor">
-            <a:schemeClr val="lt1"/>
-          </a:fontRef>
-        </p:style>
-        <p:txBody>
-          <a:bodyPr rtlCol="0" anchor="ctr"/>
-          <a:lstStyle/>
-          <a:p>
-            <a:pPr algn="ctr"/>
-            <a:endParaRPr lang="en-US"/>
-          </a:p>
-        </p:txBody>
-      </p:sp>
-      <p:sp>
-        <p:nvSpPr>
-          <p:cNvPr id="2" name="Title 1"/>
-          <p:cNvSpPr>
-            <a:spLocks noGrp="1"/>
-          </p:cNvSpPr>
-          <p:nvPr>
-            <p:ph type="title"/>
-          </p:nvPr>
-        </p:nvSpPr>
-        <p:spPr/>
         <p:txBody>
           <a:bodyPr/>
           <a:lstStyle/>
           <a:p>
-            <a:r>
-              <a:rPr lang="en-US" sz="3600" dirty="0" smtClean="0"/>
-              <a:t>Order of Execution for Code Generated by TEBNF Code Generation Tool</a:t>
-            </a:r>
-            <a:endParaRPr lang="en-US" sz="3600" dirty="0"/>
-          </a:p>
-        </p:txBody>
-      </p:sp>
-      <p:pic>
-        <p:nvPicPr>
-          <p:cNvPr id="6" name="Picture 5"/>
-          <p:cNvPicPr>
-            <a:picLocks noChangeAspect="1"/>
-          </p:cNvPicPr>
-          <p:nvPr/>
-        </p:nvPicPr>
-        <p:blipFill>
-          <a:blip r:embed="rId2"/>
-          <a:stretch>
-            <a:fillRect/>
-          </a:stretch>
-        </p:blipFill>
-        <p:spPr>
-          <a:xfrm>
-            <a:off x="108659" y="1641019"/>
-            <a:ext cx="5638557" cy="5135336"/>
-          </a:xfrm>
-          <a:prstGeom prst="rect">
-            <a:avLst/>
-          </a:prstGeom>
-        </p:spPr>
-      </p:pic>
-      <p:sp>
-        <p:nvSpPr>
-          <p:cNvPr id="7" name="Content Placeholder 2"/>
-          <p:cNvSpPr>
-            <a:spLocks noGrp="1"/>
-          </p:cNvSpPr>
-          <p:nvPr>
-            <p:ph idx="1"/>
-          </p:nvPr>
-        </p:nvSpPr>
-        <p:spPr>
-          <a:xfrm>
-            <a:off x="5976253" y="2024744"/>
-            <a:ext cx="5927272" cy="4223656"/>
-          </a:xfrm>
-        </p:spPr>
-        <p:txBody>
-          <a:bodyPr/>
-          <a:lstStyle/>
-          <a:p>
-            <a:r>
-              <a:rPr lang="en-US" dirty="0" smtClean="0"/>
-              <a:t>State steps shape the way TEBNF elements interact with each other and input data by determining:</a:t>
-            </a:r>
-          </a:p>
-          <a:p>
-            <a:pPr marL="857250" lvl="1" indent="-457200">
-              <a:buFont typeface="+mj-lt"/>
-              <a:buAutoNum type="arabicPeriod"/>
-            </a:pPr>
-            <a:r>
-              <a:rPr lang="en-US" dirty="0" smtClean="0"/>
-              <a:t>What input methods data is received on.</a:t>
-            </a:r>
-          </a:p>
-          <a:p>
-            <a:pPr marL="857250" lvl="1" indent="-457200">
-              <a:buFont typeface="+mj-lt"/>
-              <a:buAutoNum type="arabicPeriod"/>
-            </a:pPr>
-            <a:r>
-              <a:rPr lang="en-US" dirty="0" smtClean="0"/>
-              <a:t>What parts of the received data match defined grammar patterns.</a:t>
-            </a:r>
-          </a:p>
-          <a:p>
-            <a:pPr marL="857250" lvl="1" indent="-457200">
-              <a:buFont typeface="+mj-lt"/>
-              <a:buAutoNum type="arabicPeriod"/>
-            </a:pPr>
-            <a:r>
-              <a:rPr lang="en-US" dirty="0" smtClean="0"/>
-              <a:t>What code actions are executed.</a:t>
-            </a:r>
-          </a:p>
-          <a:p>
-            <a:pPr marL="857250" lvl="1" indent="-457200">
-              <a:buFont typeface="+mj-lt"/>
-              <a:buAutoNum type="arabicPeriod"/>
-            </a:pPr>
-            <a:r>
-              <a:rPr lang="en-US" b="1" dirty="0">
-                <a:solidFill>
-                  <a:srgbClr val="FFFF00"/>
-                </a:solidFill>
-              </a:rPr>
-              <a:t>What method is used to output </a:t>
-            </a:r>
-            <a:r>
-              <a:rPr lang="en-US" b="1" dirty="0" smtClean="0">
-                <a:solidFill>
-                  <a:srgbClr val="FFFF00"/>
-                </a:solidFill>
-              </a:rPr>
-              <a:t>data</a:t>
-            </a:r>
-            <a:r>
-              <a:rPr lang="en-US" b="1" dirty="0">
-                <a:solidFill>
-                  <a:srgbClr val="FFFF00"/>
-                </a:solidFill>
-              </a:rPr>
-              <a:t>.</a:t>
-            </a:r>
-          </a:p>
-          <a:p>
-            <a:pPr marL="857250" lvl="1" indent="-457200">
-              <a:buFont typeface="+mj-lt"/>
-              <a:buAutoNum type="arabicPeriod"/>
-            </a:pPr>
-            <a:endParaRPr lang="en-US" dirty="0"/>
+            <a:pPr algn="ctr"/>
+            <a:r>
+              <a:rPr lang="en-US" sz="6000" dirty="0"/>
+              <a:t>Implementing </a:t>
+            </a:r>
+            <a:r>
+              <a:rPr lang="en-US" sz="6000" dirty="0" smtClean="0"/>
+              <a:t>Tools with </a:t>
+            </a:r>
+            <a:r>
+              <a:rPr lang="en-US" sz="6000" dirty="0"/>
+              <a:t>TEBNF</a:t>
+            </a:r>
           </a:p>
         </p:txBody>
       </p:sp>
     </p:spTree>
     <p:extLst>
       <p:ext uri="{BB962C8B-B14F-4D97-AF65-F5344CB8AC3E}">
-        <p14:creationId xmlns:p14="http://schemas.microsoft.com/office/powerpoint/2010/main" val="3556118709"/>
+        <p14:creationId xmlns:p14="http://schemas.microsoft.com/office/powerpoint/2010/main" val="1406425928"/>
       </p:ext>
     </p:extLst>
   </p:cSld>
@@ -10898,7 +10844,7 @@
           <a:p>
             <a:r>
               <a:rPr lang="en-US" dirty="0" smtClean="0"/>
-              <a:t>Implementing Tools with TEBNF</a:t>
+              <a:t>Example Applications</a:t>
             </a:r>
             <a:endParaRPr lang="en-US" dirty="0"/>
           </a:p>
@@ -14089,7 +14035,15 @@
             </a:r>
             <a:r>
               <a:rPr lang="en-US" dirty="0"/>
-              <a:t>in the NITF 2.1 le to determine that it has </a:t>
+              <a:t>in the NITF 2.1 </a:t>
+            </a:r>
+            <a:r>
+              <a:rPr lang="en-US" dirty="0" smtClean="0"/>
+              <a:t>file </a:t>
+            </a:r>
+            <a:r>
+              <a:rPr lang="en-US" dirty="0"/>
+              <a:t>to determine that it has </a:t>
             </a:r>
             <a:r>
               <a:rPr lang="en-US" dirty="0" smtClean="0"/>
@@ -14127,7 +14081,15 @@
             </a:r>
             <a:r>
               <a:rPr lang="en-US" dirty="0"/>
-              <a:t>disk using a le output.</a:t>
+              <a:t>disk using a </a:t>
+            </a:r>
+            <a:r>
+              <a:rPr lang="en-US" dirty="0" smtClean="0"/>
+              <a:t>file </a:t>
+            </a:r>
+            <a:r>
+              <a:rPr lang="en-US" dirty="0"/>
+              <a:t>output.</a:t>
             </a:r>
           </a:p>
           <a:p>
@@ -14565,7 +14527,7 @@
           <a:p>
             <a:r>
               <a:rPr lang="en-US" dirty="0" smtClean="0"/>
-              <a:t>Integrates </a:t>
+              <a:t>Can integrate </a:t>
             </a:r>
             <a:r>
               <a:rPr lang="en-US" dirty="0"/>
@@ -15056,6 +15018,72 @@
             <p:ph type="title"/>
           </p:nvPr>
         </p:nvSpPr>
+        <p:spPr>
+          <a:xfrm>
+            <a:off x="862420" y="2910782"/>
+            <a:ext cx="9404723" cy="1400530"/>
+          </a:xfrm>
+        </p:spPr>
+        <p:txBody>
+          <a:bodyPr/>
+          <a:lstStyle/>
+          <a:p>
+            <a:pPr algn="ctr"/>
+            <a:r>
+              <a:rPr lang="en-US" sz="6000" dirty="0" smtClean="0"/>
+              <a:t>Results and Analysis</a:t>
+            </a:r>
+            <a:endParaRPr lang="en-US" dirty="0"/>
+          </a:p>
+        </p:txBody>
+      </p:sp>
+    </p:spTree>
+    <p:extLst>
+      <p:ext uri="{BB962C8B-B14F-4D97-AF65-F5344CB8AC3E}">
+        <p14:creationId xmlns:p14="http://schemas.microsoft.com/office/powerpoint/2010/main" val="3488454289"/>
+      </p:ext>
+    </p:extLst>
+  </p:cSld>
+  <p:clrMapOvr>
+    <a:masterClrMapping/>
+  </p:clrMapOvr>
+  <p:timing>
+    <p:tnLst>
+      <p:par>
+        <p:cTn id="1" dur="indefinite" restart="never" nodeType="tmRoot"/>
+      </p:par>
+    </p:tnLst>
+  </p:timing>
+</p:sld>
+</file>
+
+<file path=ppt/slides/slide53.xml><?xml version="1.0" encoding="utf-8"?>
+<p:sld xmlns:a="http://schemas.openxmlformats.org/drawingml/2006/main" xmlns:r="http://schemas.openxmlformats.org/officeDocument/2006/relationships" xmlns:p="http://schemas.openxmlformats.org/presentationml/2006/main">
+  <p:cSld>
+    <p:spTree>
+      <p:nvGrpSpPr>
+        <p:cNvPr id="1" name=""/>
+        <p:cNvGrpSpPr/>
+        <p:nvPr/>
+      </p:nvGrpSpPr>
+      <p:grpSpPr>
+        <a:xfrm>
+          <a:off x="0" y="0"/>
+          <a:ext cx="0" cy="0"/>
+          <a:chOff x="0" y="0"/>
+          <a:chExt cx="0" cy="0"/>
+        </a:xfrm>
+      </p:grpSpPr>
+      <p:sp>
+        <p:nvSpPr>
+          <p:cNvPr id="2" name="Title 1"/>
+          <p:cNvSpPr>
+            <a:spLocks noGrp="1"/>
+          </p:cNvSpPr>
+          <p:nvPr>
+            <p:ph type="title"/>
+          </p:nvPr>
+        </p:nvSpPr>
         <p:spPr/>
         <p:txBody>
           <a:bodyPr/>
@@ -15217,7 +15245,7 @@
 </p:sld>
 </file>
 
-<file path=ppt/slides/slide53.xml><?xml version="1.0" encoding="utf-8"?>
+<file path=ppt/slides/slide54.xml><?xml version="1.0" encoding="utf-8"?>
 <p:sld xmlns:a="http://schemas.openxmlformats.org/drawingml/2006/main" xmlns:r="http://schemas.openxmlformats.org/officeDocument/2006/relationships" xmlns:p="http://schemas.openxmlformats.org/presentationml/2006/main">
   <p:cSld>
     <p:spTree>
@@ -15846,7 +15874,7 @@
 </p:sld>
 </file>
 
-<file path=ppt/slides/slide54.xml><?xml version="1.0" encoding="utf-8"?>
+<file path=ppt/slides/slide55.xml><?xml version="1.0" encoding="utf-8"?>
 <p:sld xmlns:a="http://schemas.openxmlformats.org/drawingml/2006/main" xmlns:r="http://schemas.openxmlformats.org/officeDocument/2006/relationships" xmlns:p="http://schemas.openxmlformats.org/presentationml/2006/main">
   <p:cSld>
     <p:spTree>
@@ -16031,7 +16059,7 @@
 </p:sld>
 </file>
 
-<file path=ppt/slides/slide55.xml><?xml version="1.0" encoding="utf-8"?>
+<file path=ppt/slides/slide56.xml><?xml version="1.0" encoding="utf-8"?>
 <p:sld xmlns:a="http://schemas.openxmlformats.org/drawingml/2006/main" xmlns:r="http://schemas.openxmlformats.org/officeDocument/2006/relationships" xmlns:p="http://schemas.openxmlformats.org/presentationml/2006/main">
   <p:cSld>
     <p:spTree>
@@ -16128,7 +16156,7 @@
 </p:sld>
 </file>
 
-<file path=ppt/slides/slide56.xml><?xml version="1.0" encoding="utf-8"?>
+<file path=ppt/slides/slide57.xml><?xml version="1.0" encoding="utf-8"?>
 <p:sld xmlns:a="http://schemas.openxmlformats.org/drawingml/2006/main" xmlns:r="http://schemas.openxmlformats.org/officeDocument/2006/relationships" xmlns:p="http://schemas.openxmlformats.org/presentationml/2006/main">
   <p:cSld>
     <p:spTree>
@@ -16795,6 +16823,66 @@
           </a:graphicData>
         </a:graphic>
       </p:graphicFrame>
+      <p:sp>
+        <p:nvSpPr>
+          <p:cNvPr id="4" name="TextBox 3"/>
+          <p:cNvSpPr txBox="1"/>
+          <p:nvPr/>
+        </p:nvSpPr>
+        <p:spPr>
+          <a:xfrm>
+            <a:off x="904568" y="1297858"/>
+            <a:ext cx="4326193" cy="369332"/>
+          </a:xfrm>
+          <a:prstGeom prst="rect">
+            <a:avLst/>
+          </a:prstGeom>
+          <a:noFill/>
+        </p:spPr>
+        <p:txBody>
+          <a:bodyPr wrap="square" rtlCol="0">
+            <a:spAutoFit/>
+          </a:bodyPr>
+          <a:lstStyle/>
+          <a:p>
+            <a:r>
+              <a:rPr lang="en-US" dirty="0" smtClean="0"/>
+              <a:t>Calculator Test Case</a:t>
+            </a:r>
+            <a:endParaRPr lang="en-US" dirty="0"/>
+          </a:p>
+        </p:txBody>
+      </p:sp>
+      <p:sp>
+        <p:nvSpPr>
+          <p:cNvPr id="7" name="TextBox 6"/>
+          <p:cNvSpPr txBox="1"/>
+          <p:nvPr/>
+        </p:nvSpPr>
+        <p:spPr>
+          <a:xfrm>
+            <a:off x="904568" y="3628104"/>
+            <a:ext cx="4070555" cy="369332"/>
+          </a:xfrm>
+          <a:prstGeom prst="rect">
+            <a:avLst/>
+          </a:prstGeom>
+          <a:noFill/>
+        </p:spPr>
+        <p:txBody>
+          <a:bodyPr wrap="square" rtlCol="0">
+            <a:spAutoFit/>
+          </a:bodyPr>
+          <a:lstStyle/>
+          <a:p>
+            <a:r>
+              <a:rPr lang="en-US" dirty="0" smtClean="0"/>
+              <a:t>File Client Test Case</a:t>
+            </a:r>
+            <a:endParaRPr lang="en-US" dirty="0"/>
+          </a:p>
+        </p:txBody>
+      </p:sp>
     </p:spTree>
     <p:extLst>
       <p:ext uri="{BB962C8B-B14F-4D97-AF65-F5344CB8AC3E}">
@@ -16815,7 +16903,7 @@
 </p:sld>
 </file>
 
-<file path=ppt/slides/slide57.xml><?xml version="1.0" encoding="utf-8"?>
+<file path=ppt/slides/slide58.xml><?xml version="1.0" encoding="utf-8"?>
 <p:sld xmlns:a="http://schemas.openxmlformats.org/drawingml/2006/main" xmlns:r="http://schemas.openxmlformats.org/officeDocument/2006/relationships" xmlns:p="http://schemas.openxmlformats.org/presentationml/2006/main">
   <p:cSld>
     <p:spTree>
@@ -16872,7 +16960,15 @@
           <a:p>
             <a:r>
               <a:rPr lang="en-US" dirty="0" smtClean="0"/>
-              <a:t>Used Lizard tool to analyze code generated for each test case.</a:t>
+              <a:t>Used Lizard tool to analyze </a:t>
+            </a:r>
+            <a:r>
+              <a:rPr lang="en-US" dirty="0" smtClean="0"/>
+              <a:t>the code of each </a:t>
+            </a:r>
+            <a:r>
+              <a:rPr lang="en-US" dirty="0" smtClean="0"/>
+              <a:t>test case.</a:t>
             </a:r>
           </a:p>
           <a:p>
@@ -16964,7 +17060,7 @@
 </p:sld>
 </file>
 
-<file path=ppt/slides/slide58.xml><?xml version="1.0" encoding="utf-8"?>
+<file path=ppt/slides/slide59.xml><?xml version="1.0" encoding="utf-8"?>
 <p:sld xmlns:a="http://schemas.openxmlformats.org/drawingml/2006/main" xmlns:r="http://schemas.openxmlformats.org/officeDocument/2006/relationships" xmlns:p="http://schemas.openxmlformats.org/presentationml/2006/main">
   <p:cSld>
     <p:spTree>
@@ -17609,211 +17705,6 @@
 </p:sld>
 </file>
 
-<file path=ppt/slides/slide59.xml><?xml version="1.0" encoding="utf-8"?>
-<p:sld xmlns:a="http://schemas.openxmlformats.org/drawingml/2006/main" xmlns:r="http://schemas.openxmlformats.org/officeDocument/2006/relationships" xmlns:p="http://schemas.openxmlformats.org/presentationml/2006/main">
-  <p:cSld>
-    <p:spTree>
-      <p:nvGrpSpPr>
-        <p:cNvPr id="1" name=""/>
-        <p:cNvGrpSpPr/>
-        <p:nvPr/>
-      </p:nvGrpSpPr>
-      <p:grpSpPr>
-        <a:xfrm>
-          <a:off x="0" y="0"/>
-          <a:ext cx="0" cy="0"/>
-          <a:chOff x="0" y="0"/>
-          <a:chExt cx="0" cy="0"/>
-        </a:xfrm>
-      </p:grpSpPr>
-      <p:sp>
-        <p:nvSpPr>
-          <p:cNvPr id="2" name="Title 1"/>
-          <p:cNvSpPr>
-            <a:spLocks noGrp="1"/>
-          </p:cNvSpPr>
-          <p:nvPr>
-            <p:ph type="title"/>
-          </p:nvPr>
-        </p:nvSpPr>
-        <p:spPr/>
-        <p:txBody>
-          <a:bodyPr/>
-          <a:lstStyle/>
-          <a:p>
-            <a:r>
-              <a:rPr lang="en-US" dirty="0" smtClean="0"/>
-              <a:t>Analysis </a:t>
-            </a:r>
-            <a:r>
-              <a:rPr lang="en-US" dirty="0" smtClean="0"/>
-              <a:t>Conclusions</a:t>
-            </a:r>
-            <a:endParaRPr lang="en-US" dirty="0"/>
-          </a:p>
-        </p:txBody>
-      </p:sp>
-      <p:sp>
-        <p:nvSpPr>
-          <p:cNvPr id="3" name="Content Placeholder 2"/>
-          <p:cNvSpPr>
-            <a:spLocks noGrp="1"/>
-          </p:cNvSpPr>
-          <p:nvPr>
-            <p:ph idx="1"/>
-          </p:nvPr>
-        </p:nvSpPr>
-        <p:spPr/>
-        <p:txBody>
-          <a:bodyPr>
-            <a:normAutofit/>
-          </a:bodyPr>
-          <a:lstStyle/>
-          <a:p>
-            <a:r>
-              <a:rPr lang="en-US" b="1" dirty="0" smtClean="0"/>
-              <a:t>Non-generated </a:t>
-            </a:r>
-            <a:r>
-              <a:rPr lang="en-US" b="1" dirty="0"/>
-              <a:t>test cases are comparable to their generated </a:t>
-            </a:r>
-            <a:r>
-              <a:rPr lang="en-US" b="1" dirty="0" smtClean="0"/>
-              <a:t>counterparts</a:t>
-            </a:r>
-            <a:r>
-              <a:rPr lang="en-US" dirty="0"/>
-              <a:t> </a:t>
-            </a:r>
-            <a:r>
-              <a:rPr lang="en-US" dirty="0" smtClean="0"/>
-              <a:t>because:</a:t>
-            </a:r>
-          </a:p>
-          <a:p>
-            <a:pPr lvl="1"/>
-            <a:r>
-              <a:rPr lang="en-US" dirty="0" smtClean="0"/>
-              <a:t>Non-generated </a:t>
-            </a:r>
-            <a:r>
-              <a:rPr lang="en-US" dirty="0"/>
-              <a:t>test cases were built </a:t>
-            </a:r>
-            <a:r>
-              <a:rPr lang="en-US" dirty="0" smtClean="0"/>
-              <a:t>specifically to mimic the </a:t>
-            </a:r>
-            <a:r>
-              <a:rPr lang="en-US" dirty="0"/>
-              <a:t>behavior of the generated test </a:t>
-            </a:r>
-            <a:r>
-              <a:rPr lang="en-US" dirty="0" smtClean="0"/>
-              <a:t>cases</a:t>
-            </a:r>
-          </a:p>
-          <a:p>
-            <a:pPr lvl="1"/>
-            <a:r>
-              <a:rPr lang="en-US" dirty="0" smtClean="0"/>
-              <a:t>The </a:t>
-            </a:r>
-            <a:r>
-              <a:rPr lang="en-US" dirty="0"/>
-              <a:t>average CCN values for all of the test </a:t>
-            </a:r>
-            <a:r>
-              <a:rPr lang="en-US" dirty="0" smtClean="0"/>
-              <a:t>cases fall </a:t>
-            </a:r>
-            <a:r>
-              <a:rPr lang="en-US" dirty="0"/>
-              <a:t>into the low risk category, </a:t>
-            </a:r>
-            <a:endParaRPr lang="en-US" dirty="0" smtClean="0"/>
-          </a:p>
-          <a:p>
-            <a:pPr lvl="1"/>
-            <a:r>
-              <a:rPr lang="en-US" dirty="0"/>
-              <a:t>The average CCN values for all of the test cases </a:t>
-            </a:r>
-            <a:r>
-              <a:rPr lang="en-US" dirty="0" smtClean="0"/>
-              <a:t>are close </a:t>
-            </a:r>
-            <a:r>
-              <a:rPr lang="en-US" dirty="0"/>
-              <a:t>to one another in </a:t>
-            </a:r>
-            <a:r>
-              <a:rPr lang="en-US" dirty="0" smtClean="0"/>
-              <a:t>value</a:t>
-            </a:r>
-          </a:p>
-          <a:p>
-            <a:pPr lvl="1"/>
-            <a:r>
-              <a:rPr lang="en-US" dirty="0" smtClean="0"/>
-              <a:t>Leads to likely conclusion that none of the test cases were purposely made worse than the others.</a:t>
-            </a:r>
-            <a:endParaRPr lang="en-US" dirty="0" smtClean="0"/>
-          </a:p>
-          <a:p>
-            <a:pPr marL="457200" indent="-457200">
-              <a:buFont typeface="+mj-lt"/>
-              <a:buAutoNum type="arabicPeriod"/>
-            </a:pPr>
-            <a:endParaRPr lang="en-US" b="1" dirty="0" smtClean="0"/>
-          </a:p>
-          <a:p>
-            <a:pPr marL="457200" indent="-457200">
-              <a:buFont typeface="+mj-lt"/>
-              <a:buAutoNum type="arabicPeriod"/>
-            </a:pPr>
-            <a:endParaRPr lang="en-US" b="1" dirty="0" smtClean="0"/>
-          </a:p>
-          <a:p>
-            <a:pPr marL="457200" indent="-457200">
-              <a:buFont typeface="+mj-lt"/>
-              <a:buAutoNum type="arabicPeriod"/>
-            </a:pPr>
-            <a:endParaRPr lang="en-US" b="1" dirty="0" smtClean="0"/>
-          </a:p>
-          <a:p>
-            <a:pPr marL="0" indent="0">
-              <a:buNone/>
-            </a:pPr>
-            <a:endParaRPr lang="en-US" b="1" dirty="0" smtClean="0"/>
-          </a:p>
-          <a:p>
-            <a:pPr marL="800100" lvl="1"/>
-            <a:endParaRPr lang="en-US" dirty="0" smtClean="0"/>
-          </a:p>
-        </p:txBody>
-      </p:sp>
-    </p:spTree>
-    <p:extLst>
-      <p:ext uri="{BB962C8B-B14F-4D97-AF65-F5344CB8AC3E}">
-        <p14:creationId xmlns:p14="http://schemas.microsoft.com/office/powerpoint/2010/main" val="1117820296"/>
-      </p:ext>
-    </p:extLst>
-  </p:cSld>
-  <p:clrMapOvr>
-    <a:masterClrMapping/>
-  </p:clrMapOvr>
-  <p:timing>
-    <p:tnLst>
-      <p:par>
-        <p:cTn id="1" dur="indefinite" restart="never" nodeType="tmRoot"/>
-      </p:par>
-    </p:tnLst>
-  </p:timing>
-</p:sld>
-</file>
-
 <file path=ppt/slides/slide6.xml><?xml version="1.0" encoding="utf-8"?>
 <p:sld xmlns:a="http://schemas.openxmlformats.org/drawingml/2006/main" xmlns:r="http://schemas.openxmlformats.org/officeDocument/2006/relationships" xmlns:p="http://schemas.openxmlformats.org/presentationml/2006/main">
   <p:cSld>
@@ -17988,6 +17879,206 @@
 </file>
 
 <file path=ppt/slides/slide60.xml><?xml version="1.0" encoding="utf-8"?>
+<p:sld xmlns:a="http://schemas.openxmlformats.org/drawingml/2006/main" xmlns:r="http://schemas.openxmlformats.org/officeDocument/2006/relationships" xmlns:p="http://schemas.openxmlformats.org/presentationml/2006/main">
+  <p:cSld>
+    <p:spTree>
+      <p:nvGrpSpPr>
+        <p:cNvPr id="1" name=""/>
+        <p:cNvGrpSpPr/>
+        <p:nvPr/>
+      </p:nvGrpSpPr>
+      <p:grpSpPr>
+        <a:xfrm>
+          <a:off x="0" y="0"/>
+          <a:ext cx="0" cy="0"/>
+          <a:chOff x="0" y="0"/>
+          <a:chExt cx="0" cy="0"/>
+        </a:xfrm>
+      </p:grpSpPr>
+      <p:sp>
+        <p:nvSpPr>
+          <p:cNvPr id="2" name="Title 1"/>
+          <p:cNvSpPr>
+            <a:spLocks noGrp="1"/>
+          </p:cNvSpPr>
+          <p:nvPr>
+            <p:ph type="title"/>
+          </p:nvPr>
+        </p:nvSpPr>
+        <p:spPr/>
+        <p:txBody>
+          <a:bodyPr/>
+          <a:lstStyle/>
+          <a:p>
+            <a:r>
+              <a:rPr lang="en-US" dirty="0" smtClean="0"/>
+              <a:t>Analysis Conclusions</a:t>
+            </a:r>
+            <a:endParaRPr lang="en-US" dirty="0"/>
+          </a:p>
+        </p:txBody>
+      </p:sp>
+      <p:sp>
+        <p:nvSpPr>
+          <p:cNvPr id="3" name="Content Placeholder 2"/>
+          <p:cNvSpPr>
+            <a:spLocks noGrp="1"/>
+          </p:cNvSpPr>
+          <p:nvPr>
+            <p:ph idx="1"/>
+          </p:nvPr>
+        </p:nvSpPr>
+        <p:spPr/>
+        <p:txBody>
+          <a:bodyPr>
+            <a:normAutofit/>
+          </a:bodyPr>
+          <a:lstStyle/>
+          <a:p>
+            <a:r>
+              <a:rPr lang="en-US" b="1" dirty="0" smtClean="0"/>
+              <a:t>Non-generated </a:t>
+            </a:r>
+            <a:r>
+              <a:rPr lang="en-US" b="1" dirty="0"/>
+              <a:t>test cases are comparable to their generated </a:t>
+            </a:r>
+            <a:r>
+              <a:rPr lang="en-US" b="1" dirty="0" smtClean="0"/>
+              <a:t>counterparts</a:t>
+            </a:r>
+            <a:r>
+              <a:rPr lang="en-US" dirty="0"/>
+              <a:t> </a:t>
+            </a:r>
+            <a:r>
+              <a:rPr lang="en-US" dirty="0" smtClean="0"/>
+              <a:t>because:</a:t>
+            </a:r>
+          </a:p>
+          <a:p>
+            <a:pPr lvl="1"/>
+            <a:r>
+              <a:rPr lang="en-US" dirty="0" smtClean="0"/>
+              <a:t>Non-generated </a:t>
+            </a:r>
+            <a:r>
+              <a:rPr lang="en-US" dirty="0"/>
+              <a:t>test cases were built </a:t>
+            </a:r>
+            <a:r>
+              <a:rPr lang="en-US" dirty="0" smtClean="0"/>
+              <a:t>specifically to mimic the </a:t>
+            </a:r>
+            <a:r>
+              <a:rPr lang="en-US" dirty="0"/>
+              <a:t>behavior of the generated test </a:t>
+            </a:r>
+            <a:r>
+              <a:rPr lang="en-US" dirty="0" smtClean="0"/>
+              <a:t>cases</a:t>
+            </a:r>
+          </a:p>
+          <a:p>
+            <a:pPr lvl="1"/>
+            <a:r>
+              <a:rPr lang="en-US" dirty="0" smtClean="0"/>
+              <a:t>The </a:t>
+            </a:r>
+            <a:r>
+              <a:rPr lang="en-US" dirty="0"/>
+              <a:t>average CCN values for all of the test </a:t>
+            </a:r>
+            <a:r>
+              <a:rPr lang="en-US" dirty="0" smtClean="0"/>
+              <a:t>cases fall </a:t>
+            </a:r>
+            <a:r>
+              <a:rPr lang="en-US" dirty="0"/>
+              <a:t>into the low risk category, </a:t>
+            </a:r>
+            <a:endParaRPr lang="en-US" dirty="0" smtClean="0"/>
+          </a:p>
+          <a:p>
+            <a:pPr lvl="1"/>
+            <a:r>
+              <a:rPr lang="en-US" dirty="0"/>
+              <a:t>The average CCN values for all of the test cases </a:t>
+            </a:r>
+            <a:r>
+              <a:rPr lang="en-US" dirty="0" smtClean="0"/>
+              <a:t>are close </a:t>
+            </a:r>
+            <a:r>
+              <a:rPr lang="en-US" dirty="0"/>
+              <a:t>to one another in </a:t>
+            </a:r>
+            <a:r>
+              <a:rPr lang="en-US" dirty="0" smtClean="0"/>
+              <a:t>value</a:t>
+            </a:r>
+          </a:p>
+          <a:p>
+            <a:pPr lvl="1"/>
+            <a:r>
+              <a:rPr lang="en-US" dirty="0" smtClean="0"/>
+              <a:t>Leads to likely conclusion that none of the test cases were purposely made worse than the others.</a:t>
+            </a:r>
+          </a:p>
+          <a:p>
+            <a:pPr marL="457200" indent="-457200">
+              <a:buFont typeface="+mj-lt"/>
+              <a:buAutoNum type="arabicPeriod"/>
+            </a:pPr>
+            <a:endParaRPr lang="en-US" b="1" dirty="0" smtClean="0"/>
+          </a:p>
+          <a:p>
+            <a:pPr marL="457200" indent="-457200">
+              <a:buFont typeface="+mj-lt"/>
+              <a:buAutoNum type="arabicPeriod"/>
+            </a:pPr>
+            <a:endParaRPr lang="en-US" b="1" dirty="0" smtClean="0"/>
+          </a:p>
+          <a:p>
+            <a:pPr marL="457200" indent="-457200">
+              <a:buFont typeface="+mj-lt"/>
+              <a:buAutoNum type="arabicPeriod"/>
+            </a:pPr>
+            <a:endParaRPr lang="en-US" b="1" dirty="0" smtClean="0"/>
+          </a:p>
+          <a:p>
+            <a:pPr marL="0" indent="0">
+              <a:buNone/>
+            </a:pPr>
+            <a:endParaRPr lang="en-US" b="1" dirty="0" smtClean="0"/>
+          </a:p>
+          <a:p>
+            <a:pPr marL="800100" lvl="1"/>
+            <a:endParaRPr lang="en-US" dirty="0" smtClean="0"/>
+          </a:p>
+        </p:txBody>
+      </p:sp>
+    </p:spTree>
+    <p:extLst>
+      <p:ext uri="{BB962C8B-B14F-4D97-AF65-F5344CB8AC3E}">
+        <p14:creationId xmlns:p14="http://schemas.microsoft.com/office/powerpoint/2010/main" val="1117820296"/>
+      </p:ext>
+    </p:extLst>
+  </p:cSld>
+  <p:clrMapOvr>
+    <a:masterClrMapping/>
+  </p:clrMapOvr>
+  <p:timing>
+    <p:tnLst>
+      <p:par>
+        <p:cTn id="1" dur="indefinite" restart="never" nodeType="tmRoot"/>
+      </p:par>
+    </p:tnLst>
+  </p:timing>
+</p:sld>
+</file>
+
+<file path=ppt/slides/slide61.xml><?xml version="1.0" encoding="utf-8"?>
 <p:sld xmlns:a="http://schemas.openxmlformats.org/drawingml/2006/main" xmlns:r="http://schemas.openxmlformats.org/officeDocument/2006/relationships" xmlns:p="http://schemas.openxmlformats.org/presentationml/2006/main">
   <p:cSld>
     <p:spTree>
@@ -18416,10 +18507,17 @@
   <p:clrMapOvr>
     <a:masterClrMapping/>
   </p:clrMapOvr>
+  <p:timing>
+    <p:tnLst>
+      <p:par>
+        <p:cTn id="1" dur="indefinite" restart="never" nodeType="tmRoot"/>
+      </p:par>
+    </p:tnLst>
+  </p:timing>
 </p:sld>
 </file>
 
-<file path=ppt/slides/slide61.xml><?xml version="1.0" encoding="utf-8"?>
+<file path=ppt/slides/slide62.xml><?xml version="1.0" encoding="utf-8"?>
 <p:sld xmlns:a="http://schemas.openxmlformats.org/drawingml/2006/main" xmlns:r="http://schemas.openxmlformats.org/officeDocument/2006/relationships" xmlns:p="http://schemas.openxmlformats.org/presentationml/2006/main">
   <p:cSld>
     <p:spTree>
@@ -19099,7 +19197,7 @@
 </p:sld>
 </file>
 
-<file path=ppt/slides/slide62.xml><?xml version="1.0" encoding="utf-8"?>
+<file path=ppt/slides/slide63.xml><?xml version="1.0" encoding="utf-8"?>
 <p:sld xmlns:a="http://schemas.openxmlformats.org/drawingml/2006/main" xmlns:r="http://schemas.openxmlformats.org/officeDocument/2006/relationships" xmlns:p="http://schemas.openxmlformats.org/presentationml/2006/main">
   <p:cSld>
     <p:spTree>
@@ -19771,138 +19869,6 @@
 </p:sld>
 </file>
 
-<file path=ppt/slides/slide63.xml><?xml version="1.0" encoding="utf-8"?>
-<p:sld xmlns:a="http://schemas.openxmlformats.org/drawingml/2006/main" xmlns:r="http://schemas.openxmlformats.org/officeDocument/2006/relationships" xmlns:p="http://schemas.openxmlformats.org/presentationml/2006/main">
-  <p:cSld>
-    <p:spTree>
-      <p:nvGrpSpPr>
-        <p:cNvPr id="1" name=""/>
-        <p:cNvGrpSpPr/>
-        <p:nvPr/>
-      </p:nvGrpSpPr>
-      <p:grpSpPr>
-        <a:xfrm>
-          <a:off x="0" y="0"/>
-          <a:ext cx="0" cy="0"/>
-          <a:chOff x="0" y="0"/>
-          <a:chExt cx="0" cy="0"/>
-        </a:xfrm>
-      </p:grpSpPr>
-      <p:sp>
-        <p:nvSpPr>
-          <p:cNvPr id="2" name="Title 1"/>
-          <p:cNvSpPr>
-            <a:spLocks noGrp="1"/>
-          </p:cNvSpPr>
-          <p:nvPr>
-            <p:ph type="title"/>
-          </p:nvPr>
-        </p:nvSpPr>
-        <p:spPr/>
-        <p:txBody>
-          <a:bodyPr/>
-          <a:lstStyle/>
-          <a:p>
-            <a:r>
-              <a:rPr lang="en-US" dirty="0" err="1" smtClean="0"/>
-              <a:t>Cyclomatic</a:t>
-            </a:r>
-            <a:r>
-              <a:rPr lang="en-US" dirty="0" smtClean="0"/>
-              <a:t> Complexity as an</a:t>
-            </a:r>
-            <a:br>
-              <a:rPr lang="en-US" dirty="0" smtClean="0"/>
-            </a:br>
-            <a:r>
-              <a:rPr lang="en-US" dirty="0" smtClean="0"/>
-              <a:t>indicator of defects</a:t>
-            </a:r>
-            <a:endParaRPr lang="en-US" dirty="0"/>
-          </a:p>
-        </p:txBody>
-      </p:sp>
-      <p:sp>
-        <p:nvSpPr>
-          <p:cNvPr id="3" name="Content Placeholder 2"/>
-          <p:cNvSpPr>
-            <a:spLocks noGrp="1"/>
-          </p:cNvSpPr>
-          <p:nvPr>
-            <p:ph idx="1"/>
-          </p:nvPr>
-        </p:nvSpPr>
-        <p:spPr/>
-        <p:txBody>
-          <a:bodyPr/>
-          <a:lstStyle/>
-          <a:p>
-            <a:r>
-              <a:rPr lang="en-US" dirty="0" smtClean="0"/>
-              <a:t>Zhang and Zhang were able to effectively predict defects in code based on higher the </a:t>
-            </a:r>
-            <a:r>
-              <a:rPr lang="en-US" dirty="0" err="1" smtClean="0"/>
-              <a:t>cyclomatic</a:t>
-            </a:r>
-            <a:r>
-              <a:rPr lang="en-US" dirty="0" smtClean="0"/>
-              <a:t> complexity values.</a:t>
-            </a:r>
-          </a:p>
-          <a:p>
-            <a:r>
-              <a:rPr lang="en-US" dirty="0" smtClean="0"/>
-              <a:t>Generated code has </a:t>
-            </a:r>
-          </a:p>
-          <a:p>
-            <a:pPr lvl="1"/>
-            <a:r>
-              <a:rPr lang="en-US" dirty="0" smtClean="0"/>
-              <a:t>shorter interquartile ranges</a:t>
-            </a:r>
-          </a:p>
-          <a:p>
-            <a:pPr lvl="1"/>
-            <a:r>
-              <a:rPr lang="en-US" dirty="0" smtClean="0"/>
-              <a:t>Medians &lt;= lowest quartiles of the non-generated code</a:t>
-            </a:r>
-          </a:p>
-          <a:p>
-            <a:r>
-              <a:rPr lang="en-US" dirty="0" smtClean="0"/>
-              <a:t>Conclusion: a greater number of functions in the code generated from TEBNF have fewer defects than non-generated code.</a:t>
-            </a:r>
-          </a:p>
-          <a:p>
-            <a:r>
-              <a:rPr lang="en-US" dirty="0" smtClean="0"/>
-              <a:t>This correlation means it is likely that as applications increase in size and scope, number of defects will remain lower in code generated from TEBNF.</a:t>
-            </a:r>
-          </a:p>
-          <a:p>
-            <a:pPr marL="0" indent="0">
-              <a:buNone/>
-            </a:pPr>
-            <a:endParaRPr lang="en-US" dirty="0"/>
-          </a:p>
-        </p:txBody>
-      </p:sp>
-    </p:spTree>
-    <p:extLst>
-      <p:ext uri="{BB962C8B-B14F-4D97-AF65-F5344CB8AC3E}">
-        <p14:creationId xmlns:p14="http://schemas.microsoft.com/office/powerpoint/2010/main" val="3909135695"/>
-      </p:ext>
-    </p:extLst>
-  </p:cSld>
-  <p:clrMapOvr>
-    <a:masterClrMapping/>
-  </p:clrMapOvr>
-</p:sld>
-</file>
-
 <file path=ppt/slides/slide64.xml><?xml version="1.0" encoding="utf-8"?>
 <p:sld xmlns:a="http://schemas.openxmlformats.org/drawingml/2006/main" xmlns:r="http://schemas.openxmlformats.org/officeDocument/2006/relationships" xmlns:p="http://schemas.openxmlformats.org/presentationml/2006/main">
   <p:cSld>
@@ -19936,8 +19902,19 @@
           <a:lstStyle/>
           <a:p>
             <a:r>
-              <a:rPr lang="en-US" dirty="0" smtClean="0"/>
-              <a:t>Future Work</a:t>
+              <a:rPr lang="en-US" dirty="0" err="1" smtClean="0"/>
+              <a:t>Cyclomatic</a:t>
+            </a:r>
+            <a:r>
+              <a:rPr lang="en-US" dirty="0" smtClean="0"/>
+              <a:t> Complexity as an</a:t>
+            </a:r>
+            <a:br>
+              <a:rPr lang="en-US" dirty="0" smtClean="0"/>
+            </a:br>
+            <a:r>
+              <a:rPr lang="en-US" dirty="0" smtClean="0"/>
+              <a:t>indicator of defects</a:t>
             </a:r>
             <a:endParaRPr lang="en-US" dirty="0"/>
           </a:p>
@@ -19960,20 +19937,53 @@
           <a:p>
             <a:r>
               <a:rPr lang="en-US" dirty="0" smtClean="0"/>
-              <a:t>The TEBNF code generation tool can likely be optimized to produce better code.</a:t>
-            </a:r>
-          </a:p>
-          <a:p>
-            <a:r>
-              <a:rPr lang="en-US" dirty="0" smtClean="0"/>
-              <a:t>Add more I/O methods to TEBNF and the tool.</a:t>
-            </a:r>
-          </a:p>
-          <a:p>
-            <a:r>
-              <a:rPr lang="en-US" dirty="0" smtClean="0"/>
-              <a:t>Automatically generate graphical user interfaces.</a:t>
-            </a:r>
+              <a:t>Zhang and Zhang were able to effectively predict defects in code based on higher the </a:t>
+            </a:r>
+            <a:r>
+              <a:rPr lang="en-US" dirty="0" err="1" smtClean="0"/>
+              <a:t>cyclomatic</a:t>
+            </a:r>
+            <a:r>
+              <a:rPr lang="en-US" dirty="0" smtClean="0"/>
+              <a:t> complexity values.</a:t>
+            </a:r>
+          </a:p>
+          <a:p>
+            <a:r>
+              <a:rPr lang="en-US" dirty="0" smtClean="0"/>
+              <a:t>Generated code has </a:t>
+            </a:r>
+          </a:p>
+          <a:p>
+            <a:pPr lvl="1"/>
+            <a:r>
+              <a:rPr lang="en-US" dirty="0" smtClean="0"/>
+              <a:t>shorter interquartile ranges</a:t>
+            </a:r>
+          </a:p>
+          <a:p>
+            <a:pPr lvl="1"/>
+            <a:r>
+              <a:rPr lang="en-US" dirty="0" smtClean="0"/>
+              <a:t>Medians &lt;= lowest quartiles of the non-generated code</a:t>
+            </a:r>
+          </a:p>
+          <a:p>
+            <a:r>
+              <a:rPr lang="en-US" dirty="0" smtClean="0"/>
+              <a:t>Conclusion: a greater number of functions in the code generated from TEBNF have fewer defects than non-generated code.</a:t>
+            </a:r>
+          </a:p>
+          <a:p>
+            <a:r>
+              <a:rPr lang="en-US" dirty="0" smtClean="0"/>
+              <a:t>This correlation means it is likely that as applications increase in size and scope, number of defects will remain lower in code generated from TEBNF.</a:t>
+            </a:r>
+          </a:p>
+          <a:p>
+            <a:pPr marL="0" indent="0">
+              <a:buNone/>
+            </a:pPr>
             <a:endParaRPr lang="en-US" dirty="0"/>
           </a:p>
         </p:txBody>
@@ -19981,13 +19991,20 @@
     </p:spTree>
     <p:extLst>
       <p:ext uri="{BB962C8B-B14F-4D97-AF65-F5344CB8AC3E}">
-        <p14:creationId xmlns:p14="http://schemas.microsoft.com/office/powerpoint/2010/main" val="1023650706"/>
+        <p14:creationId xmlns:p14="http://schemas.microsoft.com/office/powerpoint/2010/main" val="3909135695"/>
       </p:ext>
     </p:extLst>
   </p:cSld>
   <p:clrMapOvr>
     <a:masterClrMapping/>
   </p:clrMapOvr>
+  <p:timing>
+    <p:tnLst>
+      <p:par>
+        <p:cTn id="1" dur="indefinite" restart="never" nodeType="tmRoot"/>
+      </p:par>
+    </p:tnLst>
+  </p:timing>
 </p:sld>
 </file>
 
@@ -20025,7 +20042,19 @@
           <a:p>
             <a:r>
               <a:rPr lang="en-US" dirty="0" smtClean="0"/>
-              <a:t>TEBNF Code Generation Tool</a:t>
+              <a:t>Overview of the </a:t>
+            </a:r>
+            <a:r>
+              <a:rPr lang="en-US" dirty="0"/>
+              <a:t>TEBNF </a:t>
+            </a:r>
+            <a:r>
+              <a:rPr lang="en-US" dirty="0" smtClean="0"/>
+              <a:t>Code Generation </a:t>
+            </a:r>
+            <a:r>
+              <a:rPr lang="en-US" dirty="0" smtClean="0"/>
+              <a:t>Tool</a:t>
             </a:r>
             <a:endParaRPr lang="en-US" dirty="0"/>
           </a:p>
@@ -20080,12 +20109,12 @@
               <a:t>data to produce </a:t>
             </a:r>
             <a:r>
-              <a:rPr lang="en-US" dirty="0" err="1"/>
-              <a:t>specic</a:t>
+              <a:rPr lang="en-US" dirty="0" smtClean="0"/>
+              <a:t>specific </a:t>
             </a:r>
             <a:r>
               <a:rPr lang="en-US" dirty="0"/>
-              <a:t> output(s)</a:t>
+              <a:t>output(s)</a:t>
             </a:r>
           </a:p>
           <a:p>
@@ -20095,7 +20124,15 @@
             </a:r>
             <a:r>
               <a:rPr lang="en-US" dirty="0"/>
-              <a:t>output(s) to a network destination (UDP/IP), le, or console-based </a:t>
+              <a:t>output(s) to a network destination (UDP/IP), </a:t>
+            </a:r>
+            <a:r>
+              <a:rPr lang="en-US" dirty="0" smtClean="0"/>
+              <a:t>file</a:t>
+            </a:r>
+            <a:r>
+              <a:rPr lang="en-US" dirty="0"/>
+              <a:t>, or console-based </a:t>
             </a:r>
             <a:r>
               <a:rPr lang="en-US" dirty="0" smtClean="0"/>
@@ -20172,34 +20209,21 @@
             <p:ph type="title"/>
           </p:nvPr>
         </p:nvSpPr>
-        <p:spPr/>
+        <p:spPr>
+          <a:xfrm>
+            <a:off x="1147556" y="2891116"/>
+            <a:ext cx="9404723" cy="1400530"/>
+          </a:xfrm>
+        </p:spPr>
         <p:txBody>
           <a:bodyPr/>
           <a:lstStyle/>
           <a:p>
-            <a:r>
-              <a:rPr lang="en-US" dirty="0" smtClean="0"/>
+            <a:pPr algn="ctr"/>
+            <a:r>
+              <a:rPr lang="en-US" sz="6000" dirty="0" smtClean="0"/>
               <a:t>Design</a:t>
             </a:r>
-            <a:endParaRPr lang="en-US" dirty="0"/>
-          </a:p>
-        </p:txBody>
-      </p:sp>
-      <p:sp>
-        <p:nvSpPr>
-          <p:cNvPr id="3" name="Content Placeholder 2"/>
-          <p:cNvSpPr>
-            <a:spLocks noGrp="1"/>
-          </p:cNvSpPr>
-          <p:nvPr>
-            <p:ph idx="1"/>
-          </p:nvPr>
-        </p:nvSpPr>
-        <p:spPr/>
-        <p:txBody>
-          <a:bodyPr/>
-          <a:lstStyle/>
-          <a:p>
             <a:endParaRPr lang="en-US" dirty="0"/>
           </a:p>
         </p:txBody>
@@ -20281,32 +20305,86 @@
           <a:p>
             <a:r>
               <a:rPr lang="en-US" dirty="0"/>
-              <a:t> Input methods: a method of receiving data as input.</a:t>
-            </a:r>
-          </a:p>
-          <a:p>
+              <a:t> </a:t>
+            </a:r>
+            <a:r>
+              <a:rPr lang="en-US" dirty="0" smtClean="0"/>
+              <a:t>Elements in TEBNF</a:t>
+            </a:r>
+          </a:p>
+          <a:p>
+            <a:pPr lvl="1"/>
+            <a:r>
+              <a:rPr lang="en-US" dirty="0" smtClean="0"/>
+              <a:t>Input </a:t>
+            </a:r>
             <a:r>
               <a:rPr lang="en-US" dirty="0"/>
-              <a:t> Output methods: a method of outputting data.</a:t>
-            </a:r>
-          </a:p>
-          <a:p>
+              <a:t>methods: a method of receiving data as input.</a:t>
+            </a:r>
+          </a:p>
+          <a:p>
+            <a:pPr lvl="1"/>
+            <a:r>
+              <a:rPr lang="en-US" dirty="0" smtClean="0"/>
+              <a:t>Output </a:t>
+            </a:r>
             <a:r>
               <a:rPr lang="en-US" dirty="0"/>
-              <a:t> Grammar sections: parses input data.</a:t>
-            </a:r>
-          </a:p>
-          <a:p>
+              <a:t>methods: a method of outputting data.</a:t>
+            </a:r>
+          </a:p>
+          <a:p>
+            <a:pPr lvl="1"/>
+            <a:r>
+              <a:rPr lang="en-US" dirty="0" smtClean="0"/>
+              <a:t>Grammar </a:t>
+            </a:r>
             <a:r>
               <a:rPr lang="en-US" dirty="0"/>
-              <a:t> Actions: action code to execute using data from other elements.</a:t>
-            </a:r>
-          </a:p>
-          <a:p>
+              <a:t>sections: parses input data.</a:t>
+            </a:r>
+          </a:p>
+          <a:p>
+            <a:pPr lvl="1"/>
+            <a:r>
+              <a:rPr lang="en-US" dirty="0" smtClean="0"/>
+              <a:t>Actions</a:t>
+            </a:r>
             <a:r>
               <a:rPr lang="en-US" dirty="0"/>
-              <a:t> State transition tables: denes the behavior of the program.</a:t>
-            </a:r>
+              <a:t>: action code to execute using data from other elements.</a:t>
+            </a:r>
+          </a:p>
+          <a:p>
+            <a:pPr lvl="1"/>
+            <a:r>
+              <a:rPr lang="en-US" dirty="0" smtClean="0"/>
+              <a:t>State </a:t>
+            </a:r>
+            <a:r>
+              <a:rPr lang="en-US" dirty="0"/>
+              <a:t>transition tables: </a:t>
+            </a:r>
+            <a:r>
+              <a:rPr lang="en-US" dirty="0" smtClean="0"/>
+              <a:t>defines </a:t>
+            </a:r>
+            <a:r>
+              <a:rPr lang="en-US" dirty="0"/>
+              <a:t>the behavior of the program</a:t>
+            </a:r>
+            <a:r>
+              <a:rPr lang="en-US" dirty="0" smtClean="0"/>
+              <a:t>.</a:t>
+            </a:r>
+          </a:p>
+          <a:p>
+            <a:r>
+              <a:rPr lang="en-US" dirty="0" smtClean="0"/>
+              <a:t>Each element is represented as a class in generated code.</a:t>
+            </a:r>
+            <a:endParaRPr lang="en-US" dirty="0"/>
           </a:p>
         </p:txBody>
       </p:sp>

</xml_diff>